<commit_message>
force model design almost complete
</commit_message>
<xml_diff>
--- a/vehicle forces.pptx
+++ b/vehicle forces.pptx
@@ -18,13 +18,13 @@
     <p:sldId id="274" r:id="rId12"/>
     <p:sldId id="263" r:id="rId13"/>
     <p:sldId id="264" r:id="rId14"/>
-    <p:sldId id="275" r:id="rId15"/>
+    <p:sldId id="282" r:id="rId15"/>
     <p:sldId id="268" r:id="rId16"/>
     <p:sldId id="269" r:id="rId17"/>
-    <p:sldId id="270" r:id="rId18"/>
-    <p:sldId id="271" r:id="rId19"/>
-    <p:sldId id="272" r:id="rId20"/>
-    <p:sldId id="273" r:id="rId21"/>
+    <p:sldId id="283" r:id="rId18"/>
+    <p:sldId id="272" r:id="rId19"/>
+    <p:sldId id="273" r:id="rId20"/>
+    <p:sldId id="281" r:id="rId21"/>
   </p:sldIdLst>
   <p:sldSz cx="12192000" cy="6858000"/>
   <p:notesSz cx="6858000" cy="9144000"/>
@@ -278,7 +278,7 @@
           <a:p>
             <a:fld id="{96DFC8BC-9833-445E-8087-9E2B159065C8}" type="datetimeFigureOut">
               <a:rPr lang="en-US" smtClean="0"/>
-              <a:t>2/5/19</a:t>
+              <a:t>2/6/19</a:t>
             </a:fld>
             <a:endParaRPr lang="en-US"/>
           </a:p>
@@ -476,7 +476,7 @@
           <a:p>
             <a:fld id="{96DFC8BC-9833-445E-8087-9E2B159065C8}" type="datetimeFigureOut">
               <a:rPr lang="en-US" smtClean="0"/>
-              <a:t>2/5/19</a:t>
+              <a:t>2/6/19</a:t>
             </a:fld>
             <a:endParaRPr lang="en-US"/>
           </a:p>
@@ -684,7 +684,7 @@
           <a:p>
             <a:fld id="{96DFC8BC-9833-445E-8087-9E2B159065C8}" type="datetimeFigureOut">
               <a:rPr lang="en-US" smtClean="0"/>
-              <a:t>2/5/19</a:t>
+              <a:t>2/6/19</a:t>
             </a:fld>
             <a:endParaRPr lang="en-US"/>
           </a:p>
@@ -882,7 +882,7 @@
           <a:p>
             <a:fld id="{96DFC8BC-9833-445E-8087-9E2B159065C8}" type="datetimeFigureOut">
               <a:rPr lang="en-US" smtClean="0"/>
-              <a:t>2/5/19</a:t>
+              <a:t>2/6/19</a:t>
             </a:fld>
             <a:endParaRPr lang="en-US"/>
           </a:p>
@@ -1157,7 +1157,7 @@
           <a:p>
             <a:fld id="{96DFC8BC-9833-445E-8087-9E2B159065C8}" type="datetimeFigureOut">
               <a:rPr lang="en-US" smtClean="0"/>
-              <a:t>2/5/19</a:t>
+              <a:t>2/6/19</a:t>
             </a:fld>
             <a:endParaRPr lang="en-US"/>
           </a:p>
@@ -1422,7 +1422,7 @@
           <a:p>
             <a:fld id="{96DFC8BC-9833-445E-8087-9E2B159065C8}" type="datetimeFigureOut">
               <a:rPr lang="en-US" smtClean="0"/>
-              <a:t>2/5/19</a:t>
+              <a:t>2/6/19</a:t>
             </a:fld>
             <a:endParaRPr lang="en-US"/>
           </a:p>
@@ -1834,7 +1834,7 @@
           <a:p>
             <a:fld id="{96DFC8BC-9833-445E-8087-9E2B159065C8}" type="datetimeFigureOut">
               <a:rPr lang="en-US" smtClean="0"/>
-              <a:t>2/5/19</a:t>
+              <a:t>2/6/19</a:t>
             </a:fld>
             <a:endParaRPr lang="en-US"/>
           </a:p>
@@ -1975,7 +1975,7 @@
           <a:p>
             <a:fld id="{96DFC8BC-9833-445E-8087-9E2B159065C8}" type="datetimeFigureOut">
               <a:rPr lang="en-US" smtClean="0"/>
-              <a:t>2/5/19</a:t>
+              <a:t>2/6/19</a:t>
             </a:fld>
             <a:endParaRPr lang="en-US"/>
           </a:p>
@@ -2088,7 +2088,7 @@
           <a:p>
             <a:fld id="{96DFC8BC-9833-445E-8087-9E2B159065C8}" type="datetimeFigureOut">
               <a:rPr lang="en-US" smtClean="0"/>
-              <a:t>2/5/19</a:t>
+              <a:t>2/6/19</a:t>
             </a:fld>
             <a:endParaRPr lang="en-US"/>
           </a:p>
@@ -2399,7 +2399,7 @@
           <a:p>
             <a:fld id="{96DFC8BC-9833-445E-8087-9E2B159065C8}" type="datetimeFigureOut">
               <a:rPr lang="en-US" smtClean="0"/>
-              <a:t>2/5/19</a:t>
+              <a:t>2/6/19</a:t>
             </a:fld>
             <a:endParaRPr lang="en-US"/>
           </a:p>
@@ -2687,7 +2687,7 @@
           <a:p>
             <a:fld id="{96DFC8BC-9833-445E-8087-9E2B159065C8}" type="datetimeFigureOut">
               <a:rPr lang="en-US" smtClean="0"/>
-              <a:t>2/5/19</a:t>
+              <a:t>2/6/19</a:t>
             </a:fld>
             <a:endParaRPr lang="en-US"/>
           </a:p>
@@ -2928,7 +2928,7 @@
           <a:p>
             <a:fld id="{96DFC8BC-9833-445E-8087-9E2B159065C8}" type="datetimeFigureOut">
               <a:rPr lang="en-US" smtClean="0"/>
-              <a:t>2/5/19</a:t>
+              <a:t>2/6/19</a:t>
             </a:fld>
             <a:endParaRPr lang="en-US"/>
           </a:p>
@@ -4593,13 +4593,14 @@
           </p:cNvPr>
           <p:cNvCxnSpPr>
             <a:cxnSpLocks/>
+            <a:endCxn id="9" idx="0"/>
           </p:cNvCxnSpPr>
           <p:nvPr/>
         </p:nvCxnSpPr>
         <p:spPr>
           <a:xfrm>
             <a:off x="6971921" y="4076219"/>
-            <a:ext cx="636640" cy="367444"/>
+            <a:ext cx="716709" cy="383665"/>
           </a:xfrm>
           <a:prstGeom prst="straightConnector1">
             <a:avLst/>
@@ -4737,7 +4738,7 @@
         <p:spPr>
           <a:xfrm>
             <a:off x="321012" y="544749"/>
-            <a:ext cx="10757295" cy="2308324"/>
+            <a:ext cx="10757295" cy="2585323"/>
           </a:xfrm>
           <a:prstGeom prst="rect">
             <a:avLst/>
@@ -4829,7 +4830,15 @@
             </a:r>
             <a:r>
               <a:rPr lang="en-US" dirty="0"/>
-              <a:t> * sin (alpha-theta)* sin(alpha–theta)			-along </a:t>
+              <a:t> * sin (alpha-theta)* sin(alpha-theta)			-along positive </a:t>
+            </a:r>
+            <a:r>
+              <a:rPr lang="en-US" dirty="0" err="1"/>
+              <a:t>Xalpha</a:t>
+            </a:r>
+            <a:r>
+              <a:rPr lang="en-US" dirty="0"/>
+              <a:t> axis	</a:t>
             </a:r>
           </a:p>
           <a:p>
@@ -4846,7 +4855,15 @@
             </a:r>
             <a:r>
               <a:rPr lang="en-US" dirty="0"/>
-              <a:t> * cos (alpha-theta) * cos(beta-theta)</a:t>
+              <a:t> * cos (alpha-theta) * cos(beta-theta)			-along positive </a:t>
+            </a:r>
+            <a:r>
+              <a:rPr lang="en-US" dirty="0" err="1"/>
+              <a:t>Xbeta</a:t>
+            </a:r>
+            <a:r>
+              <a:rPr lang="en-US" dirty="0"/>
+              <a:t> axis</a:t>
             </a:r>
           </a:p>
           <a:p>
@@ -4860,7 +4877,15 @@
             </a:r>
             <a:r>
               <a:rPr lang="en-US" dirty="0"/>
-              <a:t> * cos(alpha-theta) * sin(beta-theta)</a:t>
+              <a:t> * cos(alpha-theta) * cos(90+beta-theta)			-along positive </a:t>
+            </a:r>
+            <a:r>
+              <a:rPr lang="en-US" dirty="0" err="1"/>
+              <a:t>Ybeta</a:t>
+            </a:r>
+            <a:r>
+              <a:rPr lang="en-US" dirty="0"/>
+              <a:t> axis (negative value 										into road)</a:t>
             </a:r>
           </a:p>
         </p:txBody>
@@ -5446,8 +5471,8 @@
         </p:nvSpPr>
         <p:spPr>
           <a:xfrm>
-            <a:off x="6274339" y="137041"/>
-            <a:ext cx="5849823" cy="1661993"/>
+            <a:off x="2878775" y="5643314"/>
+            <a:ext cx="9292621" cy="1138773"/>
           </a:xfrm>
           <a:prstGeom prst="rect">
             <a:avLst/>
@@ -5468,13 +5493,7 @@
           <a:p>
             <a:r>
               <a:rPr lang="en-US" dirty="0"/>
-              <a:t>1 parallel to the ground at the contact point. </a:t>
-            </a:r>
-          </a:p>
-          <a:p>
-            <a:r>
-              <a:rPr lang="en-US" dirty="0"/>
-              <a:t>1 perpendicular to the ground at the contact point.</a:t>
+              <a:t>1 parallel to the ground at the contact point.  1 perpendicular to the ground at the contact point.</a:t>
             </a:r>
           </a:p>
           <a:p>
@@ -5728,7 +5747,7 @@
         <p:spPr>
           <a:xfrm>
             <a:off x="321013" y="544749"/>
-            <a:ext cx="4565352" cy="1477328"/>
+            <a:ext cx="10538847" cy="1754326"/>
           </a:xfrm>
           <a:prstGeom prst="rect">
             <a:avLst/>
@@ -5751,7 +5770,15 @@
             </a:r>
             <a:r>
               <a:rPr lang="en-US" dirty="0"/>
-              <a:t> * sin (alpha-theta)* cos(alpha – theta)</a:t>
+              <a:t> * sin (alpha-theta)* cos(alpha – theta)			- along positive </a:t>
+            </a:r>
+            <a:r>
+              <a:rPr lang="en-US" dirty="0" err="1"/>
+              <a:t>Yalpha</a:t>
+            </a:r>
+            <a:r>
+              <a:rPr lang="en-US" dirty="0"/>
+              <a:t> axis</a:t>
             </a:r>
           </a:p>
           <a:p>
@@ -5765,7 +5792,15 @@
             </a:r>
             <a:r>
               <a:rPr lang="en-US" dirty="0"/>
-              <a:t> * sin (alpha-theta)* sin(alpha– theta)</a:t>
+              <a:t> * sin (alpha-theta)* sin(alpha– theta)			- along positive </a:t>
+            </a:r>
+            <a:r>
+              <a:rPr lang="en-US" dirty="0" err="1"/>
+              <a:t>Xalpha</a:t>
+            </a:r>
+            <a:r>
+              <a:rPr lang="en-US" dirty="0"/>
+              <a:t> axis</a:t>
             </a:r>
           </a:p>
           <a:p>
@@ -5782,7 +5817,15 @@
             </a:r>
             <a:r>
               <a:rPr lang="en-US" dirty="0"/>
-              <a:t> * cos (alpha-theta) * cos(beta-theta)</a:t>
+              <a:t> * cos (alpha-theta) * cos(beta-theta)			- along positive </a:t>
+            </a:r>
+            <a:r>
+              <a:rPr lang="en-US" dirty="0" err="1"/>
+              <a:t>Xbeta</a:t>
+            </a:r>
+            <a:r>
+              <a:rPr lang="en-US" dirty="0"/>
+              <a:t> axis</a:t>
             </a:r>
           </a:p>
           <a:p>
@@ -5796,7 +5839,21 @@
             </a:r>
             <a:r>
               <a:rPr lang="en-US" dirty="0"/>
-              <a:t> * cos(alpha-theta) * sin(beta-theta)</a:t>
+              <a:t> * cos(alpha-theta) * cos(90+beta-theta)			- along positive </a:t>
+            </a:r>
+            <a:r>
+              <a:rPr lang="en-US" dirty="0" err="1"/>
+              <a:t>Ybeta</a:t>
+            </a:r>
+            <a:r>
+              <a:rPr lang="en-US" dirty="0"/>
+              <a:t> axis (negative value</a:t>
+            </a:r>
+          </a:p>
+          <a:p>
+            <a:r>
+              <a:rPr lang="en-US" dirty="0"/>
+              <a:t>										into road)</a:t>
             </a:r>
           </a:p>
         </p:txBody>
@@ -6312,7 +6369,7 @@
         </p:nvSpPr>
         <p:spPr>
           <a:xfrm>
-            <a:off x="5454041" y="108698"/>
+            <a:off x="5397167" y="5999946"/>
             <a:ext cx="6390788" cy="584775"/>
           </a:xfrm>
           <a:prstGeom prst="rect">
@@ -6790,109 +6847,6 @@
           </a:p>
         </p:txBody>
       </p:sp>
-      <p:sp>
-        <p:nvSpPr>
-          <p:cNvPr id="25" name="TextBox 24">
-            <a:extLst>
-              <a:ext uri="{FF2B5EF4-FFF2-40B4-BE49-F238E27FC236}">
-                <a16:creationId xmlns:a16="http://schemas.microsoft.com/office/drawing/2014/main" id="{BBCEA395-B743-AA40-9453-9E429EE22C7F}"/>
-              </a:ext>
-            </a:extLst>
-          </p:cNvPr>
-          <p:cNvSpPr txBox="1"/>
-          <p:nvPr/>
-        </p:nvSpPr>
-        <p:spPr>
-          <a:xfrm>
-            <a:off x="272719" y="233178"/>
-            <a:ext cx="4565352" cy="2308324"/>
-          </a:xfrm>
-          <a:prstGeom prst="rect">
-            <a:avLst/>
-          </a:prstGeom>
-          <a:noFill/>
-        </p:spPr>
-        <p:txBody>
-          <a:bodyPr wrap="none" rtlCol="0">
-            <a:spAutoFit/>
-          </a:bodyPr>
-          <a:lstStyle/>
-          <a:p>
-            <a:r>
-              <a:rPr lang="en-US" dirty="0"/>
-              <a:t>4 = </a:t>
-            </a:r>
-            <a:r>
-              <a:rPr lang="en-US" dirty="0" err="1"/>
-              <a:t>Fout</a:t>
-            </a:r>
-            <a:r>
-              <a:rPr lang="en-US" dirty="0"/>
-              <a:t> * sin (alpha-theta)* cos(alpha – theta)</a:t>
-            </a:r>
-          </a:p>
-          <a:p>
-            <a:r>
-              <a:rPr lang="en-US" dirty="0"/>
-              <a:t>5 = </a:t>
-            </a:r>
-            <a:r>
-              <a:rPr lang="en-US" dirty="0" err="1"/>
-              <a:t>Fout</a:t>
-            </a:r>
-            <a:r>
-              <a:rPr lang="en-US" dirty="0"/>
-              <a:t> * sin (alpha-theta)* sin(alpha– theta)</a:t>
-            </a:r>
-          </a:p>
-          <a:p>
-            <a:endParaRPr lang="en-US" dirty="0"/>
-          </a:p>
-          <a:p>
-            <a:r>
-              <a:rPr lang="en-US" dirty="0"/>
-              <a:t>6 = </a:t>
-            </a:r>
-            <a:r>
-              <a:rPr lang="en-US" dirty="0" err="1"/>
-              <a:t>Fout</a:t>
-            </a:r>
-            <a:r>
-              <a:rPr lang="en-US" dirty="0"/>
-              <a:t> * cos (alpha-theta) * cos(beta-theta)</a:t>
-            </a:r>
-          </a:p>
-          <a:p>
-            <a:r>
-              <a:rPr lang="en-US" dirty="0"/>
-              <a:t>7 = </a:t>
-            </a:r>
-            <a:r>
-              <a:rPr lang="en-US" dirty="0" err="1"/>
-              <a:t>Fout</a:t>
-            </a:r>
-            <a:r>
-              <a:rPr lang="en-US" dirty="0"/>
-              <a:t> * cos(alpha-theta) * sin(beta-theta)</a:t>
-            </a:r>
-          </a:p>
-          <a:p>
-            <a:endParaRPr lang="en-US" dirty="0"/>
-          </a:p>
-          <a:p>
-            <a:r>
-              <a:rPr lang="en-US" dirty="0"/>
-              <a:t>8 = W1</a:t>
-            </a:r>
-          </a:p>
-          <a:p>
-            <a:r>
-              <a:rPr lang="en-US" dirty="0"/>
-              <a:t>9 = W2</a:t>
-            </a:r>
-          </a:p>
-        </p:txBody>
-      </p:sp>
       <p:cxnSp>
         <p:nvCxnSpPr>
           <p:cNvPr id="27" name="Straight Arrow Connector 26">
@@ -6968,6 +6922,160 @@
             <a:r>
               <a:rPr lang="en-US" dirty="0"/>
               <a:t>7</a:t>
+            </a:r>
+          </a:p>
+        </p:txBody>
+      </p:sp>
+      <p:sp>
+        <p:nvSpPr>
+          <p:cNvPr id="28" name="TextBox 27">
+            <a:extLst>
+              <a:ext uri="{FF2B5EF4-FFF2-40B4-BE49-F238E27FC236}">
+                <a16:creationId xmlns:a16="http://schemas.microsoft.com/office/drawing/2014/main" id="{1B0488D6-3857-7548-A8DC-CA88744A19C2}"/>
+              </a:ext>
+            </a:extLst>
+          </p:cNvPr>
+          <p:cNvSpPr txBox="1"/>
+          <p:nvPr/>
+        </p:nvSpPr>
+        <p:spPr>
+          <a:xfrm>
+            <a:off x="321013" y="544749"/>
+            <a:ext cx="10677923" cy="2308324"/>
+          </a:xfrm>
+          <a:prstGeom prst="rect">
+            <a:avLst/>
+          </a:prstGeom>
+          <a:noFill/>
+        </p:spPr>
+        <p:txBody>
+          <a:bodyPr wrap="none" rtlCol="0">
+            <a:spAutoFit/>
+          </a:bodyPr>
+          <a:lstStyle/>
+          <a:p>
+            <a:r>
+              <a:rPr lang="en-US" dirty="0"/>
+              <a:t>4 = </a:t>
+            </a:r>
+            <a:r>
+              <a:rPr lang="en-US" dirty="0" err="1"/>
+              <a:t>Fout</a:t>
+            </a:r>
+            <a:r>
+              <a:rPr lang="en-US" dirty="0"/>
+              <a:t> * sin (alpha-theta)* cos(alpha – theta)			- along positive </a:t>
+            </a:r>
+            <a:r>
+              <a:rPr lang="en-US" dirty="0" err="1"/>
+              <a:t>Yalpha</a:t>
+            </a:r>
+            <a:r>
+              <a:rPr lang="en-US" dirty="0"/>
+              <a:t> axis</a:t>
+            </a:r>
+          </a:p>
+          <a:p>
+            <a:r>
+              <a:rPr lang="en-US" dirty="0"/>
+              <a:t>5 = </a:t>
+            </a:r>
+            <a:r>
+              <a:rPr lang="en-US" dirty="0" err="1"/>
+              <a:t>Fout</a:t>
+            </a:r>
+            <a:r>
+              <a:rPr lang="en-US" dirty="0"/>
+              <a:t> * sin (alpha-theta)* sin(alpha– theta)			- along positive </a:t>
+            </a:r>
+            <a:r>
+              <a:rPr lang="en-US" dirty="0" err="1"/>
+              <a:t>Xalpha</a:t>
+            </a:r>
+            <a:r>
+              <a:rPr lang="en-US" dirty="0"/>
+              <a:t> axis</a:t>
+            </a:r>
+          </a:p>
+          <a:p>
+            <a:endParaRPr lang="en-US" dirty="0"/>
+          </a:p>
+          <a:p>
+            <a:r>
+              <a:rPr lang="en-US" dirty="0"/>
+              <a:t>6 = </a:t>
+            </a:r>
+            <a:r>
+              <a:rPr lang="en-US" dirty="0" err="1"/>
+              <a:t>Fout</a:t>
+            </a:r>
+            <a:r>
+              <a:rPr lang="en-US" dirty="0"/>
+              <a:t> * cos (alpha-theta) * cos(beta-theta)			- along positive </a:t>
+            </a:r>
+            <a:r>
+              <a:rPr lang="en-US" dirty="0" err="1"/>
+              <a:t>Xbeta</a:t>
+            </a:r>
+            <a:r>
+              <a:rPr lang="en-US" dirty="0"/>
+              <a:t> axis</a:t>
+            </a:r>
+          </a:p>
+          <a:p>
+            <a:r>
+              <a:rPr lang="en-US" dirty="0"/>
+              <a:t>7 = </a:t>
+            </a:r>
+            <a:r>
+              <a:rPr lang="en-US" dirty="0" err="1"/>
+              <a:t>Fout</a:t>
+            </a:r>
+            <a:r>
+              <a:rPr lang="en-US" dirty="0"/>
+              <a:t> * cos(alpha-theta) * sin(90+beta-theta)			- along positive </a:t>
+            </a:r>
+            <a:r>
+              <a:rPr lang="en-US" dirty="0" err="1"/>
+              <a:t>Ybeta</a:t>
+            </a:r>
+            <a:r>
+              <a:rPr lang="en-US" dirty="0"/>
+              <a:t> axis (negative value</a:t>
+            </a:r>
+          </a:p>
+          <a:p>
+            <a:r>
+              <a:rPr lang="en-US" dirty="0"/>
+              <a:t>										into road)</a:t>
+            </a:r>
+          </a:p>
+          <a:p>
+            <a:r>
+              <a:rPr lang="en-US" dirty="0"/>
+              <a:t>8 = W1 							(along positive </a:t>
+            </a:r>
+            <a:r>
+              <a:rPr lang="en-US" dirty="0" err="1"/>
+              <a:t>Yworld</a:t>
+            </a:r>
+            <a:r>
+              <a:rPr lang="en-US" dirty="0"/>
+              <a:t> axis (negative value)</a:t>
+            </a:r>
+          </a:p>
+          <a:p>
+            <a:r>
+              <a:rPr lang="en-US" dirty="0"/>
+              <a:t>9 = W2 							(along positive </a:t>
+            </a:r>
+            <a:r>
+              <a:rPr lang="en-US" dirty="0" err="1"/>
+              <a:t>Xworld</a:t>
+            </a:r>
+            <a:r>
+              <a:rPr lang="en-US" dirty="0"/>
+              <a:t> axis (negative value)</a:t>
             </a:r>
           </a:p>
         </p:txBody>
@@ -7343,7 +7451,7 @@
         </p:nvSpPr>
         <p:spPr>
           <a:xfrm>
-            <a:off x="7641715" y="98971"/>
+            <a:off x="161006" y="3165980"/>
             <a:ext cx="4550285" cy="800219"/>
           </a:xfrm>
           <a:prstGeom prst="rect">
@@ -7524,8 +7632,8 @@
         </p:nvCxnSpPr>
         <p:spPr>
           <a:xfrm>
-            <a:off x="4126035" y="4606591"/>
-            <a:ext cx="10455" cy="991470"/>
+            <a:off x="4126036" y="4606591"/>
+            <a:ext cx="8606" cy="815642"/>
           </a:xfrm>
           <a:prstGeom prst="straightConnector1">
             <a:avLst/>
@@ -7807,8 +7915,8 @@
         </p:nvSpPr>
         <p:spPr>
           <a:xfrm>
-            <a:off x="321013" y="544749"/>
-            <a:ext cx="4565352" cy="3970318"/>
+            <a:off x="157019" y="5016001"/>
+            <a:ext cx="8245014" cy="1754326"/>
           </a:xfrm>
           <a:prstGeom prst="rect">
             <a:avLst/>
@@ -7821,31 +7929,34 @@
           </a:bodyPr>
           <a:lstStyle/>
           <a:p>
-            <a:r>
-              <a:rPr lang="en-US" dirty="0"/>
-              <a:t>4 = </a:t>
+            <a:endParaRPr lang="en-US" dirty="0"/>
+          </a:p>
+          <a:p>
+            <a:r>
+              <a:rPr lang="en-US" dirty="0"/>
+              <a:t>10 = W1 * sin(alpha) 				- along positive </a:t>
             </a:r>
             <a:r>
               <a:rPr lang="en-US" dirty="0" err="1"/>
-              <a:t>Fout</a:t>
-            </a:r>
-            <a:r>
-              <a:rPr lang="en-US" dirty="0"/>
-              <a:t> * sin (alpha-theta)* cos(alpha – theta)</a:t>
-            </a:r>
-          </a:p>
-          <a:p>
-            <a:r>
-              <a:rPr lang="en-US" dirty="0"/>
-              <a:t>5 = </a:t>
+              <a:t>Xalpha</a:t>
+            </a:r>
+            <a:r>
+              <a:rPr lang="en-US" dirty="0"/>
+              <a:t> axis</a:t>
+            </a:r>
+          </a:p>
+          <a:p>
+            <a:r>
+              <a:rPr lang="en-US" dirty="0"/>
+              <a:t>11 = W1 * cos(alpha)				- along positive </a:t>
             </a:r>
             <a:r>
               <a:rPr lang="en-US" dirty="0" err="1"/>
-              <a:t>Fout</a:t>
-            </a:r>
-            <a:r>
-              <a:rPr lang="en-US" dirty="0"/>
-              <a:t> * sin (alpha-theta)* sin(alpha– theta)</a:t>
+              <a:t>Yalpha</a:t>
+            </a:r>
+            <a:r>
+              <a:rPr lang="en-US" dirty="0"/>
+              <a:t> axis</a:t>
             </a:r>
           </a:p>
           <a:p>
@@ -7854,74 +7965,29 @@
           <a:p>
             <a:r>
               <a:rPr lang="en-US" dirty="0"/>
-              <a:t>6 = </a:t>
+              <a:t>12 = W2 * sin(beta)				- along positive </a:t>
             </a:r>
             <a:r>
               <a:rPr lang="en-US" dirty="0" err="1"/>
-              <a:t>Fout</a:t>
-            </a:r>
-            <a:r>
-              <a:rPr lang="en-US" dirty="0"/>
-              <a:t> * cos (alpha-theta) * cos(beta-theta)</a:t>
-            </a:r>
-          </a:p>
-          <a:p>
-            <a:r>
-              <a:rPr lang="en-US" dirty="0"/>
-              <a:t>7 = </a:t>
+              <a:t>Xbeta</a:t>
+            </a:r>
+            <a:r>
+              <a:rPr lang="en-US" dirty="0"/>
+              <a:t> axis</a:t>
+            </a:r>
+          </a:p>
+          <a:p>
+            <a:r>
+              <a:rPr lang="en-US" dirty="0"/>
+              <a:t>13 = W2 * cos(beta)				- along positive </a:t>
             </a:r>
             <a:r>
               <a:rPr lang="en-US" dirty="0" err="1"/>
-              <a:t>Fout</a:t>
-            </a:r>
-            <a:r>
-              <a:rPr lang="en-US" dirty="0"/>
-              <a:t> * cos(alpha-theta) * sin(beta-theta)</a:t>
-            </a:r>
-          </a:p>
-          <a:p>
-            <a:endParaRPr lang="en-US" dirty="0"/>
-          </a:p>
-          <a:p>
-            <a:r>
-              <a:rPr lang="en-US" dirty="0"/>
-              <a:t>8 = W1</a:t>
-            </a:r>
-          </a:p>
-          <a:p>
-            <a:r>
-              <a:rPr lang="en-US" dirty="0"/>
-              <a:t>9 = W2</a:t>
-            </a:r>
-          </a:p>
-          <a:p>
-            <a:endParaRPr lang="en-US" dirty="0"/>
-          </a:p>
-          <a:p>
-            <a:r>
-              <a:rPr lang="en-US" dirty="0"/>
-              <a:t>10 = W1 * cos(90-alpha)</a:t>
-            </a:r>
-          </a:p>
-          <a:p>
-            <a:r>
-              <a:rPr lang="en-US" dirty="0"/>
-              <a:t>11 = W1 * sin(90-alpha)</a:t>
-            </a:r>
-          </a:p>
-          <a:p>
-            <a:endParaRPr lang="en-US" dirty="0"/>
-          </a:p>
-          <a:p>
-            <a:r>
-              <a:rPr lang="en-US" dirty="0"/>
-              <a:t>12 = W2 * cos(90-beta)</a:t>
-            </a:r>
-          </a:p>
-          <a:p>
-            <a:r>
-              <a:rPr lang="en-US" dirty="0"/>
-              <a:t>13 = W2 * sin(90-beta)</a:t>
+              <a:t>Ybeta</a:t>
+            </a:r>
+            <a:r>
+              <a:rPr lang="en-US" dirty="0"/>
+              <a:t> axis</a:t>
             </a:r>
           </a:p>
         </p:txBody>
@@ -8363,6 +8429,160 @@
             <a:r>
               <a:rPr lang="en-US" dirty="0"/>
               <a:t>6</a:t>
+            </a:r>
+          </a:p>
+        </p:txBody>
+      </p:sp>
+      <p:sp>
+        <p:nvSpPr>
+          <p:cNvPr id="39" name="TextBox 38">
+            <a:extLst>
+              <a:ext uri="{FF2B5EF4-FFF2-40B4-BE49-F238E27FC236}">
+                <a16:creationId xmlns:a16="http://schemas.microsoft.com/office/drawing/2014/main" id="{BBB63BB1-6A84-5D49-9902-3E32737D6685}"/>
+              </a:ext>
+            </a:extLst>
+          </p:cNvPr>
+          <p:cNvSpPr txBox="1"/>
+          <p:nvPr/>
+        </p:nvSpPr>
+        <p:spPr>
+          <a:xfrm>
+            <a:off x="321013" y="544749"/>
+            <a:ext cx="9807493" cy="2308324"/>
+          </a:xfrm>
+          <a:prstGeom prst="rect">
+            <a:avLst/>
+          </a:prstGeom>
+          <a:noFill/>
+        </p:spPr>
+        <p:txBody>
+          <a:bodyPr wrap="none" rtlCol="0">
+            <a:spAutoFit/>
+          </a:bodyPr>
+          <a:lstStyle/>
+          <a:p>
+            <a:r>
+              <a:rPr lang="en-US" dirty="0"/>
+              <a:t>4 = </a:t>
+            </a:r>
+            <a:r>
+              <a:rPr lang="en-US" dirty="0" err="1"/>
+              <a:t>Fout</a:t>
+            </a:r>
+            <a:r>
+              <a:rPr lang="en-US" dirty="0"/>
+              <a:t> * sin (alpha-theta)* cos(alpha – theta)		- along positive </a:t>
+            </a:r>
+            <a:r>
+              <a:rPr lang="en-US" dirty="0" err="1"/>
+              <a:t>Yalpha</a:t>
+            </a:r>
+            <a:r>
+              <a:rPr lang="en-US" dirty="0"/>
+              <a:t> axis</a:t>
+            </a:r>
+          </a:p>
+          <a:p>
+            <a:r>
+              <a:rPr lang="en-US" dirty="0"/>
+              <a:t>5 = </a:t>
+            </a:r>
+            <a:r>
+              <a:rPr lang="en-US" dirty="0" err="1"/>
+              <a:t>Fout</a:t>
+            </a:r>
+            <a:r>
+              <a:rPr lang="en-US" dirty="0"/>
+              <a:t> * sin (alpha-theta)* sin(alpha– theta)		- along positive </a:t>
+            </a:r>
+            <a:r>
+              <a:rPr lang="en-US" dirty="0" err="1"/>
+              <a:t>Xalpha</a:t>
+            </a:r>
+            <a:r>
+              <a:rPr lang="en-US" dirty="0"/>
+              <a:t> axis</a:t>
+            </a:r>
+          </a:p>
+          <a:p>
+            <a:endParaRPr lang="en-US" dirty="0"/>
+          </a:p>
+          <a:p>
+            <a:r>
+              <a:rPr lang="en-US" dirty="0"/>
+              <a:t>6 = </a:t>
+            </a:r>
+            <a:r>
+              <a:rPr lang="en-US" dirty="0" err="1"/>
+              <a:t>Fout</a:t>
+            </a:r>
+            <a:r>
+              <a:rPr lang="en-US" dirty="0"/>
+              <a:t> * cos (alpha-theta) * cos(beta-theta)		- along positive </a:t>
+            </a:r>
+            <a:r>
+              <a:rPr lang="en-US" dirty="0" err="1"/>
+              <a:t>Xbeta</a:t>
+            </a:r>
+            <a:r>
+              <a:rPr lang="en-US" dirty="0"/>
+              <a:t> axis</a:t>
+            </a:r>
+          </a:p>
+          <a:p>
+            <a:r>
+              <a:rPr lang="en-US" dirty="0"/>
+              <a:t>7 = </a:t>
+            </a:r>
+            <a:r>
+              <a:rPr lang="en-US" dirty="0" err="1"/>
+              <a:t>Fout</a:t>
+            </a:r>
+            <a:r>
+              <a:rPr lang="en-US" dirty="0"/>
+              <a:t> * cos(alpha-theta) * sin(90+beta-theta)		- along positive </a:t>
+            </a:r>
+            <a:r>
+              <a:rPr lang="en-US" dirty="0" err="1"/>
+              <a:t>Ybeta</a:t>
+            </a:r>
+            <a:r>
+              <a:rPr lang="en-US" dirty="0"/>
+              <a:t> axis (negative value</a:t>
+            </a:r>
+          </a:p>
+          <a:p>
+            <a:r>
+              <a:rPr lang="en-US" dirty="0"/>
+              <a:t>									into road)</a:t>
+            </a:r>
+          </a:p>
+          <a:p>
+            <a:r>
+              <a:rPr lang="en-US" dirty="0"/>
+              <a:t>8 = W1 						- along positive </a:t>
+            </a:r>
+            <a:r>
+              <a:rPr lang="en-US" dirty="0" err="1"/>
+              <a:t>Yworld</a:t>
+            </a:r>
+            <a:r>
+              <a:rPr lang="en-US" dirty="0"/>
+              <a:t> axis (negative value)</a:t>
+            </a:r>
+          </a:p>
+          <a:p>
+            <a:r>
+              <a:rPr lang="en-US" dirty="0"/>
+              <a:t>9 = W2 						- along positive </a:t>
+            </a:r>
+            <a:r>
+              <a:rPr lang="en-US" dirty="0" err="1"/>
+              <a:t>Xworld</a:t>
+            </a:r>
+            <a:r>
+              <a:rPr lang="en-US" dirty="0"/>
+              <a:t> axis (negative value)</a:t>
             </a:r>
           </a:p>
         </p:txBody>
@@ -8738,7 +8958,7 @@
         </p:nvSpPr>
         <p:spPr>
           <a:xfrm>
-            <a:off x="7641715" y="98971"/>
+            <a:off x="161006" y="3165980"/>
             <a:ext cx="4550285" cy="800219"/>
           </a:xfrm>
           <a:prstGeom prst="rect">
@@ -9110,8 +9330,8 @@
         </p:nvSpPr>
         <p:spPr>
           <a:xfrm>
-            <a:off x="321013" y="544749"/>
-            <a:ext cx="4565352" cy="3139321"/>
+            <a:off x="157019" y="5016001"/>
+            <a:ext cx="8245014" cy="1754326"/>
           </a:xfrm>
           <a:prstGeom prst="rect">
             <a:avLst/>
@@ -9124,31 +9344,34 @@
           </a:bodyPr>
           <a:lstStyle/>
           <a:p>
-            <a:r>
-              <a:rPr lang="en-US" dirty="0"/>
-              <a:t>4 = </a:t>
+            <a:endParaRPr lang="en-US" dirty="0"/>
+          </a:p>
+          <a:p>
+            <a:r>
+              <a:rPr lang="en-US" dirty="0"/>
+              <a:t>10 = W1 * sin(alpha) 				- along positive </a:t>
             </a:r>
             <a:r>
               <a:rPr lang="en-US" dirty="0" err="1"/>
-              <a:t>Fout</a:t>
-            </a:r>
-            <a:r>
-              <a:rPr lang="en-US" dirty="0"/>
-              <a:t> * sin (alpha-theta)* cos(alpha – theta)</a:t>
-            </a:r>
-          </a:p>
-          <a:p>
-            <a:r>
-              <a:rPr lang="en-US" dirty="0"/>
-              <a:t>5 = </a:t>
+              <a:t>Xalpha</a:t>
+            </a:r>
+            <a:r>
+              <a:rPr lang="en-US" dirty="0"/>
+              <a:t> axis</a:t>
+            </a:r>
+          </a:p>
+          <a:p>
+            <a:r>
+              <a:rPr lang="en-US" dirty="0"/>
+              <a:t>11 = W1 * cos(alpha)				- along positive </a:t>
             </a:r>
             <a:r>
               <a:rPr lang="en-US" dirty="0" err="1"/>
-              <a:t>Fout</a:t>
-            </a:r>
-            <a:r>
-              <a:rPr lang="en-US" dirty="0"/>
-              <a:t> * sin (alpha-theta)* sin(alpha– theta)</a:t>
+              <a:t>Yalpha</a:t>
+            </a:r>
+            <a:r>
+              <a:rPr lang="en-US" dirty="0"/>
+              <a:t> axis</a:t>
             </a:r>
           </a:p>
           <a:p>
@@ -9157,59 +9380,29 @@
           <a:p>
             <a:r>
               <a:rPr lang="en-US" dirty="0"/>
-              <a:t>6 = </a:t>
+              <a:t>12 = W2 * sin(beta)				- along positive </a:t>
             </a:r>
             <a:r>
               <a:rPr lang="en-US" dirty="0" err="1"/>
-              <a:t>Fout</a:t>
-            </a:r>
-            <a:r>
-              <a:rPr lang="en-US" dirty="0"/>
-              <a:t> * cos (alpha-theta) * cos(beta-theta)</a:t>
-            </a:r>
-          </a:p>
-          <a:p>
-            <a:r>
-              <a:rPr lang="en-US" dirty="0"/>
-              <a:t>7 = </a:t>
+              <a:t>Xbeta</a:t>
+            </a:r>
+            <a:r>
+              <a:rPr lang="en-US" dirty="0"/>
+              <a:t> axis</a:t>
+            </a:r>
+          </a:p>
+          <a:p>
+            <a:r>
+              <a:rPr lang="en-US" dirty="0"/>
+              <a:t>13 = W2 * cos(beta)				- along positive </a:t>
             </a:r>
             <a:r>
               <a:rPr lang="en-US" dirty="0" err="1"/>
-              <a:t>Fout</a:t>
-            </a:r>
-            <a:r>
-              <a:rPr lang="en-US" dirty="0"/>
-              <a:t> * cos(alpha-theta) * sin(beta-theta)</a:t>
-            </a:r>
-          </a:p>
-          <a:p>
-            <a:endParaRPr lang="en-US" dirty="0"/>
-          </a:p>
-          <a:p>
-            <a:r>
-              <a:rPr lang="en-US" dirty="0"/>
-              <a:t>10 = W1 * cos(90-alpha)</a:t>
-            </a:r>
-          </a:p>
-          <a:p>
-            <a:r>
-              <a:rPr lang="en-US" dirty="0"/>
-              <a:t>11 = W1 * sin(90-alpha)</a:t>
-            </a:r>
-          </a:p>
-          <a:p>
-            <a:endParaRPr lang="en-US" dirty="0"/>
-          </a:p>
-          <a:p>
-            <a:r>
-              <a:rPr lang="en-US" dirty="0"/>
-              <a:t>12 = W2 * cos(90-beta)</a:t>
-            </a:r>
-          </a:p>
-          <a:p>
-            <a:r>
-              <a:rPr lang="en-US" dirty="0"/>
-              <a:t>13 = W2 * sin(90-beta)</a:t>
+              <a:t>Ybeta</a:t>
+            </a:r>
+            <a:r>
+              <a:rPr lang="en-US" dirty="0"/>
+              <a:t> axis</a:t>
             </a:r>
           </a:p>
         </p:txBody>
@@ -9485,7 +9678,7 @@
           <p:cNvPr id="36" name="TextBox 35">
             <a:extLst>
               <a:ext uri="{FF2B5EF4-FFF2-40B4-BE49-F238E27FC236}">
-                <a16:creationId xmlns:a16="http://schemas.microsoft.com/office/drawing/2014/main" id="{4AADCBB0-E10B-F444-9F65-12183C7C674C}"/>
+                <a16:creationId xmlns:a16="http://schemas.microsoft.com/office/drawing/2014/main" id="{3FB19D84-51CA-824D-B5C5-C027D3C23A5D}"/>
               </a:ext>
             </a:extLst>
           </p:cNvPr>
@@ -9520,7 +9713,7 @@
           <p:cNvPr id="37" name="TextBox 36">
             <a:extLst>
               <a:ext uri="{FF2B5EF4-FFF2-40B4-BE49-F238E27FC236}">
-                <a16:creationId xmlns:a16="http://schemas.microsoft.com/office/drawing/2014/main" id="{329E1F6F-2830-0A4D-A248-9D59D3E8F098}"/>
+                <a16:creationId xmlns:a16="http://schemas.microsoft.com/office/drawing/2014/main" id="{EC33DB91-5B96-C24C-B079-8D9228108AB5}"/>
               </a:ext>
             </a:extLst>
           </p:cNvPr>
@@ -9555,7 +9748,7 @@
           <p:cNvPr id="38" name="TextBox 37">
             <a:extLst>
               <a:ext uri="{FF2B5EF4-FFF2-40B4-BE49-F238E27FC236}">
-                <a16:creationId xmlns:a16="http://schemas.microsoft.com/office/drawing/2014/main" id="{E3935950-AEA8-314D-A0F5-BE2856BC59F4}"/>
+                <a16:creationId xmlns:a16="http://schemas.microsoft.com/office/drawing/2014/main" id="{641ED7AF-2372-B54D-A9B8-9AEA3C3BAD58}"/>
               </a:ext>
             </a:extLst>
           </p:cNvPr>
@@ -9585,10 +9778,139 @@
           </a:p>
         </p:txBody>
       </p:sp>
+      <p:sp>
+        <p:nvSpPr>
+          <p:cNvPr id="39" name="TextBox 38">
+            <a:extLst>
+              <a:ext uri="{FF2B5EF4-FFF2-40B4-BE49-F238E27FC236}">
+                <a16:creationId xmlns:a16="http://schemas.microsoft.com/office/drawing/2014/main" id="{BBB63BB1-6A84-5D49-9902-3E32737D6685}"/>
+              </a:ext>
+            </a:extLst>
+          </p:cNvPr>
+          <p:cNvSpPr txBox="1"/>
+          <p:nvPr/>
+        </p:nvSpPr>
+        <p:spPr>
+          <a:xfrm>
+            <a:off x="321013" y="544749"/>
+            <a:ext cx="9615517" cy="2031325"/>
+          </a:xfrm>
+          <a:prstGeom prst="rect">
+            <a:avLst/>
+          </a:prstGeom>
+          <a:noFill/>
+        </p:spPr>
+        <p:txBody>
+          <a:bodyPr wrap="none" rtlCol="0">
+            <a:spAutoFit/>
+          </a:bodyPr>
+          <a:lstStyle/>
+          <a:p>
+            <a:r>
+              <a:rPr lang="en-US" dirty="0"/>
+              <a:t>4 = </a:t>
+            </a:r>
+            <a:r>
+              <a:rPr lang="en-US" dirty="0" err="1"/>
+              <a:t>Fout</a:t>
+            </a:r>
+            <a:r>
+              <a:rPr lang="en-US" dirty="0"/>
+              <a:t> * sin (alpha-theta)* cos(alpha – theta)		- along positive </a:t>
+            </a:r>
+            <a:r>
+              <a:rPr lang="en-US" dirty="0" err="1"/>
+              <a:t>Yalpha</a:t>
+            </a:r>
+            <a:r>
+              <a:rPr lang="en-US" dirty="0"/>
+              <a:t> axis</a:t>
+            </a:r>
+          </a:p>
+          <a:p>
+            <a:r>
+              <a:rPr lang="en-US" dirty="0"/>
+              <a:t>5 = </a:t>
+            </a:r>
+            <a:r>
+              <a:rPr lang="en-US" dirty="0" err="1"/>
+              <a:t>Fout</a:t>
+            </a:r>
+            <a:r>
+              <a:rPr lang="en-US" dirty="0"/>
+              <a:t> * sin (alpha-theta)* sin(alpha– theta)		- along positive </a:t>
+            </a:r>
+            <a:r>
+              <a:rPr lang="en-US" dirty="0" err="1"/>
+              <a:t>Xalpha</a:t>
+            </a:r>
+            <a:r>
+              <a:rPr lang="en-US" dirty="0"/>
+              <a:t> axis</a:t>
+            </a:r>
+          </a:p>
+          <a:p>
+            <a:endParaRPr lang="en-US" dirty="0"/>
+          </a:p>
+          <a:p>
+            <a:r>
+              <a:rPr lang="en-US" dirty="0"/>
+              <a:t>6 = </a:t>
+            </a:r>
+            <a:r>
+              <a:rPr lang="en-US" dirty="0" err="1"/>
+              <a:t>Fout</a:t>
+            </a:r>
+            <a:r>
+              <a:rPr lang="en-US" dirty="0"/>
+              <a:t> * cos (alpha-theta) * cos(beta-theta)		- along positive </a:t>
+            </a:r>
+            <a:r>
+              <a:rPr lang="en-US" dirty="0" err="1"/>
+              <a:t>Xbeta</a:t>
+            </a:r>
+            <a:r>
+              <a:rPr lang="en-US" dirty="0"/>
+              <a:t> axis</a:t>
+            </a:r>
+          </a:p>
+          <a:p>
+            <a:r>
+              <a:rPr lang="en-US" dirty="0"/>
+              <a:t>7 = </a:t>
+            </a:r>
+            <a:r>
+              <a:rPr lang="en-US" dirty="0" err="1"/>
+              <a:t>Fout</a:t>
+            </a:r>
+            <a:r>
+              <a:rPr lang="en-US" dirty="0"/>
+              <a:t> * cos(alpha-theta) * sin(90+beta-theta)		- along positive </a:t>
+            </a:r>
+            <a:r>
+              <a:rPr lang="en-US" dirty="0" err="1"/>
+              <a:t>Ybeta</a:t>
+            </a:r>
+            <a:r>
+              <a:rPr lang="en-US" dirty="0"/>
+              <a:t> axis (negative value</a:t>
+            </a:r>
+          </a:p>
+          <a:p>
+            <a:r>
+              <a:rPr lang="en-US" dirty="0"/>
+              <a:t>									into road)</a:t>
+            </a:r>
+          </a:p>
+          <a:p>
+            <a:endParaRPr lang="en-US" dirty="0"/>
+          </a:p>
+        </p:txBody>
+      </p:sp>
     </p:spTree>
     <p:extLst>
       <p:ext uri="{BB962C8B-B14F-4D97-AF65-F5344CB8AC3E}">
-        <p14:creationId xmlns:p14="http://schemas.microsoft.com/office/powerpoint/2010/main" val="1174978478"/>
+        <p14:creationId xmlns:p14="http://schemas.microsoft.com/office/powerpoint/2010/main" val="3380440513"/>
       </p:ext>
     </p:extLst>
   </p:cSld>
@@ -10138,8 +10460,8 @@
         </p:nvSpPr>
         <p:spPr>
           <a:xfrm>
-            <a:off x="7537787" y="278591"/>
-            <a:ext cx="4588392" cy="1477328"/>
+            <a:off x="7402843" y="4947868"/>
+            <a:ext cx="4588392" cy="1754326"/>
           </a:xfrm>
           <a:prstGeom prst="rect">
             <a:avLst/>
@@ -10154,7 +10476,7 @@
           <a:p>
             <a:r>
               <a:rPr lang="en-US" dirty="0"/>
-              <a:t>The forces at each axle can be combined to give 2 forces on each wheel</a:t>
+              <a:t>The forces at each axle can be summed to give 2 forces on each wheel</a:t>
             </a:r>
           </a:p>
           <a:p>
@@ -10163,13 +10485,7 @@
           <a:p>
             <a:r>
               <a:rPr lang="en-US" dirty="0"/>
-              <a:t>1 parallel to the ground at that wheel</a:t>
-            </a:r>
-          </a:p>
-          <a:p>
-            <a:r>
-              <a:rPr lang="en-US" dirty="0"/>
-              <a:t>1 perpendicular to the ground at that wheel</a:t>
+              <a:t>All directions are along the positive axis – negative values will indicate directions along the negative axis.</a:t>
             </a:r>
           </a:p>
         </p:txBody>
@@ -10381,7 +10697,7 @@
         <p:spPr>
           <a:xfrm>
             <a:off x="321013" y="544749"/>
-            <a:ext cx="1212191" cy="1200329"/>
+            <a:ext cx="6492098" cy="1200329"/>
           </a:xfrm>
           <a:prstGeom prst="rect">
             <a:avLst/>
@@ -10396,25 +10712,57 @@
           <a:p>
             <a:r>
               <a:rPr lang="en-US" dirty="0"/>
-              <a:t>14 = 5 - 10</a:t>
-            </a:r>
-          </a:p>
-          <a:p>
-            <a:r>
-              <a:rPr lang="en-US" dirty="0"/>
-              <a:t>15 = 4 – 11</a:t>
-            </a:r>
-          </a:p>
-          <a:p>
-            <a:r>
-              <a:rPr lang="en-US" dirty="0"/>
-              <a:t>16 = 7 + 13</a:t>
-            </a:r>
-          </a:p>
-          <a:p>
-            <a:r>
-              <a:rPr lang="en-US" dirty="0"/>
-              <a:t>17 = 6 - 12</a:t>
+              <a:t>14 = </a:t>
+            </a:r>
+            <a:r>
+              <a:rPr lang="en-US" dirty="0" err="1"/>
+              <a:t>Fout</a:t>
+            </a:r>
+            <a:r>
+              <a:rPr lang="en-US" dirty="0"/>
+              <a:t> * sin (alpha-theta)* sin(alpha– theta) +  W1 * sin(alpha) </a:t>
+            </a:r>
+          </a:p>
+          <a:p>
+            <a:r>
+              <a:rPr lang="en-US" dirty="0"/>
+              <a:t>15 = </a:t>
+            </a:r>
+            <a:r>
+              <a:rPr lang="en-US" dirty="0" err="1"/>
+              <a:t>Fout</a:t>
+            </a:r>
+            <a:r>
+              <a:rPr lang="en-US" dirty="0"/>
+              <a:t> * sin (alpha-theta)* cos(alpha – theta) + W1 * cos(alpha)</a:t>
+            </a:r>
+          </a:p>
+          <a:p>
+            <a:r>
+              <a:rPr lang="en-US" dirty="0"/>
+              <a:t>16 = </a:t>
+            </a:r>
+            <a:r>
+              <a:rPr lang="en-US" dirty="0" err="1"/>
+              <a:t>Fout</a:t>
+            </a:r>
+            <a:r>
+              <a:rPr lang="en-US" dirty="0"/>
+              <a:t> * cos(alpha-theta) * sin(90+beta-theta) + W2 * cos(beta)</a:t>
+            </a:r>
+          </a:p>
+          <a:p>
+            <a:r>
+              <a:rPr lang="en-US" dirty="0"/>
+              <a:t>17 = </a:t>
+            </a:r>
+            <a:r>
+              <a:rPr lang="en-US" dirty="0" err="1"/>
+              <a:t>Fout</a:t>
+            </a:r>
+            <a:r>
+              <a:rPr lang="en-US" dirty="0"/>
+              <a:t> * cos (alpha-theta) * cos(beta-theta) + W2 * sin(beta)</a:t>
             </a:r>
           </a:p>
         </p:txBody>
@@ -10791,9 +11139,9 @@
           <p:nvPr/>
         </p:nvCxnSpPr>
         <p:spPr>
-          <a:xfrm>
-            <a:off x="4132634" y="4616118"/>
-            <a:ext cx="201241" cy="184482"/>
+          <a:xfrm flipH="1" flipV="1">
+            <a:off x="3773595" y="4307211"/>
+            <a:ext cx="359039" cy="308907"/>
           </a:xfrm>
           <a:prstGeom prst="straightConnector1">
             <a:avLst/>
@@ -10879,9 +11227,9 @@
           <p:nvPr/>
         </p:nvCxnSpPr>
         <p:spPr>
-          <a:xfrm>
-            <a:off x="6954275" y="4067414"/>
-            <a:ext cx="335966" cy="272680"/>
+          <a:xfrm flipH="1" flipV="1">
+            <a:off x="6619067" y="3820240"/>
+            <a:ext cx="335208" cy="247174"/>
           </a:xfrm>
           <a:prstGeom prst="straightConnector1">
             <a:avLst/>
@@ -10926,9 +11274,9 @@
           <p:nvPr/>
         </p:nvCxnSpPr>
         <p:spPr>
-          <a:xfrm flipH="1">
-            <a:off x="3914775" y="4593478"/>
-            <a:ext cx="199111" cy="207122"/>
+          <a:xfrm flipV="1">
+            <a:off x="4113887" y="4340094"/>
+            <a:ext cx="219988" cy="253384"/>
           </a:xfrm>
           <a:prstGeom prst="straightConnector1">
             <a:avLst/>
@@ -10972,8 +11320,8 @@
         </p:nvSpPr>
         <p:spPr>
           <a:xfrm>
-            <a:off x="2104631" y="1085987"/>
-            <a:ext cx="7435049" cy="369332"/>
+            <a:off x="1948989" y="366140"/>
+            <a:ext cx="7382149" cy="1477328"/>
           </a:xfrm>
           <a:prstGeom prst="rect">
             <a:avLst/>
@@ -10989,6 +11337,24 @@
             <a:r>
               <a:rPr lang="en-US" dirty="0"/>
               <a:t>Any forces into the ground will be cancelled by equal/opposite normal forces</a:t>
+            </a:r>
+          </a:p>
+          <a:p>
+            <a:endParaRPr lang="en-US" dirty="0"/>
+          </a:p>
+          <a:p>
+            <a:r>
+              <a:rPr lang="en-US" dirty="0"/>
+              <a:t>Any NEGATIVE values along the Y axis should be cancelled</a:t>
+            </a:r>
+          </a:p>
+          <a:p>
+            <a:endParaRPr lang="en-US" dirty="0"/>
+          </a:p>
+          <a:p>
+            <a:r>
+              <a:rPr lang="en-US" dirty="0"/>
+              <a:t>15 and 16 must both be GREATER than 0, otherwise they must be 0.</a:t>
             </a:r>
           </a:p>
         </p:txBody>
@@ -11155,7 +11521,7 @@
         </p:nvSpPr>
         <p:spPr>
           <a:xfrm>
-            <a:off x="3575980" y="4327707"/>
+            <a:off x="4285544" y="3969185"/>
             <a:ext cx="418704" cy="369332"/>
           </a:xfrm>
           <a:prstGeom prst="rect">
@@ -11190,7 +11556,7 @@
         </p:nvSpPr>
         <p:spPr>
           <a:xfrm>
-            <a:off x="4253373" y="4499629"/>
+            <a:off x="3709466" y="4022725"/>
             <a:ext cx="418704" cy="369332"/>
           </a:xfrm>
           <a:prstGeom prst="rect">
@@ -11225,7 +11591,7 @@
         </p:nvSpPr>
         <p:spPr>
           <a:xfrm>
-            <a:off x="6762254" y="4211373"/>
+            <a:off x="6411434" y="3910822"/>
             <a:ext cx="418704" cy="369332"/>
           </a:xfrm>
           <a:prstGeom prst="rect">
@@ -11710,10 +12076,10 @@
       </p:sp>
       <p:cxnSp>
         <p:nvCxnSpPr>
-          <p:cNvPr id="31" name="Straight Arrow Connector 30">
-            <a:extLst>
-              <a:ext uri="{FF2B5EF4-FFF2-40B4-BE49-F238E27FC236}">
-                <a16:creationId xmlns:a16="http://schemas.microsoft.com/office/drawing/2014/main" id="{AD038506-55C1-4874-B057-B99FE232635B}"/>
+          <p:cNvPr id="24" name="Straight Arrow Connector 23">
+            <a:extLst>
+              <a:ext uri="{FF2B5EF4-FFF2-40B4-BE49-F238E27FC236}">
+                <a16:creationId xmlns:a16="http://schemas.microsoft.com/office/drawing/2014/main" id="{F50A586A-1E0D-4304-84D3-24073D0D449F}"/>
               </a:ext>
             </a:extLst>
           </p:cNvPr>
@@ -11723,9 +12089,9 @@
           <p:nvPr/>
         </p:nvCxnSpPr>
         <p:spPr>
-          <a:xfrm flipV="1">
-            <a:off x="6974825" y="3762375"/>
-            <a:ext cx="207025" cy="310948"/>
+          <a:xfrm flipH="1" flipV="1">
+            <a:off x="3773595" y="4307211"/>
+            <a:ext cx="359039" cy="308907"/>
           </a:xfrm>
           <a:prstGeom prst="straightConnector1">
             <a:avLst/>
@@ -11754,10 +12120,10 @@
       </p:cxnSp>
       <p:cxnSp>
         <p:nvCxnSpPr>
-          <p:cNvPr id="23" name="Straight Arrow Connector 22">
-            <a:extLst>
-              <a:ext uri="{FF2B5EF4-FFF2-40B4-BE49-F238E27FC236}">
-                <a16:creationId xmlns:a16="http://schemas.microsoft.com/office/drawing/2014/main" id="{5BEB0799-5403-4093-96E8-FC94C18849D2}"/>
+          <p:cNvPr id="31" name="Straight Arrow Connector 30">
+            <a:extLst>
+              <a:ext uri="{FF2B5EF4-FFF2-40B4-BE49-F238E27FC236}">
+                <a16:creationId xmlns:a16="http://schemas.microsoft.com/office/drawing/2014/main" id="{AD038506-55C1-4874-B057-B99FE232635B}"/>
               </a:ext>
             </a:extLst>
           </p:cNvPr>
@@ -11767,9 +12133,53 @@
           <p:nvPr/>
         </p:nvCxnSpPr>
         <p:spPr>
-          <a:xfrm flipH="1">
-            <a:off x="3914775" y="4593478"/>
-            <a:ext cx="199111" cy="207122"/>
+          <a:xfrm flipV="1">
+            <a:off x="6974825" y="3762375"/>
+            <a:ext cx="207025" cy="310948"/>
+          </a:xfrm>
+          <a:prstGeom prst="straightConnector1">
+            <a:avLst/>
+          </a:prstGeom>
+          <a:ln w="44450">
+            <a:solidFill>
+              <a:schemeClr val="accent2"/>
+            </a:solidFill>
+            <a:tailEnd type="triangle"/>
+          </a:ln>
+        </p:spPr>
+        <p:style>
+          <a:lnRef idx="1">
+            <a:schemeClr val="accent1"/>
+          </a:lnRef>
+          <a:fillRef idx="0">
+            <a:schemeClr val="accent1"/>
+          </a:fillRef>
+          <a:effectRef idx="0">
+            <a:schemeClr val="accent1"/>
+          </a:effectRef>
+          <a:fontRef idx="minor">
+            <a:schemeClr val="tx1"/>
+          </a:fontRef>
+        </p:style>
+      </p:cxnSp>
+      <p:cxnSp>
+        <p:nvCxnSpPr>
+          <p:cNvPr id="17" name="Straight Arrow Connector 16">
+            <a:extLst>
+              <a:ext uri="{FF2B5EF4-FFF2-40B4-BE49-F238E27FC236}">
+                <a16:creationId xmlns:a16="http://schemas.microsoft.com/office/drawing/2014/main" id="{1EFBF96D-D51B-4038-808B-B86FEB05F151}"/>
+              </a:ext>
+            </a:extLst>
+          </p:cNvPr>
+          <p:cNvCxnSpPr>
+            <a:cxnSpLocks/>
+          </p:cNvCxnSpPr>
+          <p:nvPr/>
+        </p:nvCxnSpPr>
+        <p:spPr>
+          <a:xfrm flipH="1" flipV="1">
+            <a:off x="6619067" y="3820240"/>
+            <a:ext cx="335208" cy="247174"/>
           </a:xfrm>
           <a:prstGeom prst="straightConnector1">
             <a:avLst/>
@@ -11799,6 +12209,53 @@
           </a:fontRef>
         </p:style>
       </p:cxnSp>
+      <p:cxnSp>
+        <p:nvCxnSpPr>
+          <p:cNvPr id="23" name="Straight Arrow Connector 22">
+            <a:extLst>
+              <a:ext uri="{FF2B5EF4-FFF2-40B4-BE49-F238E27FC236}">
+                <a16:creationId xmlns:a16="http://schemas.microsoft.com/office/drawing/2014/main" id="{5BEB0799-5403-4093-96E8-FC94C18849D2}"/>
+              </a:ext>
+            </a:extLst>
+          </p:cNvPr>
+          <p:cNvCxnSpPr>
+            <a:cxnSpLocks/>
+          </p:cNvCxnSpPr>
+          <p:nvPr/>
+        </p:nvCxnSpPr>
+        <p:spPr>
+          <a:xfrm flipV="1">
+            <a:off x="4113887" y="4340094"/>
+            <a:ext cx="219988" cy="253384"/>
+          </a:xfrm>
+          <a:prstGeom prst="straightConnector1">
+            <a:avLst/>
+          </a:prstGeom>
+          <a:ln w="44450">
+            <a:solidFill>
+              <a:schemeClr val="accent6">
+                <a:lumMod val="60000"/>
+                <a:lumOff val="40000"/>
+              </a:schemeClr>
+            </a:solidFill>
+            <a:tailEnd type="triangle"/>
+          </a:ln>
+        </p:spPr>
+        <p:style>
+          <a:lnRef idx="1">
+            <a:schemeClr val="accent1"/>
+          </a:lnRef>
+          <a:fillRef idx="0">
+            <a:schemeClr val="accent1"/>
+          </a:fillRef>
+          <a:effectRef idx="0">
+            <a:schemeClr val="accent1"/>
+          </a:effectRef>
+          <a:fontRef idx="minor">
+            <a:schemeClr val="tx1"/>
+          </a:fontRef>
+        </p:style>
+      </p:cxnSp>
       <p:sp>
         <p:nvSpPr>
           <p:cNvPr id="18" name="TextBox 17">
@@ -11813,8 +12270,8 @@
         </p:nvSpPr>
         <p:spPr>
           <a:xfrm>
-            <a:off x="2104631" y="1085987"/>
-            <a:ext cx="8934562" cy="369332"/>
+            <a:off x="217272" y="137492"/>
+            <a:ext cx="8420696" cy="2862322"/>
           </a:xfrm>
           <a:prstGeom prst="rect">
             <a:avLst/>
@@ -11822,15 +12279,128 @@
           <a:noFill/>
         </p:spPr>
         <p:txBody>
-          <a:bodyPr wrap="none" rtlCol="0">
+          <a:bodyPr wrap="square" rtlCol="0">
             <a:spAutoFit/>
           </a:bodyPr>
           <a:lstStyle/>
           <a:p>
             <a:r>
               <a:rPr lang="en-US" dirty="0"/>
-              <a:t>Any remaining forces into the ground will again be cancelled by equal/opposite normal forces</a:t>
-            </a:r>
+              <a:t>14x = (</a:t>
+            </a:r>
+            <a:r>
+              <a:rPr lang="en-US" dirty="0" err="1"/>
+              <a:t>Fout</a:t>
+            </a:r>
+            <a:r>
+              <a:rPr lang="en-US" dirty="0"/>
+              <a:t> * sin (alpha-theta)* sin(alpha– theta) +  W1 * sin(alpha))	* cos(alpha)</a:t>
+            </a:r>
+          </a:p>
+          <a:p>
+            <a:r>
+              <a:rPr lang="en-US" dirty="0"/>
+              <a:t>14y = (</a:t>
+            </a:r>
+            <a:r>
+              <a:rPr lang="en-US" dirty="0" err="1"/>
+              <a:t>Fout</a:t>
+            </a:r>
+            <a:r>
+              <a:rPr lang="en-US" dirty="0"/>
+              <a:t> * sin (alpha-theta)* sin(alpha– theta) +  W1 * sin(alpha)) 	* sin(alpha)</a:t>
+            </a:r>
+          </a:p>
+          <a:p>
+            <a:r>
+              <a:rPr lang="en-US" dirty="0"/>
+              <a:t>15x = (</a:t>
+            </a:r>
+            <a:r>
+              <a:rPr lang="en-US" dirty="0" err="1"/>
+              <a:t>Fout</a:t>
+            </a:r>
+            <a:r>
+              <a:rPr lang="en-US" dirty="0"/>
+              <a:t> * sin (alpha-theta)* cos(alpha – theta) + W1 * cos(alpha))* sin(alpha)</a:t>
+            </a:r>
+          </a:p>
+          <a:p>
+            <a:r>
+              <a:rPr lang="en-US" dirty="0"/>
+              <a:t>15y = (</a:t>
+            </a:r>
+            <a:r>
+              <a:rPr lang="en-US" dirty="0" err="1"/>
+              <a:t>Fout</a:t>
+            </a:r>
+            <a:r>
+              <a:rPr lang="en-US" dirty="0"/>
+              <a:t> * sin (alpha-theta)* cos(alpha – theta) + W1 * cos(alpha))* cos(alpha)</a:t>
+            </a:r>
+          </a:p>
+          <a:p>
+            <a:r>
+              <a:rPr lang="en-US" dirty="0"/>
+              <a:t>16x = (</a:t>
+            </a:r>
+            <a:r>
+              <a:rPr lang="en-US" dirty="0" err="1"/>
+              <a:t>Fout</a:t>
+            </a:r>
+            <a:r>
+              <a:rPr lang="en-US" dirty="0"/>
+              <a:t> * cos(alpha-theta) * sin(90+beta-theta) + W2 * cos(beta))* sin(beta)</a:t>
+            </a:r>
+          </a:p>
+          <a:p>
+            <a:r>
+              <a:rPr lang="en-US" dirty="0"/>
+              <a:t>16y = (</a:t>
+            </a:r>
+            <a:r>
+              <a:rPr lang="en-US" dirty="0" err="1"/>
+              <a:t>Fout</a:t>
+            </a:r>
+            <a:r>
+              <a:rPr lang="en-US" dirty="0"/>
+              <a:t> * cos(alpha-theta) * sin(90+beta-theta) + W2 * cos(beta))* cos(beta)</a:t>
+            </a:r>
+          </a:p>
+          <a:p>
+            <a:r>
+              <a:rPr lang="en-US" dirty="0"/>
+              <a:t>17x = (</a:t>
+            </a:r>
+            <a:r>
+              <a:rPr lang="en-US" dirty="0" err="1"/>
+              <a:t>Fout</a:t>
+            </a:r>
+            <a:r>
+              <a:rPr lang="en-US" dirty="0"/>
+              <a:t> * cos (alpha-theta) * cos(beta-theta) + W2 * sin(beta)) 	* cos(beta)</a:t>
+            </a:r>
+          </a:p>
+          <a:p>
+            <a:r>
+              <a:rPr lang="en-US" dirty="0"/>
+              <a:t>17y = (</a:t>
+            </a:r>
+            <a:r>
+              <a:rPr lang="en-US" dirty="0" err="1"/>
+              <a:t>Fout</a:t>
+            </a:r>
+            <a:r>
+              <a:rPr lang="en-US" dirty="0"/>
+              <a:t> * cos (alpha-theta) * cos(beta-theta) + W2 * sin(beta)) 	* sin(beta)</a:t>
+            </a:r>
+            <a:endParaRPr lang="en-US" b="1" dirty="0"/>
+          </a:p>
+          <a:p>
+            <a:endParaRPr lang="en-US" dirty="0"/>
+          </a:p>
+          <a:p>
+            <a:endParaRPr lang="en-US" dirty="0"/>
           </a:p>
         </p:txBody>
       </p:sp>
@@ -11839,7 +12409,7 @@
           <p:cNvPr id="20" name="Oval 19">
             <a:extLst>
               <a:ext uri="{FF2B5EF4-FFF2-40B4-BE49-F238E27FC236}">
-                <a16:creationId xmlns:a16="http://schemas.microsoft.com/office/drawing/2014/main" id="{A7BC1359-684D-42A1-AAA4-E117CA39024F}"/>
+                <a16:creationId xmlns:a16="http://schemas.microsoft.com/office/drawing/2014/main" id="{E9A72DDE-E619-409E-AA02-3D3F73CC15D5}"/>
               </a:ext>
             </a:extLst>
           </p:cNvPr>
@@ -11888,10 +12458,10 @@
       </p:sp>
       <p:sp>
         <p:nvSpPr>
-          <p:cNvPr id="13" name="TextBox 12">
-            <a:extLst>
-              <a:ext uri="{FF2B5EF4-FFF2-40B4-BE49-F238E27FC236}">
-                <a16:creationId xmlns:a16="http://schemas.microsoft.com/office/drawing/2014/main" id="{71E2ED91-654C-8641-B807-548A0BF7E113}"/>
+          <p:cNvPr id="22" name="TextBox 21">
+            <a:extLst>
+              <a:ext uri="{FF2B5EF4-FFF2-40B4-BE49-F238E27FC236}">
+                <a16:creationId xmlns:a16="http://schemas.microsoft.com/office/drawing/2014/main" id="{7699484E-5ECE-024B-8482-8D7EF5BC55F4}"/>
               </a:ext>
             </a:extLst>
           </p:cNvPr>
@@ -11900,7 +12470,7 @@
         </p:nvSpPr>
         <p:spPr>
           <a:xfrm>
-            <a:off x="3575980" y="4327707"/>
+            <a:off x="4285544" y="3969185"/>
             <a:ext cx="418704" cy="369332"/>
           </a:xfrm>
           <a:prstGeom prst="rect">
@@ -11923,10 +12493,10 @@
       </p:sp>
       <p:sp>
         <p:nvSpPr>
-          <p:cNvPr id="16" name="TextBox 15">
-            <a:extLst>
-              <a:ext uri="{FF2B5EF4-FFF2-40B4-BE49-F238E27FC236}">
-                <a16:creationId xmlns:a16="http://schemas.microsoft.com/office/drawing/2014/main" id="{5BD89D81-3D2B-C34F-ADDA-9ADC31303C6C}"/>
+          <p:cNvPr id="25" name="TextBox 24">
+            <a:extLst>
+              <a:ext uri="{FF2B5EF4-FFF2-40B4-BE49-F238E27FC236}">
+                <a16:creationId xmlns:a16="http://schemas.microsoft.com/office/drawing/2014/main" id="{3BC738D1-99BD-144B-86E2-6DB8CE9FC2D4}"/>
               </a:ext>
             </a:extLst>
           </p:cNvPr>
@@ -11935,7 +12505,7 @@
         </p:nvSpPr>
         <p:spPr>
           <a:xfrm>
-            <a:off x="6783658" y="3511034"/>
+            <a:off x="3709466" y="4022725"/>
             <a:ext cx="418704" cy="369332"/>
           </a:xfrm>
           <a:prstGeom prst="rect">
@@ -11951,7 +12521,112 @@
           <a:p>
             <a:r>
               <a:rPr lang="en-US" dirty="0"/>
+              <a:t>15</a:t>
+            </a:r>
+          </a:p>
+        </p:txBody>
+      </p:sp>
+      <p:sp>
+        <p:nvSpPr>
+          <p:cNvPr id="26" name="TextBox 25">
+            <a:extLst>
+              <a:ext uri="{FF2B5EF4-FFF2-40B4-BE49-F238E27FC236}">
+                <a16:creationId xmlns:a16="http://schemas.microsoft.com/office/drawing/2014/main" id="{0D65575D-E71B-1443-995F-AD2D2D74C099}"/>
+              </a:ext>
+            </a:extLst>
+          </p:cNvPr>
+          <p:cNvSpPr txBox="1"/>
+          <p:nvPr/>
+        </p:nvSpPr>
+        <p:spPr>
+          <a:xfrm>
+            <a:off x="6411434" y="3910822"/>
+            <a:ext cx="418704" cy="369332"/>
+          </a:xfrm>
+          <a:prstGeom prst="rect">
+            <a:avLst/>
+          </a:prstGeom>
+          <a:noFill/>
+        </p:spPr>
+        <p:txBody>
+          <a:bodyPr wrap="none" rtlCol="0">
+            <a:spAutoFit/>
+          </a:bodyPr>
+          <a:lstStyle/>
+          <a:p>
+            <a:r>
+              <a:rPr lang="en-US" dirty="0"/>
+              <a:t>16</a:t>
+            </a:r>
+          </a:p>
+        </p:txBody>
+      </p:sp>
+      <p:sp>
+        <p:nvSpPr>
+          <p:cNvPr id="27" name="TextBox 26">
+            <a:extLst>
+              <a:ext uri="{FF2B5EF4-FFF2-40B4-BE49-F238E27FC236}">
+                <a16:creationId xmlns:a16="http://schemas.microsoft.com/office/drawing/2014/main" id="{8831D832-1342-FA41-9DCC-AA9C5D356149}"/>
+              </a:ext>
+            </a:extLst>
+          </p:cNvPr>
+          <p:cNvSpPr txBox="1"/>
+          <p:nvPr/>
+        </p:nvSpPr>
+        <p:spPr>
+          <a:xfrm>
+            <a:off x="6783658" y="3511034"/>
+            <a:ext cx="418704" cy="369332"/>
+          </a:xfrm>
+          <a:prstGeom prst="rect">
+            <a:avLst/>
+          </a:prstGeom>
+          <a:noFill/>
+        </p:spPr>
+        <p:txBody>
+          <a:bodyPr wrap="none" rtlCol="0">
+            <a:spAutoFit/>
+          </a:bodyPr>
+          <a:lstStyle/>
+          <a:p>
+            <a:r>
+              <a:rPr lang="en-US" dirty="0"/>
               <a:t>17</a:t>
+            </a:r>
+          </a:p>
+        </p:txBody>
+      </p:sp>
+      <p:sp>
+        <p:nvSpPr>
+          <p:cNvPr id="30" name="TextBox 29">
+            <a:extLst>
+              <a:ext uri="{FF2B5EF4-FFF2-40B4-BE49-F238E27FC236}">
+                <a16:creationId xmlns:a16="http://schemas.microsoft.com/office/drawing/2014/main" id="{E592A4AF-29B6-544F-AF78-6C67492FD279}"/>
+              </a:ext>
+            </a:extLst>
+          </p:cNvPr>
+          <p:cNvSpPr txBox="1"/>
+          <p:nvPr/>
+        </p:nvSpPr>
+        <p:spPr>
+          <a:xfrm>
+            <a:off x="4756306" y="5864590"/>
+            <a:ext cx="5921108" cy="369332"/>
+          </a:xfrm>
+          <a:prstGeom prst="rect">
+            <a:avLst/>
+          </a:prstGeom>
+          <a:noFill/>
+        </p:spPr>
+        <p:txBody>
+          <a:bodyPr wrap="none" rtlCol="0">
+            <a:spAutoFit/>
+          </a:bodyPr>
+          <a:lstStyle/>
+          <a:p>
+            <a:r>
+              <a:rPr lang="en-US" dirty="0"/>
+              <a:t>The remaining forces can be broken into X and Y components</a:t>
             </a:r>
           </a:p>
         </p:txBody>
@@ -11959,7 +12634,7 @@
     </p:spTree>
     <p:extLst>
       <p:ext uri="{BB962C8B-B14F-4D97-AF65-F5344CB8AC3E}">
-        <p14:creationId xmlns:p14="http://schemas.microsoft.com/office/powerpoint/2010/main" val="2353451844"/>
+        <p14:creationId xmlns:p14="http://schemas.microsoft.com/office/powerpoint/2010/main" val="3025247753"/>
       </p:ext>
     </p:extLst>
   </p:cSld>
@@ -12313,12 +12988,105 @@
           </a:p>
         </p:txBody>
       </p:sp>
+      <p:sp>
+        <p:nvSpPr>
+          <p:cNvPr id="18" name="TextBox 17">
+            <a:extLst>
+              <a:ext uri="{FF2B5EF4-FFF2-40B4-BE49-F238E27FC236}">
+                <a16:creationId xmlns:a16="http://schemas.microsoft.com/office/drawing/2014/main" id="{5DCF6378-8300-424B-8E82-E506650E4F8A}"/>
+              </a:ext>
+            </a:extLst>
+          </p:cNvPr>
+          <p:cNvSpPr txBox="1"/>
+          <p:nvPr/>
+        </p:nvSpPr>
+        <p:spPr>
+          <a:xfrm>
+            <a:off x="2104631" y="1085987"/>
+            <a:ext cx="8004820" cy="646331"/>
+          </a:xfrm>
+          <a:prstGeom prst="rect">
+            <a:avLst/>
+          </a:prstGeom>
+          <a:noFill/>
+        </p:spPr>
+        <p:txBody>
+          <a:bodyPr wrap="none" rtlCol="0">
+            <a:spAutoFit/>
+          </a:bodyPr>
+          <a:lstStyle/>
+          <a:p>
+            <a:r>
+              <a:rPr lang="en-US" dirty="0"/>
+              <a:t>These forces can be relocated to the CG of the vehicle</a:t>
+            </a:r>
+          </a:p>
+          <a:p>
+            <a:r>
+              <a:rPr lang="en-US" dirty="0"/>
+              <a:t>(but we will need to add a force couple which will be calculated by the ‘lever’ arms)</a:t>
+            </a:r>
+          </a:p>
+        </p:txBody>
+      </p:sp>
+      <p:sp>
+        <p:nvSpPr>
+          <p:cNvPr id="20" name="Oval 19">
+            <a:extLst>
+              <a:ext uri="{FF2B5EF4-FFF2-40B4-BE49-F238E27FC236}">
+                <a16:creationId xmlns:a16="http://schemas.microsoft.com/office/drawing/2014/main" id="{A7BC1359-684D-42A1-AAA4-E117CA39024F}"/>
+              </a:ext>
+            </a:extLst>
+          </p:cNvPr>
+          <p:cNvSpPr/>
+          <p:nvPr/>
+        </p:nvSpPr>
+        <p:spPr>
+          <a:xfrm>
+            <a:off x="5320967" y="3609975"/>
+            <a:ext cx="152400" cy="152400"/>
+          </a:xfrm>
+          <a:prstGeom prst="ellipse">
+            <a:avLst/>
+          </a:prstGeom>
+          <a:solidFill>
+            <a:schemeClr val="accent1">
+              <a:lumMod val="60000"/>
+              <a:lumOff val="40000"/>
+            </a:schemeClr>
+          </a:solidFill>
+        </p:spPr>
+        <p:style>
+          <a:lnRef idx="2">
+            <a:schemeClr val="accent1">
+              <a:shade val="50000"/>
+            </a:schemeClr>
+          </a:lnRef>
+          <a:fillRef idx="1">
+            <a:schemeClr val="accent1"/>
+          </a:fillRef>
+          <a:effectRef idx="0">
+            <a:schemeClr val="accent1"/>
+          </a:effectRef>
+          <a:fontRef idx="minor">
+            <a:schemeClr val="lt1"/>
+          </a:fontRef>
+        </p:style>
+        <p:txBody>
+          <a:bodyPr rtlCol="0" anchor="ctr"/>
+          <a:lstStyle/>
+          <a:p>
+            <a:pPr algn="ctr"/>
+            <a:endParaRPr lang="en-US"/>
+          </a:p>
+        </p:txBody>
+      </p:sp>
       <p:cxnSp>
         <p:nvCxnSpPr>
-          <p:cNvPr id="31" name="Straight Arrow Connector 30">
-            <a:extLst>
-              <a:ext uri="{FF2B5EF4-FFF2-40B4-BE49-F238E27FC236}">
-                <a16:creationId xmlns:a16="http://schemas.microsoft.com/office/drawing/2014/main" id="{AD038506-55C1-4874-B057-B99FE232635B}"/>
+          <p:cNvPr id="13" name="Straight Arrow Connector 12">
+            <a:extLst>
+              <a:ext uri="{FF2B5EF4-FFF2-40B4-BE49-F238E27FC236}">
+                <a16:creationId xmlns:a16="http://schemas.microsoft.com/office/drawing/2014/main" id="{428D3928-A9C7-416F-B8A8-380B17739028}"/>
               </a:ext>
             </a:extLst>
           </p:cNvPr>
@@ -12328,9 +13096,9 @@
           <p:nvPr/>
         </p:nvCxnSpPr>
         <p:spPr>
-          <a:xfrm flipV="1">
-            <a:off x="6974825" y="3762375"/>
-            <a:ext cx="207025" cy="310948"/>
+          <a:xfrm flipH="1">
+            <a:off x="3886780" y="4605889"/>
+            <a:ext cx="227106" cy="0"/>
           </a:xfrm>
           <a:prstGeom prst="straightConnector1">
             <a:avLst/>
@@ -12359,10 +13127,10 @@
       </p:cxnSp>
       <p:cxnSp>
         <p:nvCxnSpPr>
-          <p:cNvPr id="23" name="Straight Arrow Connector 22">
-            <a:extLst>
-              <a:ext uri="{FF2B5EF4-FFF2-40B4-BE49-F238E27FC236}">
-                <a16:creationId xmlns:a16="http://schemas.microsoft.com/office/drawing/2014/main" id="{5BEB0799-5403-4093-96E8-FC94C18849D2}"/>
+          <p:cNvPr id="16" name="Straight Arrow Connector 15">
+            <a:extLst>
+              <a:ext uri="{FF2B5EF4-FFF2-40B4-BE49-F238E27FC236}">
+                <a16:creationId xmlns:a16="http://schemas.microsoft.com/office/drawing/2014/main" id="{F5C687FC-1CC5-48D1-896A-2D656D9D0EF0}"/>
               </a:ext>
             </a:extLst>
           </p:cNvPr>
@@ -12372,9 +13140,53 @@
           <p:nvPr/>
         </p:nvCxnSpPr>
         <p:spPr>
-          <a:xfrm flipH="1">
-            <a:off x="3914775" y="4593478"/>
-            <a:ext cx="199111" cy="207122"/>
+          <a:xfrm>
+            <a:off x="4111771" y="4598570"/>
+            <a:ext cx="0" cy="197820"/>
+          </a:xfrm>
+          <a:prstGeom prst="straightConnector1">
+            <a:avLst/>
+          </a:prstGeom>
+          <a:ln w="44450">
+            <a:solidFill>
+              <a:schemeClr val="accent2"/>
+            </a:solidFill>
+            <a:tailEnd type="triangle"/>
+          </a:ln>
+        </p:spPr>
+        <p:style>
+          <a:lnRef idx="1">
+            <a:schemeClr val="accent1"/>
+          </a:lnRef>
+          <a:fillRef idx="0">
+            <a:schemeClr val="accent1"/>
+          </a:fillRef>
+          <a:effectRef idx="0">
+            <a:schemeClr val="accent1"/>
+          </a:effectRef>
+          <a:fontRef idx="minor">
+            <a:schemeClr val="tx1"/>
+          </a:fontRef>
+        </p:style>
+      </p:cxnSp>
+      <p:cxnSp>
+        <p:nvCxnSpPr>
+          <p:cNvPr id="19" name="Straight Arrow Connector 18">
+            <a:extLst>
+              <a:ext uri="{FF2B5EF4-FFF2-40B4-BE49-F238E27FC236}">
+                <a16:creationId xmlns:a16="http://schemas.microsoft.com/office/drawing/2014/main" id="{85431B5F-3E57-487F-B438-136975A018D4}"/>
+              </a:ext>
+            </a:extLst>
+          </p:cNvPr>
+          <p:cNvCxnSpPr>
+            <a:cxnSpLocks/>
+          </p:cNvCxnSpPr>
+          <p:nvPr/>
+        </p:nvCxnSpPr>
+        <p:spPr>
+          <a:xfrm flipH="1" flipV="1">
+            <a:off x="6972302" y="3791413"/>
+            <a:ext cx="1" cy="296450"/>
           </a:xfrm>
           <a:prstGeom prst="straightConnector1">
             <a:avLst/>
@@ -12404,99 +13216,12 @@
           </a:fontRef>
         </p:style>
       </p:cxnSp>
-      <p:sp>
-        <p:nvSpPr>
-          <p:cNvPr id="18" name="TextBox 17">
-            <a:extLst>
-              <a:ext uri="{FF2B5EF4-FFF2-40B4-BE49-F238E27FC236}">
-                <a16:creationId xmlns:a16="http://schemas.microsoft.com/office/drawing/2014/main" id="{5DCF6378-8300-424B-8E82-E506650E4F8A}"/>
-              </a:ext>
-            </a:extLst>
-          </p:cNvPr>
-          <p:cNvSpPr txBox="1"/>
-          <p:nvPr/>
-        </p:nvSpPr>
-        <p:spPr>
-          <a:xfrm>
-            <a:off x="4111771" y="783960"/>
-            <a:ext cx="5921108" cy="369332"/>
-          </a:xfrm>
-          <a:prstGeom prst="rect">
-            <a:avLst/>
-          </a:prstGeom>
-          <a:noFill/>
-        </p:spPr>
-        <p:txBody>
-          <a:bodyPr wrap="none" rtlCol="0">
-            <a:spAutoFit/>
-          </a:bodyPr>
-          <a:lstStyle/>
-          <a:p>
-            <a:r>
-              <a:rPr lang="en-US" dirty="0"/>
-              <a:t>The remaining forces can be broken into X and Y components</a:t>
-            </a:r>
-          </a:p>
-        </p:txBody>
-      </p:sp>
-      <p:sp>
-        <p:nvSpPr>
-          <p:cNvPr id="20" name="Oval 19">
-            <a:extLst>
-              <a:ext uri="{FF2B5EF4-FFF2-40B4-BE49-F238E27FC236}">
-                <a16:creationId xmlns:a16="http://schemas.microsoft.com/office/drawing/2014/main" id="{A7BC1359-684D-42A1-AAA4-E117CA39024F}"/>
-              </a:ext>
-            </a:extLst>
-          </p:cNvPr>
-          <p:cNvSpPr/>
-          <p:nvPr/>
-        </p:nvSpPr>
-        <p:spPr>
-          <a:xfrm>
-            <a:off x="5320967" y="3609975"/>
-            <a:ext cx="152400" cy="152400"/>
-          </a:xfrm>
-          <a:prstGeom prst="ellipse">
-            <a:avLst/>
-          </a:prstGeom>
-          <a:solidFill>
-            <a:schemeClr val="accent1">
-              <a:lumMod val="60000"/>
-              <a:lumOff val="40000"/>
-            </a:schemeClr>
-          </a:solidFill>
-        </p:spPr>
-        <p:style>
-          <a:lnRef idx="2">
-            <a:schemeClr val="accent1">
-              <a:shade val="50000"/>
-            </a:schemeClr>
-          </a:lnRef>
-          <a:fillRef idx="1">
-            <a:schemeClr val="accent1"/>
-          </a:fillRef>
-          <a:effectRef idx="0">
-            <a:schemeClr val="accent1"/>
-          </a:effectRef>
-          <a:fontRef idx="minor">
-            <a:schemeClr val="lt1"/>
-          </a:fontRef>
-        </p:style>
-        <p:txBody>
-          <a:bodyPr rtlCol="0" anchor="ctr"/>
-          <a:lstStyle/>
-          <a:p>
-            <a:pPr algn="ctr"/>
-            <a:endParaRPr lang="en-US"/>
-          </a:p>
-        </p:txBody>
-      </p:sp>
       <p:cxnSp>
         <p:nvCxnSpPr>
-          <p:cNvPr id="13" name="Straight Arrow Connector 12">
-            <a:extLst>
-              <a:ext uri="{FF2B5EF4-FFF2-40B4-BE49-F238E27FC236}">
-                <a16:creationId xmlns:a16="http://schemas.microsoft.com/office/drawing/2014/main" id="{428D3928-A9C7-416F-B8A8-380B17739028}"/>
+          <p:cNvPr id="22" name="Straight Arrow Connector 21">
+            <a:extLst>
+              <a:ext uri="{FF2B5EF4-FFF2-40B4-BE49-F238E27FC236}">
+                <a16:creationId xmlns:a16="http://schemas.microsoft.com/office/drawing/2014/main" id="{1BDB0785-9AA5-4FFE-9FF3-ADFE93F4A0E5}"/>
               </a:ext>
             </a:extLst>
           </p:cNvPr>
@@ -12506,97 +13231,9 @@
           <p:nvPr/>
         </p:nvCxnSpPr>
         <p:spPr>
-          <a:xfrm flipH="1">
-            <a:off x="3886780" y="4605889"/>
-            <a:ext cx="227106" cy="0"/>
-          </a:xfrm>
-          <a:prstGeom prst="straightConnector1">
-            <a:avLst/>
-          </a:prstGeom>
-          <a:ln w="44450">
-            <a:solidFill>
-              <a:schemeClr val="accent2"/>
-            </a:solidFill>
-            <a:tailEnd type="triangle"/>
-          </a:ln>
-        </p:spPr>
-        <p:style>
-          <a:lnRef idx="1">
-            <a:schemeClr val="accent1"/>
-          </a:lnRef>
-          <a:fillRef idx="0">
-            <a:schemeClr val="accent1"/>
-          </a:fillRef>
-          <a:effectRef idx="0">
-            <a:schemeClr val="accent1"/>
-          </a:effectRef>
-          <a:fontRef idx="minor">
-            <a:schemeClr val="tx1"/>
-          </a:fontRef>
-        </p:style>
-      </p:cxnSp>
-      <p:cxnSp>
-        <p:nvCxnSpPr>
-          <p:cNvPr id="16" name="Straight Arrow Connector 15">
-            <a:extLst>
-              <a:ext uri="{FF2B5EF4-FFF2-40B4-BE49-F238E27FC236}">
-                <a16:creationId xmlns:a16="http://schemas.microsoft.com/office/drawing/2014/main" id="{F5C687FC-1CC5-48D1-896A-2D656D9D0EF0}"/>
-              </a:ext>
-            </a:extLst>
-          </p:cNvPr>
-          <p:cNvCxnSpPr>
-            <a:cxnSpLocks/>
-          </p:cNvCxnSpPr>
-          <p:nvPr/>
-        </p:nvCxnSpPr>
-        <p:spPr>
-          <a:xfrm>
-            <a:off x="4111771" y="4598570"/>
-            <a:ext cx="0" cy="197820"/>
-          </a:xfrm>
-          <a:prstGeom prst="straightConnector1">
-            <a:avLst/>
-          </a:prstGeom>
-          <a:ln w="44450">
-            <a:solidFill>
-              <a:schemeClr val="accent2"/>
-            </a:solidFill>
-            <a:tailEnd type="triangle"/>
-          </a:ln>
-        </p:spPr>
-        <p:style>
-          <a:lnRef idx="1">
-            <a:schemeClr val="accent1"/>
-          </a:lnRef>
-          <a:fillRef idx="0">
-            <a:schemeClr val="accent1"/>
-          </a:fillRef>
-          <a:effectRef idx="0">
-            <a:schemeClr val="accent1"/>
-          </a:effectRef>
-          <a:fontRef idx="minor">
-            <a:schemeClr val="tx1"/>
-          </a:fontRef>
-        </p:style>
-      </p:cxnSp>
-      <p:cxnSp>
-        <p:nvCxnSpPr>
-          <p:cNvPr id="19" name="Straight Arrow Connector 18">
-            <a:extLst>
-              <a:ext uri="{FF2B5EF4-FFF2-40B4-BE49-F238E27FC236}">
-                <a16:creationId xmlns:a16="http://schemas.microsoft.com/office/drawing/2014/main" id="{85431B5F-3E57-487F-B438-136975A018D4}"/>
-              </a:ext>
-            </a:extLst>
-          </p:cNvPr>
-          <p:cNvCxnSpPr>
-            <a:cxnSpLocks/>
-          </p:cNvCxnSpPr>
-          <p:nvPr/>
-        </p:nvCxnSpPr>
-        <p:spPr>
-          <a:xfrm flipH="1" flipV="1">
-            <a:off x="6972302" y="3791413"/>
-            <a:ext cx="1" cy="296450"/>
+          <a:xfrm flipV="1">
+            <a:off x="6954853" y="4036372"/>
+            <a:ext cx="235114" cy="29481"/>
           </a:xfrm>
           <a:prstGeom prst="straightConnector1">
             <a:avLst/>
@@ -12628,10 +13265,10 @@
       </p:cxnSp>
       <p:cxnSp>
         <p:nvCxnSpPr>
-          <p:cNvPr id="22" name="Straight Arrow Connector 21">
-            <a:extLst>
-              <a:ext uri="{FF2B5EF4-FFF2-40B4-BE49-F238E27FC236}">
-                <a16:creationId xmlns:a16="http://schemas.microsoft.com/office/drawing/2014/main" id="{1BDB0785-9AA5-4FFE-9FF3-ADFE93F4A0E5}"/>
+          <p:cNvPr id="3" name="Straight Connector 2">
+            <a:extLst>
+              <a:ext uri="{FF2B5EF4-FFF2-40B4-BE49-F238E27FC236}">
+                <a16:creationId xmlns:a16="http://schemas.microsoft.com/office/drawing/2014/main" id="{DF78B2C9-B06A-4141-92CB-F654B62298AB}"/>
               </a:ext>
             </a:extLst>
           </p:cNvPr>
@@ -12641,21 +13278,322 @@
           <p:nvPr/>
         </p:nvCxnSpPr>
         <p:spPr>
+          <a:xfrm flipH="1" flipV="1">
+            <a:off x="6954853" y="2600670"/>
+            <a:ext cx="70732" cy="3609630"/>
+          </a:xfrm>
+          <a:prstGeom prst="line">
+            <a:avLst/>
+          </a:prstGeom>
+          <a:ln>
+            <a:prstDash val="dash"/>
+          </a:ln>
+        </p:spPr>
+        <p:style>
+          <a:lnRef idx="1">
+            <a:schemeClr val="accent1"/>
+          </a:lnRef>
+          <a:fillRef idx="0">
+            <a:schemeClr val="accent1"/>
+          </a:fillRef>
+          <a:effectRef idx="0">
+            <a:schemeClr val="accent1"/>
+          </a:effectRef>
+          <a:fontRef idx="minor">
+            <a:schemeClr val="tx1"/>
+          </a:fontRef>
+        </p:style>
+      </p:cxnSp>
+      <p:cxnSp>
+        <p:nvCxnSpPr>
+          <p:cNvPr id="24" name="Straight Connector 23">
+            <a:extLst>
+              <a:ext uri="{FF2B5EF4-FFF2-40B4-BE49-F238E27FC236}">
+                <a16:creationId xmlns:a16="http://schemas.microsoft.com/office/drawing/2014/main" id="{6C3D62E1-71AD-491B-B46B-69C1BA562B00}"/>
+              </a:ext>
+            </a:extLst>
+          </p:cNvPr>
+          <p:cNvCxnSpPr>
+            <a:cxnSpLocks/>
+          </p:cNvCxnSpPr>
+          <p:nvPr/>
+        </p:nvCxnSpPr>
+        <p:spPr>
           <a:xfrm flipV="1">
-            <a:off x="6954853" y="4036372"/>
-            <a:ext cx="235114" cy="29481"/>
-          </a:xfrm>
-          <a:prstGeom prst="straightConnector1">
-            <a:avLst/>
-          </a:prstGeom>
-          <a:ln w="44450">
+            <a:off x="5399092" y="3625146"/>
+            <a:ext cx="1564486" cy="50247"/>
+          </a:xfrm>
+          <a:prstGeom prst="line">
+            <a:avLst/>
+          </a:prstGeom>
+          <a:ln>
             <a:solidFill>
-              <a:schemeClr val="accent6">
-                <a:lumMod val="60000"/>
-                <a:lumOff val="40000"/>
+              <a:schemeClr val="accent2">
+                <a:lumMod val="75000"/>
               </a:schemeClr>
             </a:solidFill>
-            <a:tailEnd type="triangle"/>
+            <a:prstDash val="dash"/>
+          </a:ln>
+        </p:spPr>
+        <p:style>
+          <a:lnRef idx="1">
+            <a:schemeClr val="accent1"/>
+          </a:lnRef>
+          <a:fillRef idx="0">
+            <a:schemeClr val="accent1"/>
+          </a:fillRef>
+          <a:effectRef idx="0">
+            <a:schemeClr val="accent1"/>
+          </a:effectRef>
+          <a:fontRef idx="minor">
+            <a:schemeClr val="tx1"/>
+          </a:fontRef>
+        </p:style>
+      </p:cxnSp>
+      <p:cxnSp>
+        <p:nvCxnSpPr>
+          <p:cNvPr id="25" name="Straight Connector 24">
+            <a:extLst>
+              <a:ext uri="{FF2B5EF4-FFF2-40B4-BE49-F238E27FC236}">
+                <a16:creationId xmlns:a16="http://schemas.microsoft.com/office/drawing/2014/main" id="{3AD25637-740E-4874-B3CF-881176219B86}"/>
+              </a:ext>
+            </a:extLst>
+          </p:cNvPr>
+          <p:cNvCxnSpPr>
+            <a:cxnSpLocks/>
+          </p:cNvCxnSpPr>
+          <p:nvPr/>
+        </p:nvCxnSpPr>
+        <p:spPr>
+          <a:xfrm flipV="1">
+            <a:off x="4126831" y="2447478"/>
+            <a:ext cx="0" cy="3324535"/>
+          </a:xfrm>
+          <a:prstGeom prst="line">
+            <a:avLst/>
+          </a:prstGeom>
+          <a:ln>
+            <a:prstDash val="dash"/>
+          </a:ln>
+        </p:spPr>
+        <p:style>
+          <a:lnRef idx="1">
+            <a:schemeClr val="accent1"/>
+          </a:lnRef>
+          <a:fillRef idx="0">
+            <a:schemeClr val="accent1"/>
+          </a:fillRef>
+          <a:effectRef idx="0">
+            <a:schemeClr val="accent1"/>
+          </a:effectRef>
+          <a:fontRef idx="minor">
+            <a:schemeClr val="tx1"/>
+          </a:fontRef>
+        </p:style>
+      </p:cxnSp>
+      <p:cxnSp>
+        <p:nvCxnSpPr>
+          <p:cNvPr id="28" name="Straight Connector 27">
+            <a:extLst>
+              <a:ext uri="{FF2B5EF4-FFF2-40B4-BE49-F238E27FC236}">
+                <a16:creationId xmlns:a16="http://schemas.microsoft.com/office/drawing/2014/main" id="{41419497-9769-454E-9F62-D0B9E622875E}"/>
+              </a:ext>
+            </a:extLst>
+          </p:cNvPr>
+          <p:cNvCxnSpPr>
+            <a:cxnSpLocks/>
+          </p:cNvCxnSpPr>
+          <p:nvPr/>
+        </p:nvCxnSpPr>
+        <p:spPr>
+          <a:xfrm flipV="1">
+            <a:off x="4126831" y="3675394"/>
+            <a:ext cx="1182588" cy="51891"/>
+          </a:xfrm>
+          <a:prstGeom prst="line">
+            <a:avLst/>
+          </a:prstGeom>
+          <a:ln>
+            <a:solidFill>
+              <a:schemeClr val="accent2">
+                <a:lumMod val="75000"/>
+              </a:schemeClr>
+            </a:solidFill>
+            <a:prstDash val="dash"/>
+          </a:ln>
+        </p:spPr>
+        <p:style>
+          <a:lnRef idx="1">
+            <a:schemeClr val="accent1"/>
+          </a:lnRef>
+          <a:fillRef idx="0">
+            <a:schemeClr val="accent1"/>
+          </a:fillRef>
+          <a:effectRef idx="0">
+            <a:schemeClr val="accent1"/>
+          </a:effectRef>
+          <a:fontRef idx="minor">
+            <a:schemeClr val="tx1"/>
+          </a:fontRef>
+        </p:style>
+      </p:cxnSp>
+      <p:cxnSp>
+        <p:nvCxnSpPr>
+          <p:cNvPr id="30" name="Straight Connector 29">
+            <a:extLst>
+              <a:ext uri="{FF2B5EF4-FFF2-40B4-BE49-F238E27FC236}">
+                <a16:creationId xmlns:a16="http://schemas.microsoft.com/office/drawing/2014/main" id="{77B3E91E-70B6-4923-9608-205BB7AF5DAE}"/>
+              </a:ext>
+            </a:extLst>
+          </p:cNvPr>
+          <p:cNvCxnSpPr>
+            <a:cxnSpLocks/>
+          </p:cNvCxnSpPr>
+          <p:nvPr/>
+        </p:nvCxnSpPr>
+        <p:spPr>
+          <a:xfrm flipH="1">
+            <a:off x="4000333" y="3983957"/>
+            <a:ext cx="3793277" cy="372386"/>
+          </a:xfrm>
+          <a:prstGeom prst="line">
+            <a:avLst/>
+          </a:prstGeom>
+          <a:ln>
+            <a:prstDash val="dash"/>
+          </a:ln>
+        </p:spPr>
+        <p:style>
+          <a:lnRef idx="1">
+            <a:schemeClr val="accent1"/>
+          </a:lnRef>
+          <a:fillRef idx="0">
+            <a:schemeClr val="accent1"/>
+          </a:fillRef>
+          <a:effectRef idx="0">
+            <a:schemeClr val="accent1"/>
+          </a:effectRef>
+          <a:fontRef idx="minor">
+            <a:schemeClr val="tx1"/>
+          </a:fontRef>
+        </p:style>
+      </p:cxnSp>
+      <p:cxnSp>
+        <p:nvCxnSpPr>
+          <p:cNvPr id="35" name="Straight Connector 34">
+            <a:extLst>
+              <a:ext uri="{FF2B5EF4-FFF2-40B4-BE49-F238E27FC236}">
+                <a16:creationId xmlns:a16="http://schemas.microsoft.com/office/drawing/2014/main" id="{F1036C0B-901C-45EF-84F4-1DA6003BADAA}"/>
+              </a:ext>
+            </a:extLst>
+          </p:cNvPr>
+          <p:cNvCxnSpPr>
+            <a:cxnSpLocks/>
+          </p:cNvCxnSpPr>
+          <p:nvPr/>
+        </p:nvCxnSpPr>
+        <p:spPr>
+          <a:xfrm flipH="1">
+            <a:off x="3947055" y="4251646"/>
+            <a:ext cx="3793277" cy="372386"/>
+          </a:xfrm>
+          <a:prstGeom prst="line">
+            <a:avLst/>
+          </a:prstGeom>
+          <a:ln>
+            <a:prstDash val="dash"/>
+          </a:ln>
+        </p:spPr>
+        <p:style>
+          <a:lnRef idx="1">
+            <a:schemeClr val="accent1"/>
+          </a:lnRef>
+          <a:fillRef idx="0">
+            <a:schemeClr val="accent1"/>
+          </a:fillRef>
+          <a:effectRef idx="0">
+            <a:schemeClr val="accent1"/>
+          </a:effectRef>
+          <a:fontRef idx="minor">
+            <a:schemeClr val="tx1"/>
+          </a:fontRef>
+        </p:style>
+      </p:cxnSp>
+      <p:cxnSp>
+        <p:nvCxnSpPr>
+          <p:cNvPr id="36" name="Straight Connector 35">
+            <a:extLst>
+              <a:ext uri="{FF2B5EF4-FFF2-40B4-BE49-F238E27FC236}">
+                <a16:creationId xmlns:a16="http://schemas.microsoft.com/office/drawing/2014/main" id="{34168E4E-DE58-48E8-8E66-1654358BC7C2}"/>
+              </a:ext>
+            </a:extLst>
+          </p:cNvPr>
+          <p:cNvCxnSpPr>
+            <a:cxnSpLocks/>
+          </p:cNvCxnSpPr>
+          <p:nvPr/>
+        </p:nvCxnSpPr>
+        <p:spPr>
+          <a:xfrm>
+            <a:off x="5409163" y="3675393"/>
+            <a:ext cx="42884" cy="529142"/>
+          </a:xfrm>
+          <a:prstGeom prst="line">
+            <a:avLst/>
+          </a:prstGeom>
+          <a:ln>
+            <a:solidFill>
+              <a:schemeClr val="accent2">
+                <a:lumMod val="75000"/>
+              </a:schemeClr>
+            </a:solidFill>
+            <a:prstDash val="dash"/>
+          </a:ln>
+        </p:spPr>
+        <p:style>
+          <a:lnRef idx="1">
+            <a:schemeClr val="accent1"/>
+          </a:lnRef>
+          <a:fillRef idx="0">
+            <a:schemeClr val="accent1"/>
+          </a:fillRef>
+          <a:effectRef idx="0">
+            <a:schemeClr val="accent1"/>
+          </a:effectRef>
+          <a:fontRef idx="minor">
+            <a:schemeClr val="tx1"/>
+          </a:fontRef>
+        </p:style>
+      </p:cxnSp>
+      <p:cxnSp>
+        <p:nvCxnSpPr>
+          <p:cNvPr id="39" name="Straight Connector 38">
+            <a:extLst>
+              <a:ext uri="{FF2B5EF4-FFF2-40B4-BE49-F238E27FC236}">
+                <a16:creationId xmlns:a16="http://schemas.microsoft.com/office/drawing/2014/main" id="{BD68FF15-E722-4B49-A94D-7BF943E7DCE0}"/>
+              </a:ext>
+            </a:extLst>
+          </p:cNvPr>
+          <p:cNvCxnSpPr>
+            <a:cxnSpLocks/>
+          </p:cNvCxnSpPr>
+          <p:nvPr/>
+        </p:nvCxnSpPr>
+        <p:spPr>
+          <a:xfrm>
+            <a:off x="5381385" y="3632293"/>
+            <a:ext cx="44259" cy="805546"/>
+          </a:xfrm>
+          <a:prstGeom prst="line">
+            <a:avLst/>
+          </a:prstGeom>
+          <a:ln>
+            <a:solidFill>
+              <a:schemeClr val="accent2">
+                <a:lumMod val="75000"/>
+              </a:schemeClr>
+            </a:solidFill>
+            <a:prstDash val="dash"/>
           </a:ln>
         </p:spPr>
         <p:style>
@@ -12676,7 +13614,7 @@
     </p:spTree>
     <p:extLst>
       <p:ext uri="{BB962C8B-B14F-4D97-AF65-F5344CB8AC3E}">
-        <p14:creationId xmlns:p14="http://schemas.microsoft.com/office/powerpoint/2010/main" val="2263177242"/>
+        <p14:creationId xmlns:p14="http://schemas.microsoft.com/office/powerpoint/2010/main" val="727431747"/>
       </p:ext>
     </p:extLst>
   </p:cSld>
@@ -13044,8 +13982,8 @@
         </p:nvSpPr>
         <p:spPr>
           <a:xfrm>
-            <a:off x="2104631" y="1085987"/>
-            <a:ext cx="8004820" cy="646331"/>
+            <a:off x="1087138" y="1132153"/>
+            <a:ext cx="9626994" cy="646331"/>
           </a:xfrm>
           <a:prstGeom prst="rect">
             <a:avLst/>
@@ -13060,13 +13998,45 @@
           <a:p>
             <a:r>
               <a:rPr lang="en-US" dirty="0"/>
-              <a:t>These forces can be relocated to the CG of the vehicle</a:t>
-            </a:r>
-          </a:p>
-          <a:p>
-            <a:r>
-              <a:rPr lang="en-US" dirty="0"/>
-              <a:t>(but we will need to add a force couple which will be calculated by the ‘lever’ arms)</a:t>
+              <a:t>We can now slide the object based on the remaining forces at the CG (a=f/m; v=</a:t>
+            </a:r>
+            <a:r>
+              <a:rPr lang="en-US" dirty="0" err="1"/>
+              <a:t>v+a</a:t>
+            </a:r>
+            <a:r>
+              <a:rPr lang="en-US" dirty="0"/>
+              <a:t>; p=</a:t>
+            </a:r>
+            <a:r>
+              <a:rPr lang="en-US" dirty="0" err="1"/>
+              <a:t>p+v</a:t>
+            </a:r>
+            <a:r>
+              <a:rPr lang="en-US" dirty="0"/>
+              <a:t>)</a:t>
+            </a:r>
+          </a:p>
+          <a:p>
+            <a:r>
+              <a:rPr lang="en-US" dirty="0"/>
+              <a:t>We can also rotate the object based on the total remaining moments/couples (w=m/j; o=</a:t>
+            </a:r>
+            <a:r>
+              <a:rPr lang="en-US" dirty="0" err="1"/>
+              <a:t>o+w</a:t>
+            </a:r>
+            <a:r>
+              <a:rPr lang="en-US" dirty="0"/>
+              <a:t>; a=</a:t>
+            </a:r>
+            <a:r>
+              <a:rPr lang="en-US" dirty="0" err="1"/>
+              <a:t>a+o</a:t>
+            </a:r>
+            <a:r>
+              <a:rPr lang="en-US" dirty="0"/>
+              <a:t>)</a:t>
             </a:r>
           </a:p>
         </p:txBody>
@@ -13139,7 +14109,7 @@
         </p:nvCxnSpPr>
         <p:spPr>
           <a:xfrm flipH="1">
-            <a:off x="3886780" y="4605889"/>
+            <a:off x="5172176" y="3670784"/>
             <a:ext cx="227106" cy="0"/>
           </a:xfrm>
           <a:prstGeom prst="straightConnector1">
@@ -13183,7 +14153,7 @@
         </p:nvCxnSpPr>
         <p:spPr>
           <a:xfrm>
-            <a:off x="4111771" y="4598570"/>
+            <a:off x="5397167" y="3663465"/>
             <a:ext cx="0" cy="197820"/>
           </a:xfrm>
           <a:prstGeom prst="straightConnector1">
@@ -13227,7 +14197,7 @@
         </p:nvCxnSpPr>
         <p:spPr>
           <a:xfrm flipH="1" flipV="1">
-            <a:off x="6972302" y="3791413"/>
+            <a:off x="5411103" y="3382727"/>
             <a:ext cx="1" cy="296450"/>
           </a:xfrm>
           <a:prstGeom prst="straightConnector1">
@@ -13274,7 +14244,7 @@
         </p:nvCxnSpPr>
         <p:spPr>
           <a:xfrm flipV="1">
-            <a:off x="6954853" y="4036372"/>
+            <a:off x="5393654" y="3627686"/>
             <a:ext cx="235114" cy="29481"/>
           </a:xfrm>
           <a:prstGeom prst="straightConnector1">
@@ -13305,358 +14275,110 @@
           </a:fontRef>
         </p:style>
       </p:cxnSp>
-      <p:cxnSp>
-        <p:nvCxnSpPr>
-          <p:cNvPr id="3" name="Straight Connector 2">
-            <a:extLst>
-              <a:ext uri="{FF2B5EF4-FFF2-40B4-BE49-F238E27FC236}">
-                <a16:creationId xmlns:a16="http://schemas.microsoft.com/office/drawing/2014/main" id="{DF78B2C9-B06A-4141-92CB-F654B62298AB}"/>
-              </a:ext>
-            </a:extLst>
-          </p:cNvPr>
-          <p:cNvCxnSpPr>
-            <a:cxnSpLocks/>
-          </p:cNvCxnSpPr>
-          <p:nvPr/>
-        </p:nvCxnSpPr>
-        <p:spPr>
-          <a:xfrm flipH="1" flipV="1">
-            <a:off x="6954853" y="2600670"/>
-            <a:ext cx="70732" cy="3609630"/>
-          </a:xfrm>
-          <a:prstGeom prst="line">
-            <a:avLst/>
-          </a:prstGeom>
-          <a:ln>
-            <a:prstDash val="dash"/>
-          </a:ln>
-        </p:spPr>
-        <p:style>
-          <a:lnRef idx="1">
-            <a:schemeClr val="accent1"/>
-          </a:lnRef>
-          <a:fillRef idx="0">
-            <a:schemeClr val="accent1"/>
-          </a:fillRef>
-          <a:effectRef idx="0">
-            <a:schemeClr val="accent1"/>
-          </a:effectRef>
-          <a:fontRef idx="minor">
-            <a:schemeClr val="tx1"/>
-          </a:fontRef>
-        </p:style>
-      </p:cxnSp>
-      <p:cxnSp>
-        <p:nvCxnSpPr>
-          <p:cNvPr id="24" name="Straight Connector 23">
-            <a:extLst>
-              <a:ext uri="{FF2B5EF4-FFF2-40B4-BE49-F238E27FC236}">
-                <a16:creationId xmlns:a16="http://schemas.microsoft.com/office/drawing/2014/main" id="{6C3D62E1-71AD-491B-B46B-69C1BA562B00}"/>
-              </a:ext>
-            </a:extLst>
-          </p:cNvPr>
-          <p:cNvCxnSpPr>
-            <a:cxnSpLocks/>
-          </p:cNvCxnSpPr>
-          <p:nvPr/>
-        </p:nvCxnSpPr>
-        <p:spPr>
-          <a:xfrm flipV="1">
-            <a:off x="5399092" y="3625146"/>
-            <a:ext cx="1564486" cy="50247"/>
-          </a:xfrm>
-          <a:prstGeom prst="line">
-            <a:avLst/>
-          </a:prstGeom>
-          <a:ln>
-            <a:solidFill>
-              <a:schemeClr val="accent2">
-                <a:lumMod val="75000"/>
-              </a:schemeClr>
-            </a:solidFill>
-            <a:prstDash val="dash"/>
-          </a:ln>
-        </p:spPr>
-        <p:style>
-          <a:lnRef idx="1">
-            <a:schemeClr val="accent1"/>
-          </a:lnRef>
-          <a:fillRef idx="0">
-            <a:schemeClr val="accent1"/>
-          </a:fillRef>
-          <a:effectRef idx="0">
-            <a:schemeClr val="accent1"/>
-          </a:effectRef>
-          <a:fontRef idx="minor">
-            <a:schemeClr val="tx1"/>
-          </a:fontRef>
-        </p:style>
-      </p:cxnSp>
-      <p:cxnSp>
-        <p:nvCxnSpPr>
-          <p:cNvPr id="25" name="Straight Connector 24">
-            <a:extLst>
-              <a:ext uri="{FF2B5EF4-FFF2-40B4-BE49-F238E27FC236}">
-                <a16:creationId xmlns:a16="http://schemas.microsoft.com/office/drawing/2014/main" id="{3AD25637-740E-4874-B3CF-881176219B86}"/>
-              </a:ext>
-            </a:extLst>
-          </p:cNvPr>
-          <p:cNvCxnSpPr>
-            <a:cxnSpLocks/>
-          </p:cNvCxnSpPr>
-          <p:nvPr/>
-        </p:nvCxnSpPr>
-        <p:spPr>
-          <a:xfrm flipV="1">
-            <a:off x="4126831" y="2447478"/>
-            <a:ext cx="0" cy="3324535"/>
-          </a:xfrm>
-          <a:prstGeom prst="line">
-            <a:avLst/>
-          </a:prstGeom>
-          <a:ln>
-            <a:prstDash val="dash"/>
-          </a:ln>
-        </p:spPr>
-        <p:style>
-          <a:lnRef idx="1">
-            <a:schemeClr val="accent1"/>
-          </a:lnRef>
-          <a:fillRef idx="0">
-            <a:schemeClr val="accent1"/>
-          </a:fillRef>
-          <a:effectRef idx="0">
-            <a:schemeClr val="accent1"/>
-          </a:effectRef>
-          <a:fontRef idx="minor">
-            <a:schemeClr val="tx1"/>
-          </a:fontRef>
-        </p:style>
-      </p:cxnSp>
-      <p:cxnSp>
-        <p:nvCxnSpPr>
-          <p:cNvPr id="28" name="Straight Connector 27">
-            <a:extLst>
-              <a:ext uri="{FF2B5EF4-FFF2-40B4-BE49-F238E27FC236}">
-                <a16:creationId xmlns:a16="http://schemas.microsoft.com/office/drawing/2014/main" id="{41419497-9769-454E-9F62-D0B9E622875E}"/>
-              </a:ext>
-            </a:extLst>
-          </p:cNvPr>
-          <p:cNvCxnSpPr>
-            <a:cxnSpLocks/>
-          </p:cNvCxnSpPr>
-          <p:nvPr/>
-        </p:nvCxnSpPr>
-        <p:spPr>
-          <a:xfrm flipV="1">
-            <a:off x="4126831" y="3675394"/>
-            <a:ext cx="1182588" cy="51891"/>
-          </a:xfrm>
-          <a:prstGeom prst="line">
-            <a:avLst/>
-          </a:prstGeom>
-          <a:ln>
-            <a:solidFill>
-              <a:schemeClr val="accent2">
-                <a:lumMod val="75000"/>
-              </a:schemeClr>
-            </a:solidFill>
-            <a:prstDash val="dash"/>
-          </a:ln>
-        </p:spPr>
-        <p:style>
-          <a:lnRef idx="1">
-            <a:schemeClr val="accent1"/>
-          </a:lnRef>
-          <a:fillRef idx="0">
-            <a:schemeClr val="accent1"/>
-          </a:fillRef>
-          <a:effectRef idx="0">
-            <a:schemeClr val="accent1"/>
-          </a:effectRef>
-          <a:fontRef idx="minor">
-            <a:schemeClr val="tx1"/>
-          </a:fontRef>
-        </p:style>
-      </p:cxnSp>
-      <p:cxnSp>
-        <p:nvCxnSpPr>
-          <p:cNvPr id="30" name="Straight Connector 29">
-            <a:extLst>
-              <a:ext uri="{FF2B5EF4-FFF2-40B4-BE49-F238E27FC236}">
-                <a16:creationId xmlns:a16="http://schemas.microsoft.com/office/drawing/2014/main" id="{77B3E91E-70B6-4923-9608-205BB7AF5DAE}"/>
-              </a:ext>
-            </a:extLst>
-          </p:cNvPr>
-          <p:cNvCxnSpPr>
-            <a:cxnSpLocks/>
-          </p:cNvCxnSpPr>
-          <p:nvPr/>
-        </p:nvCxnSpPr>
-        <p:spPr>
-          <a:xfrm flipH="1">
-            <a:off x="4000333" y="3983957"/>
-            <a:ext cx="3793277" cy="372386"/>
-          </a:xfrm>
-          <a:prstGeom prst="line">
-            <a:avLst/>
-          </a:prstGeom>
-          <a:ln>
-            <a:prstDash val="dash"/>
-          </a:ln>
-        </p:spPr>
-        <p:style>
-          <a:lnRef idx="1">
-            <a:schemeClr val="accent1"/>
-          </a:lnRef>
-          <a:fillRef idx="0">
-            <a:schemeClr val="accent1"/>
-          </a:fillRef>
-          <a:effectRef idx="0">
-            <a:schemeClr val="accent1"/>
-          </a:effectRef>
-          <a:fontRef idx="minor">
-            <a:schemeClr val="tx1"/>
-          </a:fontRef>
-        </p:style>
-      </p:cxnSp>
-      <p:cxnSp>
-        <p:nvCxnSpPr>
-          <p:cNvPr id="35" name="Straight Connector 34">
-            <a:extLst>
-              <a:ext uri="{FF2B5EF4-FFF2-40B4-BE49-F238E27FC236}">
-                <a16:creationId xmlns:a16="http://schemas.microsoft.com/office/drawing/2014/main" id="{F1036C0B-901C-45EF-84F4-1DA6003BADAA}"/>
-              </a:ext>
-            </a:extLst>
-          </p:cNvPr>
-          <p:cNvCxnSpPr>
-            <a:cxnSpLocks/>
-          </p:cNvCxnSpPr>
-          <p:nvPr/>
-        </p:nvCxnSpPr>
-        <p:spPr>
-          <a:xfrm flipH="1">
-            <a:off x="3947055" y="4251646"/>
-            <a:ext cx="3793277" cy="372386"/>
-          </a:xfrm>
-          <a:prstGeom prst="line">
-            <a:avLst/>
-          </a:prstGeom>
-          <a:ln>
-            <a:prstDash val="dash"/>
-          </a:ln>
-        </p:spPr>
-        <p:style>
-          <a:lnRef idx="1">
-            <a:schemeClr val="accent1"/>
-          </a:lnRef>
-          <a:fillRef idx="0">
-            <a:schemeClr val="accent1"/>
-          </a:fillRef>
-          <a:effectRef idx="0">
-            <a:schemeClr val="accent1"/>
-          </a:effectRef>
-          <a:fontRef idx="minor">
-            <a:schemeClr val="tx1"/>
-          </a:fontRef>
-        </p:style>
-      </p:cxnSp>
-      <p:cxnSp>
-        <p:nvCxnSpPr>
-          <p:cNvPr id="36" name="Straight Connector 35">
-            <a:extLst>
-              <a:ext uri="{FF2B5EF4-FFF2-40B4-BE49-F238E27FC236}">
-                <a16:creationId xmlns:a16="http://schemas.microsoft.com/office/drawing/2014/main" id="{34168E4E-DE58-48E8-8E66-1654358BC7C2}"/>
-              </a:ext>
-            </a:extLst>
-          </p:cNvPr>
-          <p:cNvCxnSpPr>
-            <a:cxnSpLocks/>
-          </p:cNvCxnSpPr>
-          <p:nvPr/>
-        </p:nvCxnSpPr>
-        <p:spPr>
-          <a:xfrm>
-            <a:off x="5409163" y="3675393"/>
-            <a:ext cx="42884" cy="529142"/>
-          </a:xfrm>
-          <a:prstGeom prst="line">
-            <a:avLst/>
-          </a:prstGeom>
-          <a:ln>
-            <a:solidFill>
-              <a:schemeClr val="accent2">
-                <a:lumMod val="75000"/>
-              </a:schemeClr>
-            </a:solidFill>
-            <a:prstDash val="dash"/>
-          </a:ln>
-        </p:spPr>
-        <p:style>
-          <a:lnRef idx="1">
-            <a:schemeClr val="accent1"/>
-          </a:lnRef>
-          <a:fillRef idx="0">
-            <a:schemeClr val="accent1"/>
-          </a:fillRef>
-          <a:effectRef idx="0">
-            <a:schemeClr val="accent1"/>
-          </a:effectRef>
-          <a:fontRef idx="minor">
-            <a:schemeClr val="tx1"/>
-          </a:fontRef>
-        </p:style>
-      </p:cxnSp>
-      <p:cxnSp>
-        <p:nvCxnSpPr>
-          <p:cNvPr id="39" name="Straight Connector 38">
-            <a:extLst>
-              <a:ext uri="{FF2B5EF4-FFF2-40B4-BE49-F238E27FC236}">
-                <a16:creationId xmlns:a16="http://schemas.microsoft.com/office/drawing/2014/main" id="{BD68FF15-E722-4B49-A94D-7BF943E7DCE0}"/>
-              </a:ext>
-            </a:extLst>
-          </p:cNvPr>
-          <p:cNvCxnSpPr>
-            <a:cxnSpLocks/>
-          </p:cNvCxnSpPr>
-          <p:nvPr/>
-        </p:nvCxnSpPr>
-        <p:spPr>
-          <a:xfrm>
-            <a:off x="5381385" y="3632293"/>
-            <a:ext cx="44259" cy="805546"/>
-          </a:xfrm>
-          <a:prstGeom prst="line">
-            <a:avLst/>
-          </a:prstGeom>
-          <a:ln>
-            <a:solidFill>
-              <a:schemeClr val="accent2">
-                <a:lumMod val="75000"/>
-              </a:schemeClr>
-            </a:solidFill>
-            <a:prstDash val="dash"/>
-          </a:ln>
-        </p:spPr>
-        <p:style>
-          <a:lnRef idx="1">
-            <a:schemeClr val="accent1"/>
-          </a:lnRef>
-          <a:fillRef idx="0">
-            <a:schemeClr val="accent1"/>
-          </a:fillRef>
-          <a:effectRef idx="0">
-            <a:schemeClr val="accent1"/>
-          </a:effectRef>
-          <a:fontRef idx="minor">
-            <a:schemeClr val="tx1"/>
-          </a:fontRef>
-        </p:style>
-      </p:cxnSp>
+      <p:sp>
+        <p:nvSpPr>
+          <p:cNvPr id="2" name="Arrow: Curved Right 1">
+            <a:extLst>
+              <a:ext uri="{FF2B5EF4-FFF2-40B4-BE49-F238E27FC236}">
+                <a16:creationId xmlns:a16="http://schemas.microsoft.com/office/drawing/2014/main" id="{EABE806A-F88E-4736-A74E-A28E8054CE48}"/>
+              </a:ext>
+            </a:extLst>
+          </p:cNvPr>
+          <p:cNvSpPr/>
+          <p:nvPr/>
+        </p:nvSpPr>
+        <p:spPr>
+          <a:xfrm>
+            <a:off x="4921227" y="3443405"/>
+            <a:ext cx="228600" cy="485540"/>
+          </a:xfrm>
+          <a:prstGeom prst="curvedRightArrow">
+            <a:avLst/>
+          </a:prstGeom>
+        </p:spPr>
+        <p:style>
+          <a:lnRef idx="2">
+            <a:schemeClr val="accent1">
+              <a:shade val="50000"/>
+            </a:schemeClr>
+          </a:lnRef>
+          <a:fillRef idx="1">
+            <a:schemeClr val="accent1"/>
+          </a:fillRef>
+          <a:effectRef idx="0">
+            <a:schemeClr val="accent1"/>
+          </a:effectRef>
+          <a:fontRef idx="minor">
+            <a:schemeClr val="lt1"/>
+          </a:fontRef>
+        </p:style>
+        <p:txBody>
+          <a:bodyPr rtlCol="0" anchor="ctr"/>
+          <a:lstStyle/>
+          <a:p>
+            <a:pPr algn="ctr"/>
+            <a:endParaRPr lang="en-US">
+              <a:solidFill>
+                <a:schemeClr val="tx1"/>
+              </a:solidFill>
+            </a:endParaRPr>
+          </a:p>
+        </p:txBody>
+      </p:sp>
+      <p:sp>
+        <p:nvSpPr>
+          <p:cNvPr id="6" name="Arrow: Curved Left 5">
+            <a:extLst>
+              <a:ext uri="{FF2B5EF4-FFF2-40B4-BE49-F238E27FC236}">
+                <a16:creationId xmlns:a16="http://schemas.microsoft.com/office/drawing/2014/main" id="{29D4C0EF-A93B-42EE-8EDD-06271083FBFB}"/>
+              </a:ext>
+            </a:extLst>
+          </p:cNvPr>
+          <p:cNvSpPr/>
+          <p:nvPr/>
+        </p:nvSpPr>
+        <p:spPr>
+          <a:xfrm>
+            <a:off x="5614319" y="3366126"/>
+            <a:ext cx="251792" cy="523120"/>
+          </a:xfrm>
+          <a:prstGeom prst="curvedLeftArrow">
+            <a:avLst/>
+          </a:prstGeom>
+        </p:spPr>
+        <p:style>
+          <a:lnRef idx="2">
+            <a:schemeClr val="accent1">
+              <a:shade val="50000"/>
+            </a:schemeClr>
+          </a:lnRef>
+          <a:fillRef idx="1">
+            <a:schemeClr val="accent1"/>
+          </a:fillRef>
+          <a:effectRef idx="0">
+            <a:schemeClr val="accent1"/>
+          </a:effectRef>
+          <a:fontRef idx="minor">
+            <a:schemeClr val="lt1"/>
+          </a:fontRef>
+        </p:style>
+        <p:txBody>
+          <a:bodyPr rtlCol="0" anchor="ctr"/>
+          <a:lstStyle/>
+          <a:p>
+            <a:pPr algn="ctr"/>
+            <a:endParaRPr lang="en-US">
+              <a:solidFill>
+                <a:schemeClr val="tx1"/>
+              </a:solidFill>
+            </a:endParaRPr>
+          </a:p>
+        </p:txBody>
+      </p:sp>
     </p:spTree>
     <p:extLst>
       <p:ext uri="{BB962C8B-B14F-4D97-AF65-F5344CB8AC3E}">
-        <p14:creationId xmlns:p14="http://schemas.microsoft.com/office/powerpoint/2010/main" val="727431747"/>
+        <p14:creationId xmlns:p14="http://schemas.microsoft.com/office/powerpoint/2010/main" val="2055049088"/>
       </p:ext>
     </p:extLst>
   </p:cSld>
@@ -14346,155 +15068,48 @@
           <a:chExt cx="0" cy="0"/>
         </a:xfrm>
       </p:grpSpPr>
-      <p:sp>
-        <p:nvSpPr>
-          <p:cNvPr id="21" name="Isosceles Triangle 20">
-            <a:extLst>
-              <a:ext uri="{FF2B5EF4-FFF2-40B4-BE49-F238E27FC236}">
-                <a16:creationId xmlns:a16="http://schemas.microsoft.com/office/drawing/2014/main" id="{E2DD208B-9ED1-4F23-8A84-898A59AFE327}"/>
-              </a:ext>
-            </a:extLst>
-          </p:cNvPr>
-          <p:cNvSpPr/>
-          <p:nvPr/>
-        </p:nvSpPr>
-        <p:spPr>
-          <a:xfrm rot="20959425">
-            <a:off x="3959243" y="2748942"/>
-            <a:ext cx="2888975" cy="1615051"/>
-          </a:xfrm>
-          <a:prstGeom prst="triangle">
-            <a:avLst/>
-          </a:prstGeom>
-          <a:solidFill>
-            <a:schemeClr val="bg2">
-              <a:lumMod val="90000"/>
-            </a:schemeClr>
-          </a:solidFill>
-        </p:spPr>
-        <p:style>
-          <a:lnRef idx="2">
-            <a:schemeClr val="accent1">
-              <a:shade val="50000"/>
-            </a:schemeClr>
-          </a:lnRef>
-          <a:fillRef idx="1">
-            <a:schemeClr val="accent1"/>
-          </a:fillRef>
-          <a:effectRef idx="0">
-            <a:schemeClr val="accent1"/>
-          </a:effectRef>
-          <a:fontRef idx="minor">
-            <a:schemeClr val="lt1"/>
-          </a:fontRef>
-        </p:style>
-        <p:txBody>
-          <a:bodyPr rtlCol="0" anchor="ctr"/>
-          <a:lstStyle/>
-          <a:p>
-            <a:pPr algn="ctr"/>
-            <a:endParaRPr lang="en-US" dirty="0"/>
-          </a:p>
-        </p:txBody>
-      </p:sp>
-      <p:sp>
-        <p:nvSpPr>
-          <p:cNvPr id="4" name="Oval 3">
-            <a:extLst>
-              <a:ext uri="{FF2B5EF4-FFF2-40B4-BE49-F238E27FC236}">
-                <a16:creationId xmlns:a16="http://schemas.microsoft.com/office/drawing/2014/main" id="{314600A2-A1FF-492F-8609-34CAF5859A52}"/>
-              </a:ext>
-            </a:extLst>
-          </p:cNvPr>
-          <p:cNvSpPr/>
-          <p:nvPr/>
-        </p:nvSpPr>
-        <p:spPr>
-          <a:xfrm>
-            <a:off x="3561347" y="4050632"/>
-            <a:ext cx="1130968" cy="1130968"/>
-          </a:xfrm>
-          <a:prstGeom prst="ellipse">
-            <a:avLst/>
-          </a:prstGeom>
-        </p:spPr>
-        <p:style>
-          <a:lnRef idx="2">
-            <a:schemeClr val="accent1">
-              <a:shade val="50000"/>
-            </a:schemeClr>
-          </a:lnRef>
-          <a:fillRef idx="1">
-            <a:schemeClr val="accent1"/>
-          </a:fillRef>
-          <a:effectRef idx="0">
-            <a:schemeClr val="accent1"/>
-          </a:effectRef>
-          <a:fontRef idx="minor">
-            <a:schemeClr val="lt1"/>
-          </a:fontRef>
-        </p:style>
-        <p:txBody>
-          <a:bodyPr rtlCol="0" anchor="ctr"/>
-          <a:lstStyle/>
-          <a:p>
-            <a:pPr algn="ctr"/>
-            <a:endParaRPr lang="en-US"/>
-          </a:p>
-        </p:txBody>
-      </p:sp>
-      <p:sp>
-        <p:nvSpPr>
-          <p:cNvPr id="5" name="Oval 4">
-            <a:extLst>
-              <a:ext uri="{FF2B5EF4-FFF2-40B4-BE49-F238E27FC236}">
-                <a16:creationId xmlns:a16="http://schemas.microsoft.com/office/drawing/2014/main" id="{ED83B1C8-4E8A-443E-8022-B13B8E29A4AE}"/>
-              </a:ext>
-            </a:extLst>
-          </p:cNvPr>
-          <p:cNvSpPr/>
-          <p:nvPr/>
-        </p:nvSpPr>
-        <p:spPr>
-          <a:xfrm>
-            <a:off x="6406819" y="3513723"/>
-            <a:ext cx="1130968" cy="1130968"/>
-          </a:xfrm>
-          <a:prstGeom prst="ellipse">
-            <a:avLst/>
-          </a:prstGeom>
-        </p:spPr>
-        <p:style>
-          <a:lnRef idx="2">
-            <a:schemeClr val="accent1">
-              <a:shade val="50000"/>
-            </a:schemeClr>
-          </a:lnRef>
-          <a:fillRef idx="1">
-            <a:schemeClr val="accent1"/>
-          </a:fillRef>
-          <a:effectRef idx="0">
-            <a:schemeClr val="accent1"/>
-          </a:effectRef>
-          <a:fontRef idx="minor">
-            <a:schemeClr val="lt1"/>
-          </a:fontRef>
-        </p:style>
-        <p:txBody>
-          <a:bodyPr rtlCol="0" anchor="ctr"/>
-          <a:lstStyle/>
-          <a:p>
-            <a:pPr algn="ctr"/>
-            <a:endParaRPr lang="en-US"/>
-          </a:p>
-        </p:txBody>
-      </p:sp>
       <p:cxnSp>
         <p:nvCxnSpPr>
-          <p:cNvPr id="8" name="Straight Connector 7">
-            <a:extLst>
-              <a:ext uri="{FF2B5EF4-FFF2-40B4-BE49-F238E27FC236}">
-                <a16:creationId xmlns:a16="http://schemas.microsoft.com/office/drawing/2014/main" id="{5E9B6128-A755-4014-AD0B-AF4BCF9C3590}"/>
+          <p:cNvPr id="5" name="Straight Connector 4">
+            <a:extLst>
+              <a:ext uri="{FF2B5EF4-FFF2-40B4-BE49-F238E27FC236}">
+                <a16:creationId xmlns:a16="http://schemas.microsoft.com/office/drawing/2014/main" id="{36C174B4-F53C-7D4A-BC68-FE7F1D058050}"/>
+              </a:ext>
+            </a:extLst>
+          </p:cNvPr>
+          <p:cNvCxnSpPr/>
+          <p:nvPr/>
+        </p:nvCxnSpPr>
+        <p:spPr>
+          <a:xfrm>
+            <a:off x="4494179" y="758757"/>
+            <a:ext cx="0" cy="5321030"/>
+          </a:xfrm>
+          <a:prstGeom prst="line">
+            <a:avLst/>
+          </a:prstGeom>
+        </p:spPr>
+        <p:style>
+          <a:lnRef idx="1">
+            <a:schemeClr val="accent1"/>
+          </a:lnRef>
+          <a:fillRef idx="0">
+            <a:schemeClr val="accent1"/>
+          </a:fillRef>
+          <a:effectRef idx="0">
+            <a:schemeClr val="accent1"/>
+          </a:effectRef>
+          <a:fontRef idx="minor">
+            <a:schemeClr val="tx1"/>
+          </a:fontRef>
+        </p:style>
+      </p:cxnSp>
+      <p:cxnSp>
+        <p:nvCxnSpPr>
+          <p:cNvPr id="6" name="Straight Connector 5">
+            <a:extLst>
+              <a:ext uri="{FF2B5EF4-FFF2-40B4-BE49-F238E27FC236}">
+                <a16:creationId xmlns:a16="http://schemas.microsoft.com/office/drawing/2014/main" id="{228B1AC0-F11E-9C48-A888-C43D0C551F12}"/>
               </a:ext>
             </a:extLst>
           </p:cNvPr>
@@ -14504,9 +15119,9 @@
           <p:nvPr/>
         </p:nvCxnSpPr>
         <p:spPr>
-          <a:xfrm flipV="1">
-            <a:off x="3617494" y="4291265"/>
-            <a:ext cx="1620253" cy="1668378"/>
+          <a:xfrm>
+            <a:off x="2110902" y="3015574"/>
+            <a:ext cx="5077838" cy="0"/>
           </a:xfrm>
           <a:prstGeom prst="line">
             <a:avLst/>
@@ -14527,563 +15142,10 @@
           </a:fontRef>
         </p:style>
       </p:cxnSp>
-      <p:cxnSp>
-        <p:nvCxnSpPr>
-          <p:cNvPr id="11" name="Straight Connector 10">
-            <a:extLst>
-              <a:ext uri="{FF2B5EF4-FFF2-40B4-BE49-F238E27FC236}">
-                <a16:creationId xmlns:a16="http://schemas.microsoft.com/office/drawing/2014/main" id="{A4B179D8-2EB4-4B0C-AA1F-00B1C3644A3D}"/>
-              </a:ext>
-            </a:extLst>
-          </p:cNvPr>
-          <p:cNvCxnSpPr>
-            <a:cxnSpLocks/>
-          </p:cNvCxnSpPr>
-          <p:nvPr/>
-        </p:nvCxnSpPr>
-        <p:spPr>
-          <a:xfrm flipV="1">
-            <a:off x="6825329" y="3541797"/>
-            <a:ext cx="1155028" cy="1860884"/>
-          </a:xfrm>
-          <a:prstGeom prst="line">
-            <a:avLst/>
-          </a:prstGeom>
-        </p:spPr>
-        <p:style>
-          <a:lnRef idx="1">
-            <a:schemeClr val="accent1"/>
-          </a:lnRef>
-          <a:fillRef idx="0">
-            <a:schemeClr val="accent1"/>
-          </a:fillRef>
-          <a:effectRef idx="0">
-            <a:schemeClr val="accent1"/>
-          </a:effectRef>
-          <a:fontRef idx="minor">
-            <a:schemeClr val="tx1"/>
-          </a:fontRef>
-        </p:style>
-      </p:cxnSp>
-      <p:sp>
-        <p:nvSpPr>
-          <p:cNvPr id="14" name="Oval 13">
-            <a:extLst>
-              <a:ext uri="{FF2B5EF4-FFF2-40B4-BE49-F238E27FC236}">
-                <a16:creationId xmlns:a16="http://schemas.microsoft.com/office/drawing/2014/main" id="{A3FB30E0-CD29-4C5E-B40F-8C0976CAE2BB}"/>
-              </a:ext>
-            </a:extLst>
-          </p:cNvPr>
-          <p:cNvSpPr/>
-          <p:nvPr/>
-        </p:nvSpPr>
-        <p:spPr>
-          <a:xfrm>
-            <a:off x="4050631" y="4547937"/>
-            <a:ext cx="152400" cy="136358"/>
-          </a:xfrm>
-          <a:prstGeom prst="ellipse">
-            <a:avLst/>
-          </a:prstGeom>
-          <a:solidFill>
-            <a:srgbClr val="FF0000"/>
-          </a:solidFill>
-          <a:ln>
-            <a:solidFill>
-              <a:srgbClr val="FF0000"/>
-            </a:solidFill>
-          </a:ln>
-        </p:spPr>
-        <p:style>
-          <a:lnRef idx="2">
-            <a:schemeClr val="accent1">
-              <a:shade val="50000"/>
-            </a:schemeClr>
-          </a:lnRef>
-          <a:fillRef idx="1">
-            <a:schemeClr val="accent1"/>
-          </a:fillRef>
-          <a:effectRef idx="0">
-            <a:schemeClr val="accent1"/>
-          </a:effectRef>
-          <a:fontRef idx="minor">
-            <a:schemeClr val="lt1"/>
-          </a:fontRef>
-        </p:style>
-        <p:txBody>
-          <a:bodyPr rtlCol="0" anchor="ctr"/>
-          <a:lstStyle/>
-          <a:p>
-            <a:pPr algn="ctr"/>
-            <a:endParaRPr lang="en-US"/>
-          </a:p>
-        </p:txBody>
-      </p:sp>
-      <p:sp>
-        <p:nvSpPr>
-          <p:cNvPr id="15" name="Oval 14">
-            <a:extLst>
-              <a:ext uri="{FF2B5EF4-FFF2-40B4-BE49-F238E27FC236}">
-                <a16:creationId xmlns:a16="http://schemas.microsoft.com/office/drawing/2014/main" id="{4E009318-9624-43B1-AA16-858CE5B68F3B}"/>
-              </a:ext>
-            </a:extLst>
-          </p:cNvPr>
-          <p:cNvSpPr/>
-          <p:nvPr/>
-        </p:nvSpPr>
-        <p:spPr>
-          <a:xfrm>
-            <a:off x="6896103" y="4011028"/>
-            <a:ext cx="152400" cy="136358"/>
-          </a:xfrm>
-          <a:prstGeom prst="ellipse">
-            <a:avLst/>
-          </a:prstGeom>
-          <a:solidFill>
-            <a:srgbClr val="FF0000"/>
-          </a:solidFill>
-          <a:ln>
-            <a:solidFill>
-              <a:srgbClr val="FF0000"/>
-            </a:solidFill>
-          </a:ln>
-        </p:spPr>
-        <p:style>
-          <a:lnRef idx="2">
-            <a:schemeClr val="accent1">
-              <a:shade val="50000"/>
-            </a:schemeClr>
-          </a:lnRef>
-          <a:fillRef idx="1">
-            <a:schemeClr val="accent1"/>
-          </a:fillRef>
-          <a:effectRef idx="0">
-            <a:schemeClr val="accent1"/>
-          </a:effectRef>
-          <a:fontRef idx="minor">
-            <a:schemeClr val="lt1"/>
-          </a:fontRef>
-        </p:style>
-        <p:txBody>
-          <a:bodyPr rtlCol="0" anchor="ctr"/>
-          <a:lstStyle/>
-          <a:p>
-            <a:pPr algn="ctr"/>
-            <a:endParaRPr lang="en-US"/>
-          </a:p>
-        </p:txBody>
-      </p:sp>
-      <p:sp>
-        <p:nvSpPr>
-          <p:cNvPr id="18" name="TextBox 17">
-            <a:extLst>
-              <a:ext uri="{FF2B5EF4-FFF2-40B4-BE49-F238E27FC236}">
-                <a16:creationId xmlns:a16="http://schemas.microsoft.com/office/drawing/2014/main" id="{5DCF6378-8300-424B-8E82-E506650E4F8A}"/>
-              </a:ext>
-            </a:extLst>
-          </p:cNvPr>
-          <p:cNvSpPr txBox="1"/>
-          <p:nvPr/>
-        </p:nvSpPr>
-        <p:spPr>
-          <a:xfrm>
-            <a:off x="1087138" y="1132153"/>
-            <a:ext cx="9626994" cy="646331"/>
-          </a:xfrm>
-          <a:prstGeom prst="rect">
-            <a:avLst/>
-          </a:prstGeom>
-          <a:noFill/>
-        </p:spPr>
-        <p:txBody>
-          <a:bodyPr wrap="none" rtlCol="0">
-            <a:spAutoFit/>
-          </a:bodyPr>
-          <a:lstStyle/>
-          <a:p>
-            <a:r>
-              <a:rPr lang="en-US" dirty="0"/>
-              <a:t>We can now slide the object based on the remaining forces at the CG (a=f/m; v=</a:t>
-            </a:r>
-            <a:r>
-              <a:rPr lang="en-US" dirty="0" err="1"/>
-              <a:t>v+a</a:t>
-            </a:r>
-            <a:r>
-              <a:rPr lang="en-US" dirty="0"/>
-              <a:t>; p=</a:t>
-            </a:r>
-            <a:r>
-              <a:rPr lang="en-US" dirty="0" err="1"/>
-              <a:t>p+v</a:t>
-            </a:r>
-            <a:r>
-              <a:rPr lang="en-US" dirty="0"/>
-              <a:t>)</a:t>
-            </a:r>
-          </a:p>
-          <a:p>
-            <a:r>
-              <a:rPr lang="en-US" dirty="0"/>
-              <a:t>We can also rotate the object based on the total remaining moments/couples (w=m/j; o=</a:t>
-            </a:r>
-            <a:r>
-              <a:rPr lang="en-US" dirty="0" err="1"/>
-              <a:t>o+w</a:t>
-            </a:r>
-            <a:r>
-              <a:rPr lang="en-US" dirty="0"/>
-              <a:t>; a=</a:t>
-            </a:r>
-            <a:r>
-              <a:rPr lang="en-US" dirty="0" err="1"/>
-              <a:t>a+o</a:t>
-            </a:r>
-            <a:r>
-              <a:rPr lang="en-US" dirty="0"/>
-              <a:t>)</a:t>
-            </a:r>
-          </a:p>
-        </p:txBody>
-      </p:sp>
-      <p:sp>
-        <p:nvSpPr>
-          <p:cNvPr id="20" name="Oval 19">
-            <a:extLst>
-              <a:ext uri="{FF2B5EF4-FFF2-40B4-BE49-F238E27FC236}">
-                <a16:creationId xmlns:a16="http://schemas.microsoft.com/office/drawing/2014/main" id="{A7BC1359-684D-42A1-AAA4-E117CA39024F}"/>
-              </a:ext>
-            </a:extLst>
-          </p:cNvPr>
-          <p:cNvSpPr/>
-          <p:nvPr/>
-        </p:nvSpPr>
-        <p:spPr>
-          <a:xfrm>
-            <a:off x="5320967" y="3609975"/>
-            <a:ext cx="152400" cy="152400"/>
-          </a:xfrm>
-          <a:prstGeom prst="ellipse">
-            <a:avLst/>
-          </a:prstGeom>
-          <a:solidFill>
-            <a:schemeClr val="accent1">
-              <a:lumMod val="60000"/>
-              <a:lumOff val="40000"/>
-            </a:schemeClr>
-          </a:solidFill>
-        </p:spPr>
-        <p:style>
-          <a:lnRef idx="2">
-            <a:schemeClr val="accent1">
-              <a:shade val="50000"/>
-            </a:schemeClr>
-          </a:lnRef>
-          <a:fillRef idx="1">
-            <a:schemeClr val="accent1"/>
-          </a:fillRef>
-          <a:effectRef idx="0">
-            <a:schemeClr val="accent1"/>
-          </a:effectRef>
-          <a:fontRef idx="minor">
-            <a:schemeClr val="lt1"/>
-          </a:fontRef>
-        </p:style>
-        <p:txBody>
-          <a:bodyPr rtlCol="0" anchor="ctr"/>
-          <a:lstStyle/>
-          <a:p>
-            <a:pPr algn="ctr"/>
-            <a:endParaRPr lang="en-US"/>
-          </a:p>
-        </p:txBody>
-      </p:sp>
-      <p:cxnSp>
-        <p:nvCxnSpPr>
-          <p:cNvPr id="13" name="Straight Arrow Connector 12">
-            <a:extLst>
-              <a:ext uri="{FF2B5EF4-FFF2-40B4-BE49-F238E27FC236}">
-                <a16:creationId xmlns:a16="http://schemas.microsoft.com/office/drawing/2014/main" id="{428D3928-A9C7-416F-B8A8-380B17739028}"/>
-              </a:ext>
-            </a:extLst>
-          </p:cNvPr>
-          <p:cNvCxnSpPr>
-            <a:cxnSpLocks/>
-          </p:cNvCxnSpPr>
-          <p:nvPr/>
-        </p:nvCxnSpPr>
-        <p:spPr>
-          <a:xfrm flipH="1">
-            <a:off x="5172176" y="3670784"/>
-            <a:ext cx="227106" cy="0"/>
-          </a:xfrm>
-          <a:prstGeom prst="straightConnector1">
-            <a:avLst/>
-          </a:prstGeom>
-          <a:ln w="44450">
-            <a:solidFill>
-              <a:schemeClr val="accent2"/>
-            </a:solidFill>
-            <a:tailEnd type="triangle"/>
-          </a:ln>
-        </p:spPr>
-        <p:style>
-          <a:lnRef idx="1">
-            <a:schemeClr val="accent1"/>
-          </a:lnRef>
-          <a:fillRef idx="0">
-            <a:schemeClr val="accent1"/>
-          </a:fillRef>
-          <a:effectRef idx="0">
-            <a:schemeClr val="accent1"/>
-          </a:effectRef>
-          <a:fontRef idx="minor">
-            <a:schemeClr val="tx1"/>
-          </a:fontRef>
-        </p:style>
-      </p:cxnSp>
-      <p:cxnSp>
-        <p:nvCxnSpPr>
-          <p:cNvPr id="16" name="Straight Arrow Connector 15">
-            <a:extLst>
-              <a:ext uri="{FF2B5EF4-FFF2-40B4-BE49-F238E27FC236}">
-                <a16:creationId xmlns:a16="http://schemas.microsoft.com/office/drawing/2014/main" id="{F5C687FC-1CC5-48D1-896A-2D656D9D0EF0}"/>
-              </a:ext>
-            </a:extLst>
-          </p:cNvPr>
-          <p:cNvCxnSpPr>
-            <a:cxnSpLocks/>
-          </p:cNvCxnSpPr>
-          <p:nvPr/>
-        </p:nvCxnSpPr>
-        <p:spPr>
-          <a:xfrm>
-            <a:off x="5397167" y="3663465"/>
-            <a:ext cx="0" cy="197820"/>
-          </a:xfrm>
-          <a:prstGeom prst="straightConnector1">
-            <a:avLst/>
-          </a:prstGeom>
-          <a:ln w="44450">
-            <a:solidFill>
-              <a:schemeClr val="accent2"/>
-            </a:solidFill>
-            <a:tailEnd type="triangle"/>
-          </a:ln>
-        </p:spPr>
-        <p:style>
-          <a:lnRef idx="1">
-            <a:schemeClr val="accent1"/>
-          </a:lnRef>
-          <a:fillRef idx="0">
-            <a:schemeClr val="accent1"/>
-          </a:fillRef>
-          <a:effectRef idx="0">
-            <a:schemeClr val="accent1"/>
-          </a:effectRef>
-          <a:fontRef idx="minor">
-            <a:schemeClr val="tx1"/>
-          </a:fontRef>
-        </p:style>
-      </p:cxnSp>
-      <p:cxnSp>
-        <p:nvCxnSpPr>
-          <p:cNvPr id="19" name="Straight Arrow Connector 18">
-            <a:extLst>
-              <a:ext uri="{FF2B5EF4-FFF2-40B4-BE49-F238E27FC236}">
-                <a16:creationId xmlns:a16="http://schemas.microsoft.com/office/drawing/2014/main" id="{85431B5F-3E57-487F-B438-136975A018D4}"/>
-              </a:ext>
-            </a:extLst>
-          </p:cNvPr>
-          <p:cNvCxnSpPr>
-            <a:cxnSpLocks/>
-          </p:cNvCxnSpPr>
-          <p:nvPr/>
-        </p:nvCxnSpPr>
-        <p:spPr>
-          <a:xfrm flipH="1" flipV="1">
-            <a:off x="5411103" y="3382727"/>
-            <a:ext cx="1" cy="296450"/>
-          </a:xfrm>
-          <a:prstGeom prst="straightConnector1">
-            <a:avLst/>
-          </a:prstGeom>
-          <a:ln w="44450">
-            <a:solidFill>
-              <a:schemeClr val="accent6">
-                <a:lumMod val="60000"/>
-                <a:lumOff val="40000"/>
-              </a:schemeClr>
-            </a:solidFill>
-            <a:tailEnd type="triangle"/>
-          </a:ln>
-        </p:spPr>
-        <p:style>
-          <a:lnRef idx="1">
-            <a:schemeClr val="accent1"/>
-          </a:lnRef>
-          <a:fillRef idx="0">
-            <a:schemeClr val="accent1"/>
-          </a:fillRef>
-          <a:effectRef idx="0">
-            <a:schemeClr val="accent1"/>
-          </a:effectRef>
-          <a:fontRef idx="minor">
-            <a:schemeClr val="tx1"/>
-          </a:fontRef>
-        </p:style>
-      </p:cxnSp>
-      <p:cxnSp>
-        <p:nvCxnSpPr>
-          <p:cNvPr id="22" name="Straight Arrow Connector 21">
-            <a:extLst>
-              <a:ext uri="{FF2B5EF4-FFF2-40B4-BE49-F238E27FC236}">
-                <a16:creationId xmlns:a16="http://schemas.microsoft.com/office/drawing/2014/main" id="{1BDB0785-9AA5-4FFE-9FF3-ADFE93F4A0E5}"/>
-              </a:ext>
-            </a:extLst>
-          </p:cNvPr>
-          <p:cNvCxnSpPr>
-            <a:cxnSpLocks/>
-          </p:cNvCxnSpPr>
-          <p:nvPr/>
-        </p:nvCxnSpPr>
-        <p:spPr>
-          <a:xfrm flipV="1">
-            <a:off x="5393654" y="3627686"/>
-            <a:ext cx="235114" cy="29481"/>
-          </a:xfrm>
-          <a:prstGeom prst="straightConnector1">
-            <a:avLst/>
-          </a:prstGeom>
-          <a:ln w="44450">
-            <a:solidFill>
-              <a:schemeClr val="accent6">
-                <a:lumMod val="60000"/>
-                <a:lumOff val="40000"/>
-              </a:schemeClr>
-            </a:solidFill>
-            <a:tailEnd type="triangle"/>
-          </a:ln>
-        </p:spPr>
-        <p:style>
-          <a:lnRef idx="1">
-            <a:schemeClr val="accent1"/>
-          </a:lnRef>
-          <a:fillRef idx="0">
-            <a:schemeClr val="accent1"/>
-          </a:fillRef>
-          <a:effectRef idx="0">
-            <a:schemeClr val="accent1"/>
-          </a:effectRef>
-          <a:fontRef idx="minor">
-            <a:schemeClr val="tx1"/>
-          </a:fontRef>
-        </p:style>
-      </p:cxnSp>
-      <p:sp>
-        <p:nvSpPr>
-          <p:cNvPr id="2" name="Arrow: Curved Right 1">
-            <a:extLst>
-              <a:ext uri="{FF2B5EF4-FFF2-40B4-BE49-F238E27FC236}">
-                <a16:creationId xmlns:a16="http://schemas.microsoft.com/office/drawing/2014/main" id="{EABE806A-F88E-4736-A74E-A28E8054CE48}"/>
-              </a:ext>
-            </a:extLst>
-          </p:cNvPr>
-          <p:cNvSpPr/>
-          <p:nvPr/>
-        </p:nvSpPr>
-        <p:spPr>
-          <a:xfrm>
-            <a:off x="4921227" y="3443405"/>
-            <a:ext cx="228600" cy="485540"/>
-          </a:xfrm>
-          <a:prstGeom prst="curvedRightArrow">
-            <a:avLst/>
-          </a:prstGeom>
-        </p:spPr>
-        <p:style>
-          <a:lnRef idx="2">
-            <a:schemeClr val="accent1">
-              <a:shade val="50000"/>
-            </a:schemeClr>
-          </a:lnRef>
-          <a:fillRef idx="1">
-            <a:schemeClr val="accent1"/>
-          </a:fillRef>
-          <a:effectRef idx="0">
-            <a:schemeClr val="accent1"/>
-          </a:effectRef>
-          <a:fontRef idx="minor">
-            <a:schemeClr val="lt1"/>
-          </a:fontRef>
-        </p:style>
-        <p:txBody>
-          <a:bodyPr rtlCol="0" anchor="ctr"/>
-          <a:lstStyle/>
-          <a:p>
-            <a:pPr algn="ctr"/>
-            <a:endParaRPr lang="en-US">
-              <a:solidFill>
-                <a:schemeClr val="tx1"/>
-              </a:solidFill>
-            </a:endParaRPr>
-          </a:p>
-        </p:txBody>
-      </p:sp>
-      <p:sp>
-        <p:nvSpPr>
-          <p:cNvPr id="6" name="Arrow: Curved Left 5">
-            <a:extLst>
-              <a:ext uri="{FF2B5EF4-FFF2-40B4-BE49-F238E27FC236}">
-                <a16:creationId xmlns:a16="http://schemas.microsoft.com/office/drawing/2014/main" id="{29D4C0EF-A93B-42EE-8EDD-06271083FBFB}"/>
-              </a:ext>
-            </a:extLst>
-          </p:cNvPr>
-          <p:cNvSpPr/>
-          <p:nvPr/>
-        </p:nvSpPr>
-        <p:spPr>
-          <a:xfrm>
-            <a:off x="5614319" y="3366126"/>
-            <a:ext cx="251792" cy="523120"/>
-          </a:xfrm>
-          <a:prstGeom prst="curvedLeftArrow">
-            <a:avLst/>
-          </a:prstGeom>
-        </p:spPr>
-        <p:style>
-          <a:lnRef idx="2">
-            <a:schemeClr val="accent1">
-              <a:shade val="50000"/>
-            </a:schemeClr>
-          </a:lnRef>
-          <a:fillRef idx="1">
-            <a:schemeClr val="accent1"/>
-          </a:fillRef>
-          <a:effectRef idx="0">
-            <a:schemeClr val="accent1"/>
-          </a:effectRef>
-          <a:fontRef idx="minor">
-            <a:schemeClr val="lt1"/>
-          </a:fontRef>
-        </p:style>
-        <p:txBody>
-          <a:bodyPr rtlCol="0" anchor="ctr"/>
-          <a:lstStyle/>
-          <a:p>
-            <a:pPr algn="ctr"/>
-            <a:endParaRPr lang="en-US">
-              <a:solidFill>
-                <a:schemeClr val="tx1"/>
-              </a:solidFill>
-            </a:endParaRPr>
-          </a:p>
-        </p:txBody>
-      </p:sp>
     </p:spTree>
     <p:extLst>
       <p:ext uri="{BB962C8B-B14F-4D97-AF65-F5344CB8AC3E}">
-        <p14:creationId xmlns:p14="http://schemas.microsoft.com/office/powerpoint/2010/main" val="2055049088"/>
+        <p14:creationId xmlns:p14="http://schemas.microsoft.com/office/powerpoint/2010/main" val="1143430906"/>
       </p:ext>
     </p:extLst>
   </p:cSld>
@@ -16779,8 +16841,8 @@
         </p:nvCxnSpPr>
         <p:spPr>
           <a:xfrm flipV="1">
-            <a:off x="3220646" y="3874065"/>
-            <a:ext cx="1709761" cy="1610511"/>
+            <a:off x="3308198" y="3920248"/>
+            <a:ext cx="1480556" cy="1603241"/>
           </a:xfrm>
           <a:prstGeom prst="straightConnector1">
             <a:avLst/>
@@ -18557,8 +18619,8 @@
         </p:nvCxnSpPr>
         <p:spPr>
           <a:xfrm flipH="1" flipV="1">
-            <a:off x="5274038" y="3225098"/>
-            <a:ext cx="517545" cy="1875114"/>
+            <a:off x="5292145" y="3225098"/>
+            <a:ext cx="445592" cy="1875114"/>
           </a:xfrm>
           <a:prstGeom prst="straightConnector1">
             <a:avLst/>
@@ -19909,7 +19971,7 @@
             </a:r>
             <a:r>
               <a:rPr lang="en-US" dirty="0"/>
-              <a:t> * sin (alpha-theta) 			– this result will be along the positive </a:t>
+              <a:t> * cos (alpha-theta)) 			– this result will be along the positive </a:t>
             </a:r>
             <a:r>
               <a:rPr lang="en-US" dirty="0" err="1"/>

</xml_diff>

<commit_message>
even more force model math
</commit_message>
<xml_diff>
--- a/vehicle forces.pptx
+++ b/vehicle forces.pptx
@@ -24,7 +24,6 @@
     <p:sldId id="283" r:id="rId18"/>
     <p:sldId id="272" r:id="rId19"/>
     <p:sldId id="273" r:id="rId20"/>
-    <p:sldId id="281" r:id="rId21"/>
   </p:sldIdLst>
   <p:sldSz cx="12192000" cy="6858000"/>
   <p:notesSz cx="6858000" cy="9144000"/>
@@ -12271,7 +12270,7 @@
         <p:spPr>
           <a:xfrm>
             <a:off x="217272" y="137492"/>
-            <a:ext cx="8420696" cy="2862322"/>
+            <a:ext cx="10249690" cy="3139321"/>
           </a:xfrm>
           <a:prstGeom prst="rect">
             <a:avLst/>
@@ -12314,7 +12313,7 @@
           <a:p>
             <a:r>
               <a:rPr lang="en-US" dirty="0"/>
-              <a:t>15x = (</a:t>
+              <a:t>15x = Max(0,(</a:t>
             </a:r>
             <a:r>
               <a:rPr lang="en-US" dirty="0" err="1"/>
@@ -12322,13 +12321,13 @@
             </a:r>
             <a:r>
               <a:rPr lang="en-US" dirty="0"/>
-              <a:t> * sin (alpha-theta)* cos(alpha – theta) + W1 * cos(alpha))* sin(alpha)</a:t>
-            </a:r>
-          </a:p>
-          <a:p>
-            <a:r>
-              <a:rPr lang="en-US" dirty="0"/>
-              <a:t>15y = (</a:t>
+              <a:t> * sin (alpha-theta)* cos(alpha – theta) + W1 * cos(alpha)),0) * sin(alpha)</a:t>
+            </a:r>
+          </a:p>
+          <a:p>
+            <a:r>
+              <a:rPr lang="en-US" dirty="0"/>
+              <a:t>15y = Max((</a:t>
             </a:r>
             <a:r>
               <a:rPr lang="en-US" dirty="0" err="1"/>
@@ -12336,13 +12335,16 @@
             </a:r>
             <a:r>
               <a:rPr lang="en-US" dirty="0"/>
-              <a:t> * sin (alpha-theta)* cos(alpha – theta) + W1 * cos(alpha))* cos(alpha)</a:t>
-            </a:r>
-          </a:p>
-          <a:p>
-            <a:r>
-              <a:rPr lang="en-US" dirty="0"/>
-              <a:t>16x = (</a:t>
+              <a:t> * sin (alpha-theta)* cos(alpha – theta) + W1 * cos(alpha)),0) * cos(alpha)</a:t>
+            </a:r>
+          </a:p>
+          <a:p>
+            <a:endParaRPr lang="en-US" dirty="0"/>
+          </a:p>
+          <a:p>
+            <a:r>
+              <a:rPr lang="en-US" dirty="0"/>
+              <a:t>16x = Max((</a:t>
             </a:r>
             <a:r>
               <a:rPr lang="en-US" dirty="0" err="1"/>
@@ -12350,13 +12352,13 @@
             </a:r>
             <a:r>
               <a:rPr lang="en-US" dirty="0"/>
-              <a:t> * cos(alpha-theta) * sin(90+beta-theta) + W2 * cos(beta))* sin(beta)</a:t>
-            </a:r>
-          </a:p>
-          <a:p>
-            <a:r>
-              <a:rPr lang="en-US" dirty="0"/>
-              <a:t>16y = (</a:t>
+              <a:t> * cos(alpha-theta) * sin(90+beta-theta) + W2 * cos(beta)),0) * sin(beta)</a:t>
+            </a:r>
+          </a:p>
+          <a:p>
+            <a:r>
+              <a:rPr lang="en-US" dirty="0"/>
+              <a:t>16y = Max((</a:t>
             </a:r>
             <a:r>
               <a:rPr lang="en-US" dirty="0" err="1"/>
@@ -12364,7 +12366,7 @@
             </a:r>
             <a:r>
               <a:rPr lang="en-US" dirty="0"/>
-              <a:t> * cos(alpha-theta) * sin(90+beta-theta) + W2 * cos(beta))* cos(beta)</a:t>
+              <a:t> * cos(alpha-theta) * sin(90+beta-theta) + W2 * cos(beta)),0) * cos(beta)</a:t>
             </a:r>
           </a:p>
           <a:p>
@@ -12378,7 +12380,7 @@
             </a:r>
             <a:r>
               <a:rPr lang="en-US" dirty="0"/>
-              <a:t> * cos (alpha-theta) * cos(beta-theta) + W2 * sin(beta)) 	* cos(beta)</a:t>
+              <a:t> * cos (alpha-theta) * cos(beta-theta) + W2 * sin(beta)) * cos(beta)</a:t>
             </a:r>
           </a:p>
           <a:p>
@@ -12392,7 +12394,7 @@
             </a:r>
             <a:r>
               <a:rPr lang="en-US" dirty="0"/>
-              <a:t> * cos (alpha-theta) * cos(beta-theta) + W2 * sin(beta)) 	* sin(beta)</a:t>
+              <a:t> * cos (alpha-theta) * cos(beta-theta) + W2 * sin(beta)) * sin(beta)</a:t>
             </a:r>
             <a:endParaRPr lang="en-US" b="1" dirty="0"/>
           </a:p>
@@ -12990,47 +12992,6 @@
       </p:sp>
       <p:sp>
         <p:nvSpPr>
-          <p:cNvPr id="18" name="TextBox 17">
-            <a:extLst>
-              <a:ext uri="{FF2B5EF4-FFF2-40B4-BE49-F238E27FC236}">
-                <a16:creationId xmlns:a16="http://schemas.microsoft.com/office/drawing/2014/main" id="{5DCF6378-8300-424B-8E82-E506650E4F8A}"/>
-              </a:ext>
-            </a:extLst>
-          </p:cNvPr>
-          <p:cNvSpPr txBox="1"/>
-          <p:nvPr/>
-        </p:nvSpPr>
-        <p:spPr>
-          <a:xfrm>
-            <a:off x="2104631" y="1085987"/>
-            <a:ext cx="8004820" cy="646331"/>
-          </a:xfrm>
-          <a:prstGeom prst="rect">
-            <a:avLst/>
-          </a:prstGeom>
-          <a:noFill/>
-        </p:spPr>
-        <p:txBody>
-          <a:bodyPr wrap="none" rtlCol="0">
-            <a:spAutoFit/>
-          </a:bodyPr>
-          <a:lstStyle/>
-          <a:p>
-            <a:r>
-              <a:rPr lang="en-US" dirty="0"/>
-              <a:t>These forces can be relocated to the CG of the vehicle</a:t>
-            </a:r>
-          </a:p>
-          <a:p>
-            <a:r>
-              <a:rPr lang="en-US" dirty="0"/>
-              <a:t>(but we will need to add a force couple which will be calculated by the ‘lever’ arms)</a:t>
-            </a:r>
-          </a:p>
-        </p:txBody>
-      </p:sp>
-      <p:sp>
-        <p:nvSpPr>
           <p:cNvPr id="20" name="Oval 19">
             <a:extLst>
               <a:ext uri="{FF2B5EF4-FFF2-40B4-BE49-F238E27FC236}">
@@ -13611,6 +13572,210 @@
           </a:fontRef>
         </p:style>
       </p:cxnSp>
+      <p:sp>
+        <p:nvSpPr>
+          <p:cNvPr id="23" name="TextBox 22">
+            <a:extLst>
+              <a:ext uri="{FF2B5EF4-FFF2-40B4-BE49-F238E27FC236}">
+                <a16:creationId xmlns:a16="http://schemas.microsoft.com/office/drawing/2014/main" id="{3338068C-1E0B-D148-A6E9-11D0345BE971}"/>
+              </a:ext>
+            </a:extLst>
+          </p:cNvPr>
+          <p:cNvSpPr txBox="1"/>
+          <p:nvPr/>
+        </p:nvSpPr>
+        <p:spPr>
+          <a:xfrm>
+            <a:off x="217272" y="137492"/>
+            <a:ext cx="10249690" cy="3139321"/>
+          </a:xfrm>
+          <a:prstGeom prst="rect">
+            <a:avLst/>
+          </a:prstGeom>
+          <a:noFill/>
+        </p:spPr>
+        <p:txBody>
+          <a:bodyPr wrap="square" rtlCol="0">
+            <a:spAutoFit/>
+          </a:bodyPr>
+          <a:lstStyle/>
+          <a:p>
+            <a:r>
+              <a:rPr lang="en-US" dirty="0"/>
+              <a:t>14x = (</a:t>
+            </a:r>
+            <a:r>
+              <a:rPr lang="en-US" dirty="0" err="1"/>
+              <a:t>Fout</a:t>
+            </a:r>
+            <a:r>
+              <a:rPr lang="en-US" dirty="0"/>
+              <a:t> * sin (alpha-theta)* sin(alpha– theta) +  W1 * sin(alpha))	* cos(alpha)</a:t>
+            </a:r>
+          </a:p>
+          <a:p>
+            <a:r>
+              <a:rPr lang="en-US" dirty="0"/>
+              <a:t>15x = Max(0,(</a:t>
+            </a:r>
+            <a:r>
+              <a:rPr lang="en-US" dirty="0" err="1"/>
+              <a:t>Fout</a:t>
+            </a:r>
+            <a:r>
+              <a:rPr lang="en-US" dirty="0"/>
+              <a:t> * sin (alpha-theta)* cos(alpha – theta) + W1 * cos(alpha)),0) * sin(alpha)</a:t>
+            </a:r>
+          </a:p>
+          <a:p>
+            <a:r>
+              <a:rPr lang="en-US" dirty="0"/>
+              <a:t>16x = Max((</a:t>
+            </a:r>
+            <a:r>
+              <a:rPr lang="en-US" dirty="0" err="1"/>
+              <a:t>Fout</a:t>
+            </a:r>
+            <a:r>
+              <a:rPr lang="en-US" dirty="0"/>
+              <a:t> * cos(alpha-theta) * sin(90+beta-theta) + W2 * cos(beta)),0) * sin(beta)</a:t>
+            </a:r>
+          </a:p>
+          <a:p>
+            <a:r>
+              <a:rPr lang="en-US" dirty="0"/>
+              <a:t>17x = (</a:t>
+            </a:r>
+            <a:r>
+              <a:rPr lang="en-US" dirty="0" err="1"/>
+              <a:t>Fout</a:t>
+            </a:r>
+            <a:r>
+              <a:rPr lang="en-US" dirty="0"/>
+              <a:t> * cos (alpha-theta) * cos(beta-theta) + W2 * sin(beta)) * cos(beta)</a:t>
+            </a:r>
+          </a:p>
+          <a:p>
+            <a:endParaRPr lang="en-US" dirty="0"/>
+          </a:p>
+          <a:p>
+            <a:r>
+              <a:rPr lang="en-US" dirty="0"/>
+              <a:t>14y = (</a:t>
+            </a:r>
+            <a:r>
+              <a:rPr lang="en-US" dirty="0" err="1"/>
+              <a:t>Fout</a:t>
+            </a:r>
+            <a:r>
+              <a:rPr lang="en-US" dirty="0"/>
+              <a:t> * sin (alpha-theta)* sin(alpha– theta) +  W1 * sin(alpha)) 	* sin(alpha)</a:t>
+            </a:r>
+          </a:p>
+          <a:p>
+            <a:r>
+              <a:rPr lang="en-US" dirty="0"/>
+              <a:t>15y = Max((</a:t>
+            </a:r>
+            <a:r>
+              <a:rPr lang="en-US" dirty="0" err="1"/>
+              <a:t>Fout</a:t>
+            </a:r>
+            <a:r>
+              <a:rPr lang="en-US" dirty="0"/>
+              <a:t> * sin (alpha-theta)* cos(alpha – theta) + W1 * cos(alpha)),0) * cos(alpha)</a:t>
+            </a:r>
+          </a:p>
+          <a:p>
+            <a:r>
+              <a:rPr lang="en-US" dirty="0"/>
+              <a:t>16y = Max((</a:t>
+            </a:r>
+            <a:r>
+              <a:rPr lang="en-US" dirty="0" err="1"/>
+              <a:t>Fout</a:t>
+            </a:r>
+            <a:r>
+              <a:rPr lang="en-US" dirty="0"/>
+              <a:t> * cos(alpha-theta) * sin(90+beta-theta) + W2 * cos(beta)),0) * cos(beta)</a:t>
+            </a:r>
+          </a:p>
+          <a:p>
+            <a:r>
+              <a:rPr lang="en-US" dirty="0"/>
+              <a:t>17y = (</a:t>
+            </a:r>
+            <a:r>
+              <a:rPr lang="en-US" dirty="0" err="1"/>
+              <a:t>Fout</a:t>
+            </a:r>
+            <a:r>
+              <a:rPr lang="en-US" dirty="0"/>
+              <a:t> * cos (alpha-theta) * cos(beta-theta) + W2 * sin(beta)) * sin(beta)</a:t>
+            </a:r>
+            <a:endParaRPr lang="en-US" b="1" dirty="0"/>
+          </a:p>
+          <a:p>
+            <a:endParaRPr lang="en-US" dirty="0"/>
+          </a:p>
+          <a:p>
+            <a:endParaRPr lang="en-US" dirty="0"/>
+          </a:p>
+        </p:txBody>
+      </p:sp>
+      <p:sp>
+        <p:nvSpPr>
+          <p:cNvPr id="2" name="TextBox 1">
+            <a:extLst>
+              <a:ext uri="{FF2B5EF4-FFF2-40B4-BE49-F238E27FC236}">
+                <a16:creationId xmlns:a16="http://schemas.microsoft.com/office/drawing/2014/main" id="{798C3D4E-C712-A549-9D48-4427170FCB2B}"/>
+              </a:ext>
+            </a:extLst>
+          </p:cNvPr>
+          <p:cNvSpPr txBox="1"/>
+          <p:nvPr/>
+        </p:nvSpPr>
+        <p:spPr>
+          <a:xfrm>
+            <a:off x="8117746" y="5016428"/>
+            <a:ext cx="3471720" cy="1200329"/>
+          </a:xfrm>
+          <a:prstGeom prst="rect">
+            <a:avLst/>
+          </a:prstGeom>
+          <a:noFill/>
+        </p:spPr>
+        <p:txBody>
+          <a:bodyPr wrap="none" rtlCol="0">
+            <a:spAutoFit/>
+          </a:bodyPr>
+          <a:lstStyle/>
+          <a:p>
+            <a:r>
+              <a:rPr lang="en-US" dirty="0"/>
+              <a:t>Sum the X direction forces</a:t>
+            </a:r>
+          </a:p>
+          <a:p>
+            <a:r>
+              <a:rPr lang="en-US" dirty="0"/>
+              <a:t>Sum the Y direction forces</a:t>
+            </a:r>
+          </a:p>
+          <a:p>
+            <a:r>
+              <a:rPr lang="en-US" dirty="0"/>
+              <a:t>Sum the clockwise torques</a:t>
+            </a:r>
+          </a:p>
+          <a:p>
+            <a:r>
+              <a:rPr lang="en-US" dirty="0"/>
+              <a:t>Sum the counter clockwise torques</a:t>
+            </a:r>
+          </a:p>
+        </p:txBody>
+      </p:sp>
     </p:spTree>
     <p:extLst>
       <p:ext uri="{BB962C8B-B14F-4D97-AF65-F5344CB8AC3E}">
@@ -13982,7 +14147,7 @@
         </p:nvSpPr>
         <p:spPr>
           <a:xfrm>
-            <a:off x="1087138" y="1132153"/>
+            <a:off x="424250" y="392851"/>
             <a:ext cx="9626994" cy="646331"/>
           </a:xfrm>
           <a:prstGeom prst="rect">
@@ -14372,6 +14537,61 @@
                 <a:schemeClr val="tx1"/>
               </a:solidFill>
             </a:endParaRPr>
+          </a:p>
+        </p:txBody>
+      </p:sp>
+      <p:sp>
+        <p:nvSpPr>
+          <p:cNvPr id="17" name="TextBox 16">
+            <a:extLst>
+              <a:ext uri="{FF2B5EF4-FFF2-40B4-BE49-F238E27FC236}">
+                <a16:creationId xmlns:a16="http://schemas.microsoft.com/office/drawing/2014/main" id="{1E29AF97-C8CF-374C-8C0C-815305074C77}"/>
+              </a:ext>
+            </a:extLst>
+          </p:cNvPr>
+          <p:cNvSpPr txBox="1"/>
+          <p:nvPr/>
+        </p:nvSpPr>
+        <p:spPr>
+          <a:xfrm>
+            <a:off x="1528324" y="1423801"/>
+            <a:ext cx="8423781" cy="923330"/>
+          </a:xfrm>
+          <a:prstGeom prst="rect">
+            <a:avLst/>
+          </a:prstGeom>
+          <a:noFill/>
+        </p:spPr>
+        <p:txBody>
+          <a:bodyPr wrap="none" rtlCol="0">
+            <a:spAutoFit/>
+          </a:bodyPr>
+          <a:lstStyle/>
+          <a:p>
+            <a:r>
+              <a:rPr lang="en-US" dirty="0"/>
+              <a:t>Use sum of X forces to calculate x component of linear acceleration</a:t>
+            </a:r>
+          </a:p>
+          <a:p>
+            <a:r>
+              <a:rPr lang="en-US" dirty="0"/>
+              <a:t>Use sum of Y forces to </a:t>
+            </a:r>
+            <a:r>
+              <a:rPr lang="en-US" dirty="0" err="1"/>
+              <a:t>calcualate</a:t>
+            </a:r>
+            <a:r>
+              <a:rPr lang="en-US" dirty="0"/>
+              <a:t> y components of linear acceleration</a:t>
+            </a:r>
+          </a:p>
+          <a:p>
+            <a:r>
+              <a:rPr lang="en-US" dirty="0"/>
+              <a:t>Use clockwise-counter clockwise torques to calculate the clockwise angular acceleration</a:t>
+            </a:r>
           </a:p>
         </p:txBody>
       </p:sp>
@@ -15042,110 +15262,6 @@
     <p:extLst>
       <p:ext uri="{BB962C8B-B14F-4D97-AF65-F5344CB8AC3E}">
         <p14:creationId xmlns:p14="http://schemas.microsoft.com/office/powerpoint/2010/main" val="3265621994"/>
-      </p:ext>
-    </p:extLst>
-  </p:cSld>
-  <p:clrMapOvr>
-    <a:masterClrMapping/>
-  </p:clrMapOvr>
-</p:sld>
-</file>
-
-<file path=ppt/slides/slide20.xml><?xml version="1.0" encoding="utf-8"?>
-<p:sld xmlns:a="http://schemas.openxmlformats.org/drawingml/2006/main" xmlns:r="http://schemas.openxmlformats.org/officeDocument/2006/relationships" xmlns:p="http://schemas.openxmlformats.org/presentationml/2006/main">
-  <p:cSld>
-    <p:spTree>
-      <p:nvGrpSpPr>
-        <p:cNvPr id="1" name=""/>
-        <p:cNvGrpSpPr/>
-        <p:nvPr/>
-      </p:nvGrpSpPr>
-      <p:grpSpPr>
-        <a:xfrm>
-          <a:off x="0" y="0"/>
-          <a:ext cx="0" cy="0"/>
-          <a:chOff x="0" y="0"/>
-          <a:chExt cx="0" cy="0"/>
-        </a:xfrm>
-      </p:grpSpPr>
-      <p:cxnSp>
-        <p:nvCxnSpPr>
-          <p:cNvPr id="5" name="Straight Connector 4">
-            <a:extLst>
-              <a:ext uri="{FF2B5EF4-FFF2-40B4-BE49-F238E27FC236}">
-                <a16:creationId xmlns:a16="http://schemas.microsoft.com/office/drawing/2014/main" id="{36C174B4-F53C-7D4A-BC68-FE7F1D058050}"/>
-              </a:ext>
-            </a:extLst>
-          </p:cNvPr>
-          <p:cNvCxnSpPr/>
-          <p:nvPr/>
-        </p:nvCxnSpPr>
-        <p:spPr>
-          <a:xfrm>
-            <a:off x="4494179" y="758757"/>
-            <a:ext cx="0" cy="5321030"/>
-          </a:xfrm>
-          <a:prstGeom prst="line">
-            <a:avLst/>
-          </a:prstGeom>
-        </p:spPr>
-        <p:style>
-          <a:lnRef idx="1">
-            <a:schemeClr val="accent1"/>
-          </a:lnRef>
-          <a:fillRef idx="0">
-            <a:schemeClr val="accent1"/>
-          </a:fillRef>
-          <a:effectRef idx="0">
-            <a:schemeClr val="accent1"/>
-          </a:effectRef>
-          <a:fontRef idx="minor">
-            <a:schemeClr val="tx1"/>
-          </a:fontRef>
-        </p:style>
-      </p:cxnSp>
-      <p:cxnSp>
-        <p:nvCxnSpPr>
-          <p:cNvPr id="6" name="Straight Connector 5">
-            <a:extLst>
-              <a:ext uri="{FF2B5EF4-FFF2-40B4-BE49-F238E27FC236}">
-                <a16:creationId xmlns:a16="http://schemas.microsoft.com/office/drawing/2014/main" id="{228B1AC0-F11E-9C48-A888-C43D0C551F12}"/>
-              </a:ext>
-            </a:extLst>
-          </p:cNvPr>
-          <p:cNvCxnSpPr>
-            <a:cxnSpLocks/>
-          </p:cNvCxnSpPr>
-          <p:nvPr/>
-        </p:nvCxnSpPr>
-        <p:spPr>
-          <a:xfrm>
-            <a:off x="2110902" y="3015574"/>
-            <a:ext cx="5077838" cy="0"/>
-          </a:xfrm>
-          <a:prstGeom prst="line">
-            <a:avLst/>
-          </a:prstGeom>
-        </p:spPr>
-        <p:style>
-          <a:lnRef idx="1">
-            <a:schemeClr val="accent1"/>
-          </a:lnRef>
-          <a:fillRef idx="0">
-            <a:schemeClr val="accent1"/>
-          </a:fillRef>
-          <a:effectRef idx="0">
-            <a:schemeClr val="accent1"/>
-          </a:effectRef>
-          <a:fontRef idx="minor">
-            <a:schemeClr val="tx1"/>
-          </a:fontRef>
-        </p:style>
-      </p:cxnSp>
-    </p:spTree>
-    <p:extLst>
-      <p:ext uri="{BB962C8B-B14F-4D97-AF65-F5344CB8AC3E}">
-        <p14:creationId xmlns:p14="http://schemas.microsoft.com/office/powerpoint/2010/main" val="1143430906"/>
       </p:ext>
     </p:extLst>
   </p:cSld>

</xml_diff>

<commit_message>
started physics model - lots to do!
</commit_message>
<xml_diff>
--- a/vehicle forces.pptx
+++ b/vehicle forces.pptx
@@ -25,6 +25,10 @@
     <p:sldId id="283" r:id="rId19"/>
     <p:sldId id="272" r:id="rId20"/>
     <p:sldId id="273" r:id="rId21"/>
+    <p:sldId id="285" r:id="rId22"/>
+    <p:sldId id="287" r:id="rId23"/>
+    <p:sldId id="288" r:id="rId24"/>
+    <p:sldId id="289" r:id="rId25"/>
   </p:sldIdLst>
   <p:sldSz cx="12192000" cy="6858000"/>
   <p:notesSz cx="6858000" cy="9144000"/>
@@ -278,7 +282,7 @@
           <a:p>
             <a:fld id="{96DFC8BC-9833-445E-8087-9E2B159065C8}" type="datetimeFigureOut">
               <a:rPr lang="en-US" smtClean="0"/>
-              <a:t>2/7/19</a:t>
+              <a:t>2/10/19</a:t>
             </a:fld>
             <a:endParaRPr lang="en-US"/>
           </a:p>
@@ -476,7 +480,7 @@
           <a:p>
             <a:fld id="{96DFC8BC-9833-445E-8087-9E2B159065C8}" type="datetimeFigureOut">
               <a:rPr lang="en-US" smtClean="0"/>
-              <a:t>2/7/19</a:t>
+              <a:t>2/10/19</a:t>
             </a:fld>
             <a:endParaRPr lang="en-US"/>
           </a:p>
@@ -684,7 +688,7 @@
           <a:p>
             <a:fld id="{96DFC8BC-9833-445E-8087-9E2B159065C8}" type="datetimeFigureOut">
               <a:rPr lang="en-US" smtClean="0"/>
-              <a:t>2/7/19</a:t>
+              <a:t>2/10/19</a:t>
             </a:fld>
             <a:endParaRPr lang="en-US"/>
           </a:p>
@@ -882,7 +886,7 @@
           <a:p>
             <a:fld id="{96DFC8BC-9833-445E-8087-9E2B159065C8}" type="datetimeFigureOut">
               <a:rPr lang="en-US" smtClean="0"/>
-              <a:t>2/7/19</a:t>
+              <a:t>2/10/19</a:t>
             </a:fld>
             <a:endParaRPr lang="en-US"/>
           </a:p>
@@ -1157,7 +1161,7 @@
           <a:p>
             <a:fld id="{96DFC8BC-9833-445E-8087-9E2B159065C8}" type="datetimeFigureOut">
               <a:rPr lang="en-US" smtClean="0"/>
-              <a:t>2/7/19</a:t>
+              <a:t>2/10/19</a:t>
             </a:fld>
             <a:endParaRPr lang="en-US"/>
           </a:p>
@@ -1422,7 +1426,7 @@
           <a:p>
             <a:fld id="{96DFC8BC-9833-445E-8087-9E2B159065C8}" type="datetimeFigureOut">
               <a:rPr lang="en-US" smtClean="0"/>
-              <a:t>2/7/19</a:t>
+              <a:t>2/10/19</a:t>
             </a:fld>
             <a:endParaRPr lang="en-US"/>
           </a:p>
@@ -1834,7 +1838,7 @@
           <a:p>
             <a:fld id="{96DFC8BC-9833-445E-8087-9E2B159065C8}" type="datetimeFigureOut">
               <a:rPr lang="en-US" smtClean="0"/>
-              <a:t>2/7/19</a:t>
+              <a:t>2/10/19</a:t>
             </a:fld>
             <a:endParaRPr lang="en-US"/>
           </a:p>
@@ -1975,7 +1979,7 @@
           <a:p>
             <a:fld id="{96DFC8BC-9833-445E-8087-9E2B159065C8}" type="datetimeFigureOut">
               <a:rPr lang="en-US" smtClean="0"/>
-              <a:t>2/7/19</a:t>
+              <a:t>2/10/19</a:t>
             </a:fld>
             <a:endParaRPr lang="en-US"/>
           </a:p>
@@ -2088,7 +2092,7 @@
           <a:p>
             <a:fld id="{96DFC8BC-9833-445E-8087-9E2B159065C8}" type="datetimeFigureOut">
               <a:rPr lang="en-US" smtClean="0"/>
-              <a:t>2/7/19</a:t>
+              <a:t>2/10/19</a:t>
             </a:fld>
             <a:endParaRPr lang="en-US"/>
           </a:p>
@@ -2399,7 +2403,7 @@
           <a:p>
             <a:fld id="{96DFC8BC-9833-445E-8087-9E2B159065C8}" type="datetimeFigureOut">
               <a:rPr lang="en-US" smtClean="0"/>
-              <a:t>2/7/19</a:t>
+              <a:t>2/10/19</a:t>
             </a:fld>
             <a:endParaRPr lang="en-US"/>
           </a:p>
@@ -2687,7 +2691,7 @@
           <a:p>
             <a:fld id="{96DFC8BC-9833-445E-8087-9E2B159065C8}" type="datetimeFigureOut">
               <a:rPr lang="en-US" smtClean="0"/>
-              <a:t>2/7/19</a:t>
+              <a:t>2/10/19</a:t>
             </a:fld>
             <a:endParaRPr lang="en-US"/>
           </a:p>
@@ -2928,7 +2932,7 @@
           <a:p>
             <a:fld id="{96DFC8BC-9833-445E-8087-9E2B159065C8}" type="datetimeFigureOut">
               <a:rPr lang="en-US" smtClean="0"/>
-              <a:t>2/7/19</a:t>
+              <a:t>2/10/19</a:t>
             </a:fld>
             <a:endParaRPr lang="en-US"/>
           </a:p>
@@ -15894,6 +15898,2785 @@
 </p:sld>
 </file>
 
+<file path=ppt/slides/slide21.xml><?xml version="1.0" encoding="utf-8"?>
+<p:sld xmlns:a="http://schemas.openxmlformats.org/drawingml/2006/main" xmlns:r="http://schemas.openxmlformats.org/officeDocument/2006/relationships" xmlns:p="http://schemas.openxmlformats.org/presentationml/2006/main">
+  <p:cSld>
+    <p:spTree>
+      <p:nvGrpSpPr>
+        <p:cNvPr id="1" name=""/>
+        <p:cNvGrpSpPr/>
+        <p:nvPr/>
+      </p:nvGrpSpPr>
+      <p:grpSpPr>
+        <a:xfrm>
+          <a:off x="0" y="0"/>
+          <a:ext cx="0" cy="0"/>
+          <a:chOff x="0" y="0"/>
+          <a:chExt cx="0" cy="0"/>
+        </a:xfrm>
+      </p:grpSpPr>
+      <p:cxnSp>
+        <p:nvCxnSpPr>
+          <p:cNvPr id="5" name="Straight Connector 4">
+            <a:extLst>
+              <a:ext uri="{FF2B5EF4-FFF2-40B4-BE49-F238E27FC236}">
+                <a16:creationId xmlns:a16="http://schemas.microsoft.com/office/drawing/2014/main" id="{B055A77E-72CB-0946-BD9D-41439C76A4FB}"/>
+              </a:ext>
+            </a:extLst>
+          </p:cNvPr>
+          <p:cNvCxnSpPr/>
+          <p:nvPr/>
+        </p:nvCxnSpPr>
+        <p:spPr>
+          <a:xfrm>
+            <a:off x="1264596" y="612843"/>
+            <a:ext cx="0" cy="4902740"/>
+          </a:xfrm>
+          <a:prstGeom prst="line">
+            <a:avLst/>
+          </a:prstGeom>
+        </p:spPr>
+        <p:style>
+          <a:lnRef idx="1">
+            <a:schemeClr val="accent1"/>
+          </a:lnRef>
+          <a:fillRef idx="0">
+            <a:schemeClr val="accent1"/>
+          </a:fillRef>
+          <a:effectRef idx="0">
+            <a:schemeClr val="accent1"/>
+          </a:effectRef>
+          <a:fontRef idx="minor">
+            <a:schemeClr val="tx1"/>
+          </a:fontRef>
+        </p:style>
+      </p:cxnSp>
+      <p:sp>
+        <p:nvSpPr>
+          <p:cNvPr id="6" name="TextBox 5">
+            <a:extLst>
+              <a:ext uri="{FF2B5EF4-FFF2-40B4-BE49-F238E27FC236}">
+                <a16:creationId xmlns:a16="http://schemas.microsoft.com/office/drawing/2014/main" id="{32262AB3-2DC8-A84C-B28E-4C672ED88E12}"/>
+              </a:ext>
+            </a:extLst>
+          </p:cNvPr>
+          <p:cNvSpPr txBox="1"/>
+          <p:nvPr/>
+        </p:nvSpPr>
+        <p:spPr>
+          <a:xfrm>
+            <a:off x="1391055" y="428177"/>
+            <a:ext cx="301686" cy="369332"/>
+          </a:xfrm>
+          <a:prstGeom prst="rect">
+            <a:avLst/>
+          </a:prstGeom>
+          <a:noFill/>
+        </p:spPr>
+        <p:txBody>
+          <a:bodyPr wrap="none" rtlCol="0">
+            <a:spAutoFit/>
+          </a:bodyPr>
+          <a:lstStyle/>
+          <a:p>
+            <a:r>
+              <a:rPr lang="en-US" dirty="0"/>
+              <a:t>0</a:t>
+            </a:r>
+          </a:p>
+        </p:txBody>
+      </p:sp>
+      <p:sp>
+        <p:nvSpPr>
+          <p:cNvPr id="7" name="TextBox 6">
+            <a:extLst>
+              <a:ext uri="{FF2B5EF4-FFF2-40B4-BE49-F238E27FC236}">
+                <a16:creationId xmlns:a16="http://schemas.microsoft.com/office/drawing/2014/main" id="{B53452DE-5F6E-434F-8FEB-5EAD27E0463E}"/>
+              </a:ext>
+            </a:extLst>
+          </p:cNvPr>
+          <p:cNvSpPr txBox="1"/>
+          <p:nvPr/>
+        </p:nvSpPr>
+        <p:spPr>
+          <a:xfrm>
+            <a:off x="1391055" y="5330917"/>
+            <a:ext cx="535724" cy="369332"/>
+          </a:xfrm>
+          <a:prstGeom prst="rect">
+            <a:avLst/>
+          </a:prstGeom>
+          <a:noFill/>
+        </p:spPr>
+        <p:txBody>
+          <a:bodyPr wrap="none" rtlCol="0">
+            <a:spAutoFit/>
+          </a:bodyPr>
+          <a:lstStyle/>
+          <a:p>
+            <a:r>
+              <a:rPr lang="en-US" dirty="0"/>
+              <a:t>100</a:t>
+            </a:r>
+          </a:p>
+        </p:txBody>
+      </p:sp>
+      <p:cxnSp>
+        <p:nvCxnSpPr>
+          <p:cNvPr id="8" name="Straight Connector 7">
+            <a:extLst>
+              <a:ext uri="{FF2B5EF4-FFF2-40B4-BE49-F238E27FC236}">
+                <a16:creationId xmlns:a16="http://schemas.microsoft.com/office/drawing/2014/main" id="{4A918BAE-B5D3-4247-B1FE-8CBF9A024AEF}"/>
+              </a:ext>
+            </a:extLst>
+          </p:cNvPr>
+          <p:cNvCxnSpPr/>
+          <p:nvPr/>
+        </p:nvCxnSpPr>
+        <p:spPr>
+          <a:xfrm>
+            <a:off x="2053237" y="612843"/>
+            <a:ext cx="0" cy="4902740"/>
+          </a:xfrm>
+          <a:prstGeom prst="line">
+            <a:avLst/>
+          </a:prstGeom>
+        </p:spPr>
+        <p:style>
+          <a:lnRef idx="1">
+            <a:schemeClr val="accent1"/>
+          </a:lnRef>
+          <a:fillRef idx="0">
+            <a:schemeClr val="accent1"/>
+          </a:fillRef>
+          <a:effectRef idx="0">
+            <a:schemeClr val="accent1"/>
+          </a:effectRef>
+          <a:fontRef idx="minor">
+            <a:schemeClr val="tx1"/>
+          </a:fontRef>
+        </p:style>
+      </p:cxnSp>
+      <p:sp>
+        <p:nvSpPr>
+          <p:cNvPr id="9" name="TextBox 8">
+            <a:extLst>
+              <a:ext uri="{FF2B5EF4-FFF2-40B4-BE49-F238E27FC236}">
+                <a16:creationId xmlns:a16="http://schemas.microsoft.com/office/drawing/2014/main" id="{7F1B64DD-4DD6-594E-8FD1-A2E415DB85A2}"/>
+              </a:ext>
+            </a:extLst>
+          </p:cNvPr>
+          <p:cNvSpPr txBox="1"/>
+          <p:nvPr/>
+        </p:nvSpPr>
+        <p:spPr>
+          <a:xfrm>
+            <a:off x="2179696" y="428177"/>
+            <a:ext cx="535724" cy="369332"/>
+          </a:xfrm>
+          <a:prstGeom prst="rect">
+            <a:avLst/>
+          </a:prstGeom>
+          <a:noFill/>
+        </p:spPr>
+        <p:txBody>
+          <a:bodyPr wrap="none" rtlCol="0">
+            <a:spAutoFit/>
+          </a:bodyPr>
+          <a:lstStyle/>
+          <a:p>
+            <a:r>
+              <a:rPr lang="en-US" dirty="0"/>
+              <a:t>100</a:t>
+            </a:r>
+          </a:p>
+        </p:txBody>
+      </p:sp>
+      <p:sp>
+        <p:nvSpPr>
+          <p:cNvPr id="10" name="TextBox 9">
+            <a:extLst>
+              <a:ext uri="{FF2B5EF4-FFF2-40B4-BE49-F238E27FC236}">
+                <a16:creationId xmlns:a16="http://schemas.microsoft.com/office/drawing/2014/main" id="{5B7C8948-D76E-0345-8640-C1D2518393A9}"/>
+              </a:ext>
+            </a:extLst>
+          </p:cNvPr>
+          <p:cNvSpPr txBox="1"/>
+          <p:nvPr/>
+        </p:nvSpPr>
+        <p:spPr>
+          <a:xfrm>
+            <a:off x="2179696" y="5330917"/>
+            <a:ext cx="301686" cy="369332"/>
+          </a:xfrm>
+          <a:prstGeom prst="rect">
+            <a:avLst/>
+          </a:prstGeom>
+          <a:noFill/>
+        </p:spPr>
+        <p:txBody>
+          <a:bodyPr wrap="none" rtlCol="0">
+            <a:spAutoFit/>
+          </a:bodyPr>
+          <a:lstStyle/>
+          <a:p>
+            <a:r>
+              <a:rPr lang="en-US" dirty="0"/>
+              <a:t>0</a:t>
+            </a:r>
+          </a:p>
+        </p:txBody>
+      </p:sp>
+      <p:sp>
+        <p:nvSpPr>
+          <p:cNvPr id="11" name="TextBox 10">
+            <a:extLst>
+              <a:ext uri="{FF2B5EF4-FFF2-40B4-BE49-F238E27FC236}">
+                <a16:creationId xmlns:a16="http://schemas.microsoft.com/office/drawing/2014/main" id="{7B362D30-A29A-6444-A673-A1E97AC0149C}"/>
+              </a:ext>
+            </a:extLst>
+          </p:cNvPr>
+          <p:cNvSpPr txBox="1"/>
+          <p:nvPr/>
+        </p:nvSpPr>
+        <p:spPr>
+          <a:xfrm>
+            <a:off x="2204382" y="4250988"/>
+            <a:ext cx="418704" cy="369332"/>
+          </a:xfrm>
+          <a:prstGeom prst="rect">
+            <a:avLst/>
+          </a:prstGeom>
+          <a:noFill/>
+        </p:spPr>
+        <p:txBody>
+          <a:bodyPr wrap="none" rtlCol="0">
+            <a:spAutoFit/>
+          </a:bodyPr>
+          <a:lstStyle/>
+          <a:p>
+            <a:r>
+              <a:rPr lang="en-US" dirty="0"/>
+              <a:t>30</a:t>
+            </a:r>
+          </a:p>
+        </p:txBody>
+      </p:sp>
+      <p:sp>
+        <p:nvSpPr>
+          <p:cNvPr id="12" name="TextBox 11">
+            <a:extLst>
+              <a:ext uri="{FF2B5EF4-FFF2-40B4-BE49-F238E27FC236}">
+                <a16:creationId xmlns:a16="http://schemas.microsoft.com/office/drawing/2014/main" id="{9822E472-7B76-9446-98F4-F54B817A0547}"/>
+              </a:ext>
+            </a:extLst>
+          </p:cNvPr>
+          <p:cNvSpPr txBox="1"/>
+          <p:nvPr/>
+        </p:nvSpPr>
+        <p:spPr>
+          <a:xfrm>
+            <a:off x="1361952" y="4250988"/>
+            <a:ext cx="418704" cy="369332"/>
+          </a:xfrm>
+          <a:prstGeom prst="rect">
+            <a:avLst/>
+          </a:prstGeom>
+          <a:noFill/>
+        </p:spPr>
+        <p:txBody>
+          <a:bodyPr wrap="none" rtlCol="0">
+            <a:spAutoFit/>
+          </a:bodyPr>
+          <a:lstStyle/>
+          <a:p>
+            <a:r>
+              <a:rPr lang="en-US" dirty="0"/>
+              <a:t>70</a:t>
+            </a:r>
+          </a:p>
+        </p:txBody>
+      </p:sp>
+      <p:sp>
+        <p:nvSpPr>
+          <p:cNvPr id="13" name="TextBox 12">
+            <a:extLst>
+              <a:ext uri="{FF2B5EF4-FFF2-40B4-BE49-F238E27FC236}">
+                <a16:creationId xmlns:a16="http://schemas.microsoft.com/office/drawing/2014/main" id="{FBEE9191-2D2A-9B41-993E-506EEF1F27A6}"/>
+              </a:ext>
+            </a:extLst>
+          </p:cNvPr>
+          <p:cNvSpPr txBox="1"/>
+          <p:nvPr/>
+        </p:nvSpPr>
+        <p:spPr>
+          <a:xfrm>
+            <a:off x="1369967" y="58845"/>
+            <a:ext cx="402674" cy="369332"/>
+          </a:xfrm>
+          <a:prstGeom prst="rect">
+            <a:avLst/>
+          </a:prstGeom>
+          <a:noFill/>
+        </p:spPr>
+        <p:txBody>
+          <a:bodyPr wrap="none" rtlCol="0">
+            <a:spAutoFit/>
+          </a:bodyPr>
+          <a:lstStyle/>
+          <a:p>
+            <a:r>
+              <a:rPr lang="en-US" dirty="0" err="1"/>
+              <a:t>Xc</a:t>
+            </a:r>
+            <a:endParaRPr lang="en-US" dirty="0"/>
+          </a:p>
+        </p:txBody>
+      </p:sp>
+      <p:sp>
+        <p:nvSpPr>
+          <p:cNvPr id="14" name="TextBox 13">
+            <a:extLst>
+              <a:ext uri="{FF2B5EF4-FFF2-40B4-BE49-F238E27FC236}">
+                <a16:creationId xmlns:a16="http://schemas.microsoft.com/office/drawing/2014/main" id="{663A3FF9-861B-0240-8BEC-745CEF773B57}"/>
+              </a:ext>
+            </a:extLst>
+          </p:cNvPr>
+          <p:cNvSpPr txBox="1"/>
+          <p:nvPr/>
+        </p:nvSpPr>
+        <p:spPr>
+          <a:xfrm>
+            <a:off x="2185132" y="24877"/>
+            <a:ext cx="464486" cy="369332"/>
+          </a:xfrm>
+          <a:prstGeom prst="rect">
+            <a:avLst/>
+          </a:prstGeom>
+          <a:noFill/>
+        </p:spPr>
+        <p:txBody>
+          <a:bodyPr wrap="none" rtlCol="0">
+            <a:spAutoFit/>
+          </a:bodyPr>
+          <a:lstStyle/>
+          <a:p>
+            <a:r>
+              <a:rPr lang="en-US" dirty="0" err="1"/>
+              <a:t>Xw</a:t>
+            </a:r>
+            <a:endParaRPr lang="en-US" dirty="0"/>
+          </a:p>
+        </p:txBody>
+      </p:sp>
+      <p:sp>
+        <p:nvSpPr>
+          <p:cNvPr id="15" name="TextBox 14">
+            <a:extLst>
+              <a:ext uri="{FF2B5EF4-FFF2-40B4-BE49-F238E27FC236}">
+                <a16:creationId xmlns:a16="http://schemas.microsoft.com/office/drawing/2014/main" id="{D4CDB242-AB84-D241-B762-DB6AABAF9EEC}"/>
+              </a:ext>
+            </a:extLst>
+          </p:cNvPr>
+          <p:cNvSpPr txBox="1"/>
+          <p:nvPr/>
+        </p:nvSpPr>
+        <p:spPr>
+          <a:xfrm>
+            <a:off x="4533089" y="1848255"/>
+            <a:ext cx="1325299" cy="369332"/>
+          </a:xfrm>
+          <a:prstGeom prst="rect">
+            <a:avLst/>
+          </a:prstGeom>
+          <a:noFill/>
+        </p:spPr>
+        <p:txBody>
+          <a:bodyPr wrap="none" rtlCol="0">
+            <a:spAutoFit/>
+          </a:bodyPr>
+          <a:lstStyle/>
+          <a:p>
+            <a:r>
+              <a:rPr lang="en-US" dirty="0" err="1"/>
+              <a:t>Xw</a:t>
+            </a:r>
+            <a:r>
+              <a:rPr lang="en-US" dirty="0"/>
+              <a:t> = 100-Xc</a:t>
+            </a:r>
+          </a:p>
+        </p:txBody>
+      </p:sp>
+    </p:spTree>
+    <p:extLst>
+      <p:ext uri="{BB962C8B-B14F-4D97-AF65-F5344CB8AC3E}">
+        <p14:creationId xmlns:p14="http://schemas.microsoft.com/office/powerpoint/2010/main" val="2529946678"/>
+      </p:ext>
+    </p:extLst>
+  </p:cSld>
+  <p:clrMapOvr>
+    <a:masterClrMapping/>
+  </p:clrMapOvr>
+</p:sld>
+</file>
+
+<file path=ppt/slides/slide22.xml><?xml version="1.0" encoding="utf-8"?>
+<p:sld xmlns:a="http://schemas.openxmlformats.org/drawingml/2006/main" xmlns:r="http://schemas.openxmlformats.org/officeDocument/2006/relationships" xmlns:p="http://schemas.openxmlformats.org/presentationml/2006/main">
+  <p:cSld>
+    <p:spTree>
+      <p:nvGrpSpPr>
+        <p:cNvPr id="1" name=""/>
+        <p:cNvGrpSpPr/>
+        <p:nvPr/>
+      </p:nvGrpSpPr>
+      <p:grpSpPr>
+        <a:xfrm>
+          <a:off x="0" y="0"/>
+          <a:ext cx="0" cy="0"/>
+          <a:chOff x="0" y="0"/>
+          <a:chExt cx="0" cy="0"/>
+        </a:xfrm>
+      </p:grpSpPr>
+      <p:sp>
+        <p:nvSpPr>
+          <p:cNvPr id="21" name="Isosceles Triangle 20">
+            <a:extLst>
+              <a:ext uri="{FF2B5EF4-FFF2-40B4-BE49-F238E27FC236}">
+                <a16:creationId xmlns:a16="http://schemas.microsoft.com/office/drawing/2014/main" id="{E2DD208B-9ED1-4F23-8A84-898A59AFE327}"/>
+              </a:ext>
+            </a:extLst>
+          </p:cNvPr>
+          <p:cNvSpPr/>
+          <p:nvPr/>
+        </p:nvSpPr>
+        <p:spPr>
+          <a:xfrm rot="20959425">
+            <a:off x="3959243" y="2748942"/>
+            <a:ext cx="2888975" cy="1615051"/>
+          </a:xfrm>
+          <a:prstGeom prst="triangle">
+            <a:avLst/>
+          </a:prstGeom>
+          <a:solidFill>
+            <a:schemeClr val="bg2">
+              <a:lumMod val="90000"/>
+            </a:schemeClr>
+          </a:solidFill>
+        </p:spPr>
+        <p:style>
+          <a:lnRef idx="2">
+            <a:schemeClr val="accent1">
+              <a:shade val="50000"/>
+            </a:schemeClr>
+          </a:lnRef>
+          <a:fillRef idx="1">
+            <a:schemeClr val="accent1"/>
+          </a:fillRef>
+          <a:effectRef idx="0">
+            <a:schemeClr val="accent1"/>
+          </a:effectRef>
+          <a:fontRef idx="minor">
+            <a:schemeClr val="lt1"/>
+          </a:fontRef>
+        </p:style>
+        <p:txBody>
+          <a:bodyPr rtlCol="0" anchor="ctr"/>
+          <a:lstStyle/>
+          <a:p>
+            <a:pPr algn="ctr"/>
+            <a:endParaRPr lang="en-US" dirty="0"/>
+          </a:p>
+        </p:txBody>
+      </p:sp>
+      <p:sp>
+        <p:nvSpPr>
+          <p:cNvPr id="4" name="Oval 3">
+            <a:extLst>
+              <a:ext uri="{FF2B5EF4-FFF2-40B4-BE49-F238E27FC236}">
+                <a16:creationId xmlns:a16="http://schemas.microsoft.com/office/drawing/2014/main" id="{314600A2-A1FF-492F-8609-34CAF5859A52}"/>
+              </a:ext>
+            </a:extLst>
+          </p:cNvPr>
+          <p:cNvSpPr/>
+          <p:nvPr/>
+        </p:nvSpPr>
+        <p:spPr>
+          <a:xfrm>
+            <a:off x="3561347" y="4050632"/>
+            <a:ext cx="1130968" cy="1130968"/>
+          </a:xfrm>
+          <a:prstGeom prst="ellipse">
+            <a:avLst/>
+          </a:prstGeom>
+        </p:spPr>
+        <p:style>
+          <a:lnRef idx="2">
+            <a:schemeClr val="accent1">
+              <a:shade val="50000"/>
+            </a:schemeClr>
+          </a:lnRef>
+          <a:fillRef idx="1">
+            <a:schemeClr val="accent1"/>
+          </a:fillRef>
+          <a:effectRef idx="0">
+            <a:schemeClr val="accent1"/>
+          </a:effectRef>
+          <a:fontRef idx="minor">
+            <a:schemeClr val="lt1"/>
+          </a:fontRef>
+        </p:style>
+        <p:txBody>
+          <a:bodyPr rtlCol="0" anchor="ctr"/>
+          <a:lstStyle/>
+          <a:p>
+            <a:pPr algn="ctr"/>
+            <a:endParaRPr lang="en-US"/>
+          </a:p>
+        </p:txBody>
+      </p:sp>
+      <p:sp>
+        <p:nvSpPr>
+          <p:cNvPr id="5" name="Oval 4">
+            <a:extLst>
+              <a:ext uri="{FF2B5EF4-FFF2-40B4-BE49-F238E27FC236}">
+                <a16:creationId xmlns:a16="http://schemas.microsoft.com/office/drawing/2014/main" id="{ED83B1C8-4E8A-443E-8022-B13B8E29A4AE}"/>
+              </a:ext>
+            </a:extLst>
+          </p:cNvPr>
+          <p:cNvSpPr/>
+          <p:nvPr/>
+        </p:nvSpPr>
+        <p:spPr>
+          <a:xfrm>
+            <a:off x="6406819" y="3513723"/>
+            <a:ext cx="1130968" cy="1130968"/>
+          </a:xfrm>
+          <a:prstGeom prst="ellipse">
+            <a:avLst/>
+          </a:prstGeom>
+        </p:spPr>
+        <p:style>
+          <a:lnRef idx="2">
+            <a:schemeClr val="accent1">
+              <a:shade val="50000"/>
+            </a:schemeClr>
+          </a:lnRef>
+          <a:fillRef idx="1">
+            <a:schemeClr val="accent1"/>
+          </a:fillRef>
+          <a:effectRef idx="0">
+            <a:schemeClr val="accent1"/>
+          </a:effectRef>
+          <a:fontRef idx="minor">
+            <a:schemeClr val="lt1"/>
+          </a:fontRef>
+        </p:style>
+        <p:txBody>
+          <a:bodyPr rtlCol="0" anchor="ctr"/>
+          <a:lstStyle/>
+          <a:p>
+            <a:pPr algn="ctr"/>
+            <a:endParaRPr lang="en-US"/>
+          </a:p>
+        </p:txBody>
+      </p:sp>
+      <p:cxnSp>
+        <p:nvCxnSpPr>
+          <p:cNvPr id="8" name="Straight Connector 7">
+            <a:extLst>
+              <a:ext uri="{FF2B5EF4-FFF2-40B4-BE49-F238E27FC236}">
+                <a16:creationId xmlns:a16="http://schemas.microsoft.com/office/drawing/2014/main" id="{5E9B6128-A755-4014-AD0B-AF4BCF9C3590}"/>
+              </a:ext>
+            </a:extLst>
+          </p:cNvPr>
+          <p:cNvCxnSpPr>
+            <a:cxnSpLocks/>
+          </p:cNvCxnSpPr>
+          <p:nvPr/>
+        </p:nvCxnSpPr>
+        <p:spPr>
+          <a:xfrm flipV="1">
+            <a:off x="3617494" y="4291265"/>
+            <a:ext cx="1620253" cy="1668378"/>
+          </a:xfrm>
+          <a:prstGeom prst="line">
+            <a:avLst/>
+          </a:prstGeom>
+        </p:spPr>
+        <p:style>
+          <a:lnRef idx="1">
+            <a:schemeClr val="accent1"/>
+          </a:lnRef>
+          <a:fillRef idx="0">
+            <a:schemeClr val="accent1"/>
+          </a:fillRef>
+          <a:effectRef idx="0">
+            <a:schemeClr val="accent1"/>
+          </a:effectRef>
+          <a:fontRef idx="minor">
+            <a:schemeClr val="tx1"/>
+          </a:fontRef>
+        </p:style>
+      </p:cxnSp>
+      <p:cxnSp>
+        <p:nvCxnSpPr>
+          <p:cNvPr id="11" name="Straight Connector 10">
+            <a:extLst>
+              <a:ext uri="{FF2B5EF4-FFF2-40B4-BE49-F238E27FC236}">
+                <a16:creationId xmlns:a16="http://schemas.microsoft.com/office/drawing/2014/main" id="{A4B179D8-2EB4-4B0C-AA1F-00B1C3644A3D}"/>
+              </a:ext>
+            </a:extLst>
+          </p:cNvPr>
+          <p:cNvCxnSpPr>
+            <a:cxnSpLocks/>
+          </p:cNvCxnSpPr>
+          <p:nvPr/>
+        </p:nvCxnSpPr>
+        <p:spPr>
+          <a:xfrm flipV="1">
+            <a:off x="6825329" y="3541797"/>
+            <a:ext cx="1155028" cy="1860884"/>
+          </a:xfrm>
+          <a:prstGeom prst="line">
+            <a:avLst/>
+          </a:prstGeom>
+        </p:spPr>
+        <p:style>
+          <a:lnRef idx="1">
+            <a:schemeClr val="accent1"/>
+          </a:lnRef>
+          <a:fillRef idx="0">
+            <a:schemeClr val="accent1"/>
+          </a:fillRef>
+          <a:effectRef idx="0">
+            <a:schemeClr val="accent1"/>
+          </a:effectRef>
+          <a:fontRef idx="minor">
+            <a:schemeClr val="tx1"/>
+          </a:fontRef>
+        </p:style>
+      </p:cxnSp>
+      <p:sp>
+        <p:nvSpPr>
+          <p:cNvPr id="14" name="Oval 13">
+            <a:extLst>
+              <a:ext uri="{FF2B5EF4-FFF2-40B4-BE49-F238E27FC236}">
+                <a16:creationId xmlns:a16="http://schemas.microsoft.com/office/drawing/2014/main" id="{A3FB30E0-CD29-4C5E-B40F-8C0976CAE2BB}"/>
+              </a:ext>
+            </a:extLst>
+          </p:cNvPr>
+          <p:cNvSpPr/>
+          <p:nvPr/>
+        </p:nvSpPr>
+        <p:spPr>
+          <a:xfrm>
+            <a:off x="4050631" y="4547937"/>
+            <a:ext cx="152400" cy="136358"/>
+          </a:xfrm>
+          <a:prstGeom prst="ellipse">
+            <a:avLst/>
+          </a:prstGeom>
+          <a:solidFill>
+            <a:srgbClr val="FF0000"/>
+          </a:solidFill>
+          <a:ln>
+            <a:solidFill>
+              <a:srgbClr val="FF0000"/>
+            </a:solidFill>
+          </a:ln>
+        </p:spPr>
+        <p:style>
+          <a:lnRef idx="2">
+            <a:schemeClr val="accent1">
+              <a:shade val="50000"/>
+            </a:schemeClr>
+          </a:lnRef>
+          <a:fillRef idx="1">
+            <a:schemeClr val="accent1"/>
+          </a:fillRef>
+          <a:effectRef idx="0">
+            <a:schemeClr val="accent1"/>
+          </a:effectRef>
+          <a:fontRef idx="minor">
+            <a:schemeClr val="lt1"/>
+          </a:fontRef>
+        </p:style>
+        <p:txBody>
+          <a:bodyPr rtlCol="0" anchor="ctr"/>
+          <a:lstStyle/>
+          <a:p>
+            <a:pPr algn="ctr"/>
+            <a:endParaRPr lang="en-US"/>
+          </a:p>
+        </p:txBody>
+      </p:sp>
+      <p:sp>
+        <p:nvSpPr>
+          <p:cNvPr id="15" name="Oval 14">
+            <a:extLst>
+              <a:ext uri="{FF2B5EF4-FFF2-40B4-BE49-F238E27FC236}">
+                <a16:creationId xmlns:a16="http://schemas.microsoft.com/office/drawing/2014/main" id="{4E009318-9624-43B1-AA16-858CE5B68F3B}"/>
+              </a:ext>
+            </a:extLst>
+          </p:cNvPr>
+          <p:cNvSpPr/>
+          <p:nvPr/>
+        </p:nvSpPr>
+        <p:spPr>
+          <a:xfrm>
+            <a:off x="6896103" y="4011028"/>
+            <a:ext cx="152400" cy="136358"/>
+          </a:xfrm>
+          <a:prstGeom prst="ellipse">
+            <a:avLst/>
+          </a:prstGeom>
+          <a:solidFill>
+            <a:srgbClr val="FF0000"/>
+          </a:solidFill>
+          <a:ln>
+            <a:solidFill>
+              <a:srgbClr val="FF0000"/>
+            </a:solidFill>
+          </a:ln>
+        </p:spPr>
+        <p:style>
+          <a:lnRef idx="2">
+            <a:schemeClr val="accent1">
+              <a:shade val="50000"/>
+            </a:schemeClr>
+          </a:lnRef>
+          <a:fillRef idx="1">
+            <a:schemeClr val="accent1"/>
+          </a:fillRef>
+          <a:effectRef idx="0">
+            <a:schemeClr val="accent1"/>
+          </a:effectRef>
+          <a:fontRef idx="minor">
+            <a:schemeClr val="lt1"/>
+          </a:fontRef>
+        </p:style>
+        <p:txBody>
+          <a:bodyPr rtlCol="0" anchor="ctr"/>
+          <a:lstStyle/>
+          <a:p>
+            <a:pPr algn="ctr"/>
+            <a:endParaRPr lang="en-US"/>
+          </a:p>
+        </p:txBody>
+      </p:sp>
+      <p:cxnSp>
+        <p:nvCxnSpPr>
+          <p:cNvPr id="3" name="Straight Arrow Connector 2">
+            <a:extLst>
+              <a:ext uri="{FF2B5EF4-FFF2-40B4-BE49-F238E27FC236}">
+                <a16:creationId xmlns:a16="http://schemas.microsoft.com/office/drawing/2014/main" id="{F9313A95-B019-4CB3-A8E6-D58B2F6C8B42}"/>
+              </a:ext>
+            </a:extLst>
+          </p:cNvPr>
+          <p:cNvCxnSpPr>
+            <a:cxnSpLocks/>
+          </p:cNvCxnSpPr>
+          <p:nvPr/>
+        </p:nvCxnSpPr>
+        <p:spPr>
+          <a:xfrm flipV="1">
+            <a:off x="4126831" y="3764298"/>
+            <a:ext cx="847969" cy="853322"/>
+          </a:xfrm>
+          <a:prstGeom prst="straightConnector1">
+            <a:avLst/>
+          </a:prstGeom>
+          <a:ln w="50800">
+            <a:solidFill>
+              <a:schemeClr val="accent6">
+                <a:lumMod val="75000"/>
+              </a:schemeClr>
+            </a:solidFill>
+            <a:tailEnd type="triangle"/>
+          </a:ln>
+        </p:spPr>
+        <p:style>
+          <a:lnRef idx="1">
+            <a:schemeClr val="accent1"/>
+          </a:lnRef>
+          <a:fillRef idx="0">
+            <a:schemeClr val="accent1"/>
+          </a:fillRef>
+          <a:effectRef idx="0">
+            <a:schemeClr val="accent1"/>
+          </a:effectRef>
+          <a:fontRef idx="minor">
+            <a:schemeClr val="tx1"/>
+          </a:fontRef>
+        </p:style>
+      </p:cxnSp>
+      <p:sp>
+        <p:nvSpPr>
+          <p:cNvPr id="10" name="TextBox 9">
+            <a:extLst>
+              <a:ext uri="{FF2B5EF4-FFF2-40B4-BE49-F238E27FC236}">
+                <a16:creationId xmlns:a16="http://schemas.microsoft.com/office/drawing/2014/main" id="{451C141E-2478-496A-A547-8D9C4BB155C0}"/>
+              </a:ext>
+            </a:extLst>
+          </p:cNvPr>
+          <p:cNvSpPr txBox="1"/>
+          <p:nvPr/>
+        </p:nvSpPr>
+        <p:spPr>
+          <a:xfrm>
+            <a:off x="5237747" y="661640"/>
+            <a:ext cx="6653232" cy="646331"/>
+          </a:xfrm>
+          <a:prstGeom prst="rect">
+            <a:avLst/>
+          </a:prstGeom>
+          <a:noFill/>
+        </p:spPr>
+        <p:txBody>
+          <a:bodyPr wrap="none" rtlCol="0">
+            <a:spAutoFit/>
+          </a:bodyPr>
+          <a:lstStyle/>
+          <a:p>
+            <a:r>
+              <a:rPr lang="en-US" dirty="0"/>
+              <a:t>The traction force from the wheel is applied to the axle</a:t>
+            </a:r>
+          </a:p>
+          <a:p>
+            <a:r>
+              <a:rPr lang="en-US" dirty="0"/>
+              <a:t>Parallel to the ground at the contact patch (positive </a:t>
+            </a:r>
+            <a:r>
+              <a:rPr lang="en-US" dirty="0" err="1"/>
+              <a:t>Xalpha</a:t>
+            </a:r>
+            <a:r>
+              <a:rPr lang="en-US" dirty="0"/>
+              <a:t> direction)</a:t>
+            </a:r>
+          </a:p>
+        </p:txBody>
+      </p:sp>
+      <p:sp>
+        <p:nvSpPr>
+          <p:cNvPr id="16" name="Oval 15">
+            <a:extLst>
+              <a:ext uri="{FF2B5EF4-FFF2-40B4-BE49-F238E27FC236}">
+                <a16:creationId xmlns:a16="http://schemas.microsoft.com/office/drawing/2014/main" id="{6E7BCEC9-ACB6-46AF-B3B0-F06B74D4EF18}"/>
+              </a:ext>
+            </a:extLst>
+          </p:cNvPr>
+          <p:cNvSpPr/>
+          <p:nvPr/>
+        </p:nvSpPr>
+        <p:spPr>
+          <a:xfrm>
+            <a:off x="5320967" y="3609975"/>
+            <a:ext cx="152400" cy="152400"/>
+          </a:xfrm>
+          <a:prstGeom prst="ellipse">
+            <a:avLst/>
+          </a:prstGeom>
+          <a:solidFill>
+            <a:schemeClr val="accent1">
+              <a:lumMod val="60000"/>
+              <a:lumOff val="40000"/>
+            </a:schemeClr>
+          </a:solidFill>
+        </p:spPr>
+        <p:style>
+          <a:lnRef idx="2">
+            <a:schemeClr val="accent1">
+              <a:shade val="50000"/>
+            </a:schemeClr>
+          </a:lnRef>
+          <a:fillRef idx="1">
+            <a:schemeClr val="accent1"/>
+          </a:fillRef>
+          <a:effectRef idx="0">
+            <a:schemeClr val="accent1"/>
+          </a:effectRef>
+          <a:fontRef idx="minor">
+            <a:schemeClr val="lt1"/>
+          </a:fontRef>
+        </p:style>
+        <p:txBody>
+          <a:bodyPr rtlCol="0" anchor="ctr"/>
+          <a:lstStyle/>
+          <a:p>
+            <a:pPr algn="ctr"/>
+            <a:endParaRPr lang="en-US"/>
+          </a:p>
+        </p:txBody>
+      </p:sp>
+      <p:sp>
+        <p:nvSpPr>
+          <p:cNvPr id="2" name="TextBox 1">
+            <a:extLst>
+              <a:ext uri="{FF2B5EF4-FFF2-40B4-BE49-F238E27FC236}">
+                <a16:creationId xmlns:a16="http://schemas.microsoft.com/office/drawing/2014/main" id="{A5672370-AAD3-7B48-97F5-D960A7430A5F}"/>
+              </a:ext>
+            </a:extLst>
+          </p:cNvPr>
+          <p:cNvSpPr txBox="1"/>
+          <p:nvPr/>
+        </p:nvSpPr>
+        <p:spPr>
+          <a:xfrm>
+            <a:off x="4778925" y="3879388"/>
+            <a:ext cx="301686" cy="369332"/>
+          </a:xfrm>
+          <a:prstGeom prst="rect">
+            <a:avLst/>
+          </a:prstGeom>
+          <a:noFill/>
+        </p:spPr>
+        <p:txBody>
+          <a:bodyPr wrap="none" rtlCol="0">
+            <a:spAutoFit/>
+          </a:bodyPr>
+          <a:lstStyle/>
+          <a:p>
+            <a:r>
+              <a:rPr lang="en-US" dirty="0"/>
+              <a:t>1</a:t>
+            </a:r>
+          </a:p>
+        </p:txBody>
+      </p:sp>
+      <p:sp>
+        <p:nvSpPr>
+          <p:cNvPr id="6" name="TextBox 5">
+            <a:extLst>
+              <a:ext uri="{FF2B5EF4-FFF2-40B4-BE49-F238E27FC236}">
+                <a16:creationId xmlns:a16="http://schemas.microsoft.com/office/drawing/2014/main" id="{1A46242E-54C8-8C4C-AD0E-020FACD6EACA}"/>
+              </a:ext>
+            </a:extLst>
+          </p:cNvPr>
+          <p:cNvSpPr txBox="1"/>
+          <p:nvPr/>
+        </p:nvSpPr>
+        <p:spPr>
+          <a:xfrm>
+            <a:off x="428017" y="846306"/>
+            <a:ext cx="4014753" cy="923330"/>
+          </a:xfrm>
+          <a:prstGeom prst="rect">
+            <a:avLst/>
+          </a:prstGeom>
+          <a:noFill/>
+        </p:spPr>
+        <p:txBody>
+          <a:bodyPr wrap="none" rtlCol="0">
+            <a:spAutoFit/>
+          </a:bodyPr>
+          <a:lstStyle/>
+          <a:p>
+            <a:r>
+              <a:rPr lang="en-US" dirty="0"/>
+              <a:t>1 = </a:t>
+            </a:r>
+            <a:r>
+              <a:rPr lang="en-US" dirty="0" err="1"/>
+              <a:t>Fout</a:t>
+            </a:r>
+            <a:r>
+              <a:rPr lang="en-US" dirty="0"/>
+              <a:t>.  (along the positive </a:t>
+            </a:r>
+            <a:r>
+              <a:rPr lang="en-US" dirty="0" err="1"/>
+              <a:t>Xalpha</a:t>
+            </a:r>
+            <a:r>
+              <a:rPr lang="en-US" dirty="0"/>
+              <a:t> axis)</a:t>
+            </a:r>
+          </a:p>
+          <a:p>
+            <a:r>
+              <a:rPr lang="en-US" dirty="0"/>
+              <a:t>2 = </a:t>
+            </a:r>
+            <a:r>
+              <a:rPr lang="en-US" dirty="0" err="1"/>
+              <a:t>Fwr</a:t>
+            </a:r>
+            <a:r>
+              <a:rPr lang="en-US" dirty="0"/>
+              <a:t> 	(along the negative Y axis</a:t>
+            </a:r>
+          </a:p>
+          <a:p>
+            <a:r>
+              <a:rPr lang="en-US" dirty="0"/>
+              <a:t>3 = </a:t>
+            </a:r>
+            <a:r>
+              <a:rPr lang="en-US" dirty="0" err="1"/>
+              <a:t>Fwf</a:t>
+            </a:r>
+            <a:r>
+              <a:rPr lang="en-US" dirty="0"/>
+              <a:t>    (along the negative Y axis</a:t>
+            </a:r>
+          </a:p>
+        </p:txBody>
+      </p:sp>
+      <p:cxnSp>
+        <p:nvCxnSpPr>
+          <p:cNvPr id="17" name="Straight Arrow Connector 16">
+            <a:extLst>
+              <a:ext uri="{FF2B5EF4-FFF2-40B4-BE49-F238E27FC236}">
+                <a16:creationId xmlns:a16="http://schemas.microsoft.com/office/drawing/2014/main" id="{5D80920B-3102-884B-82BD-7BB4482CDB45}"/>
+              </a:ext>
+            </a:extLst>
+          </p:cNvPr>
+          <p:cNvCxnSpPr>
+            <a:cxnSpLocks/>
+          </p:cNvCxnSpPr>
+          <p:nvPr/>
+        </p:nvCxnSpPr>
+        <p:spPr>
+          <a:xfrm>
+            <a:off x="4137932" y="4616116"/>
+            <a:ext cx="10455" cy="991470"/>
+          </a:xfrm>
+          <a:prstGeom prst="straightConnector1">
+            <a:avLst/>
+          </a:prstGeom>
+          <a:ln w="53975">
+            <a:solidFill>
+              <a:schemeClr val="accent6">
+                <a:lumMod val="60000"/>
+                <a:lumOff val="40000"/>
+              </a:schemeClr>
+            </a:solidFill>
+            <a:tailEnd type="triangle"/>
+          </a:ln>
+        </p:spPr>
+        <p:style>
+          <a:lnRef idx="1">
+            <a:schemeClr val="accent1"/>
+          </a:lnRef>
+          <a:fillRef idx="0">
+            <a:schemeClr val="accent1"/>
+          </a:fillRef>
+          <a:effectRef idx="0">
+            <a:schemeClr val="accent1"/>
+          </a:effectRef>
+          <a:fontRef idx="minor">
+            <a:schemeClr val="tx1"/>
+          </a:fontRef>
+        </p:style>
+      </p:cxnSp>
+      <p:cxnSp>
+        <p:nvCxnSpPr>
+          <p:cNvPr id="18" name="Straight Arrow Connector 17">
+            <a:extLst>
+              <a:ext uri="{FF2B5EF4-FFF2-40B4-BE49-F238E27FC236}">
+                <a16:creationId xmlns:a16="http://schemas.microsoft.com/office/drawing/2014/main" id="{5AA50058-B8CA-A146-B1FC-BA692D3FF007}"/>
+              </a:ext>
+            </a:extLst>
+          </p:cNvPr>
+          <p:cNvCxnSpPr>
+            <a:cxnSpLocks/>
+          </p:cNvCxnSpPr>
+          <p:nvPr/>
+        </p:nvCxnSpPr>
+        <p:spPr>
+          <a:xfrm>
+            <a:off x="6971370" y="4085091"/>
+            <a:ext cx="6745" cy="559600"/>
+          </a:xfrm>
+          <a:prstGeom prst="straightConnector1">
+            <a:avLst/>
+          </a:prstGeom>
+          <a:ln w="53975">
+            <a:solidFill>
+              <a:schemeClr val="accent6">
+                <a:lumMod val="60000"/>
+                <a:lumOff val="40000"/>
+              </a:schemeClr>
+            </a:solidFill>
+            <a:tailEnd type="triangle"/>
+          </a:ln>
+        </p:spPr>
+        <p:style>
+          <a:lnRef idx="1">
+            <a:schemeClr val="accent1"/>
+          </a:lnRef>
+          <a:fillRef idx="0">
+            <a:schemeClr val="accent1"/>
+          </a:fillRef>
+          <a:effectRef idx="0">
+            <a:schemeClr val="accent1"/>
+          </a:effectRef>
+          <a:fontRef idx="minor">
+            <a:schemeClr val="tx1"/>
+          </a:fontRef>
+        </p:style>
+      </p:cxnSp>
+      <p:sp>
+        <p:nvSpPr>
+          <p:cNvPr id="19" name="TextBox 18">
+            <a:extLst>
+              <a:ext uri="{FF2B5EF4-FFF2-40B4-BE49-F238E27FC236}">
+                <a16:creationId xmlns:a16="http://schemas.microsoft.com/office/drawing/2014/main" id="{0194D5DA-4A91-B14D-B251-0455BD210213}"/>
+              </a:ext>
+            </a:extLst>
+          </p:cNvPr>
+          <p:cNvSpPr txBox="1"/>
+          <p:nvPr/>
+        </p:nvSpPr>
+        <p:spPr>
+          <a:xfrm>
+            <a:off x="4269508" y="5385955"/>
+            <a:ext cx="301686" cy="369332"/>
+          </a:xfrm>
+          <a:prstGeom prst="rect">
+            <a:avLst/>
+          </a:prstGeom>
+          <a:noFill/>
+        </p:spPr>
+        <p:txBody>
+          <a:bodyPr wrap="none" rtlCol="0">
+            <a:spAutoFit/>
+          </a:bodyPr>
+          <a:lstStyle/>
+          <a:p>
+            <a:r>
+              <a:rPr lang="en-US" dirty="0"/>
+              <a:t>2</a:t>
+            </a:r>
+          </a:p>
+        </p:txBody>
+      </p:sp>
+      <p:sp>
+        <p:nvSpPr>
+          <p:cNvPr id="20" name="TextBox 19">
+            <a:extLst>
+              <a:ext uri="{FF2B5EF4-FFF2-40B4-BE49-F238E27FC236}">
+                <a16:creationId xmlns:a16="http://schemas.microsoft.com/office/drawing/2014/main" id="{132B0433-627E-B746-8CE9-1D2943B39C8E}"/>
+              </a:ext>
+            </a:extLst>
+          </p:cNvPr>
+          <p:cNvSpPr txBox="1"/>
+          <p:nvPr/>
+        </p:nvSpPr>
+        <p:spPr>
+          <a:xfrm>
+            <a:off x="6644084" y="4672525"/>
+            <a:ext cx="301686" cy="369332"/>
+          </a:xfrm>
+          <a:prstGeom prst="rect">
+            <a:avLst/>
+          </a:prstGeom>
+          <a:noFill/>
+        </p:spPr>
+        <p:txBody>
+          <a:bodyPr wrap="none" rtlCol="0">
+            <a:spAutoFit/>
+          </a:bodyPr>
+          <a:lstStyle/>
+          <a:p>
+            <a:r>
+              <a:rPr lang="en-US" dirty="0"/>
+              <a:t>3</a:t>
+            </a:r>
+          </a:p>
+        </p:txBody>
+      </p:sp>
+    </p:spTree>
+    <p:extLst>
+      <p:ext uri="{BB962C8B-B14F-4D97-AF65-F5344CB8AC3E}">
+        <p14:creationId xmlns:p14="http://schemas.microsoft.com/office/powerpoint/2010/main" val="1071421982"/>
+      </p:ext>
+    </p:extLst>
+  </p:cSld>
+  <p:clrMapOvr>
+    <a:masterClrMapping/>
+  </p:clrMapOvr>
+</p:sld>
+</file>
+
+<file path=ppt/slides/slide23.xml><?xml version="1.0" encoding="utf-8"?>
+<p:sld xmlns:a="http://schemas.openxmlformats.org/drawingml/2006/main" xmlns:r="http://schemas.openxmlformats.org/officeDocument/2006/relationships" xmlns:p="http://schemas.openxmlformats.org/presentationml/2006/main">
+  <p:cSld>
+    <p:spTree>
+      <p:nvGrpSpPr>
+        <p:cNvPr id="1" name=""/>
+        <p:cNvGrpSpPr/>
+        <p:nvPr/>
+      </p:nvGrpSpPr>
+      <p:grpSpPr>
+        <a:xfrm>
+          <a:off x="0" y="0"/>
+          <a:ext cx="0" cy="0"/>
+          <a:chOff x="0" y="0"/>
+          <a:chExt cx="0" cy="0"/>
+        </a:xfrm>
+      </p:grpSpPr>
+      <p:sp>
+        <p:nvSpPr>
+          <p:cNvPr id="21" name="Isosceles Triangle 20">
+            <a:extLst>
+              <a:ext uri="{FF2B5EF4-FFF2-40B4-BE49-F238E27FC236}">
+                <a16:creationId xmlns:a16="http://schemas.microsoft.com/office/drawing/2014/main" id="{E2DD208B-9ED1-4F23-8A84-898A59AFE327}"/>
+              </a:ext>
+            </a:extLst>
+          </p:cNvPr>
+          <p:cNvSpPr/>
+          <p:nvPr/>
+        </p:nvSpPr>
+        <p:spPr>
+          <a:xfrm rot="20959425">
+            <a:off x="3959243" y="2748942"/>
+            <a:ext cx="2888975" cy="1615051"/>
+          </a:xfrm>
+          <a:prstGeom prst="triangle">
+            <a:avLst/>
+          </a:prstGeom>
+          <a:solidFill>
+            <a:schemeClr val="bg2">
+              <a:lumMod val="90000"/>
+            </a:schemeClr>
+          </a:solidFill>
+        </p:spPr>
+        <p:style>
+          <a:lnRef idx="2">
+            <a:schemeClr val="accent1">
+              <a:shade val="50000"/>
+            </a:schemeClr>
+          </a:lnRef>
+          <a:fillRef idx="1">
+            <a:schemeClr val="accent1"/>
+          </a:fillRef>
+          <a:effectRef idx="0">
+            <a:schemeClr val="accent1"/>
+          </a:effectRef>
+          <a:fontRef idx="minor">
+            <a:schemeClr val="lt1"/>
+          </a:fontRef>
+        </p:style>
+        <p:txBody>
+          <a:bodyPr rtlCol="0" anchor="ctr"/>
+          <a:lstStyle/>
+          <a:p>
+            <a:pPr algn="ctr"/>
+            <a:endParaRPr lang="en-US" dirty="0"/>
+          </a:p>
+        </p:txBody>
+      </p:sp>
+      <p:sp>
+        <p:nvSpPr>
+          <p:cNvPr id="4" name="Oval 3">
+            <a:extLst>
+              <a:ext uri="{FF2B5EF4-FFF2-40B4-BE49-F238E27FC236}">
+                <a16:creationId xmlns:a16="http://schemas.microsoft.com/office/drawing/2014/main" id="{314600A2-A1FF-492F-8609-34CAF5859A52}"/>
+              </a:ext>
+            </a:extLst>
+          </p:cNvPr>
+          <p:cNvSpPr/>
+          <p:nvPr/>
+        </p:nvSpPr>
+        <p:spPr>
+          <a:xfrm>
+            <a:off x="3561347" y="4050632"/>
+            <a:ext cx="1130968" cy="1130968"/>
+          </a:xfrm>
+          <a:prstGeom prst="ellipse">
+            <a:avLst/>
+          </a:prstGeom>
+        </p:spPr>
+        <p:style>
+          <a:lnRef idx="2">
+            <a:schemeClr val="accent1">
+              <a:shade val="50000"/>
+            </a:schemeClr>
+          </a:lnRef>
+          <a:fillRef idx="1">
+            <a:schemeClr val="accent1"/>
+          </a:fillRef>
+          <a:effectRef idx="0">
+            <a:schemeClr val="accent1"/>
+          </a:effectRef>
+          <a:fontRef idx="minor">
+            <a:schemeClr val="lt1"/>
+          </a:fontRef>
+        </p:style>
+        <p:txBody>
+          <a:bodyPr rtlCol="0" anchor="ctr"/>
+          <a:lstStyle/>
+          <a:p>
+            <a:pPr algn="ctr"/>
+            <a:endParaRPr lang="en-US"/>
+          </a:p>
+        </p:txBody>
+      </p:sp>
+      <p:sp>
+        <p:nvSpPr>
+          <p:cNvPr id="5" name="Oval 4">
+            <a:extLst>
+              <a:ext uri="{FF2B5EF4-FFF2-40B4-BE49-F238E27FC236}">
+                <a16:creationId xmlns:a16="http://schemas.microsoft.com/office/drawing/2014/main" id="{ED83B1C8-4E8A-443E-8022-B13B8E29A4AE}"/>
+              </a:ext>
+            </a:extLst>
+          </p:cNvPr>
+          <p:cNvSpPr/>
+          <p:nvPr/>
+        </p:nvSpPr>
+        <p:spPr>
+          <a:xfrm>
+            <a:off x="6406819" y="3513723"/>
+            <a:ext cx="1130968" cy="1130968"/>
+          </a:xfrm>
+          <a:prstGeom prst="ellipse">
+            <a:avLst/>
+          </a:prstGeom>
+        </p:spPr>
+        <p:style>
+          <a:lnRef idx="2">
+            <a:schemeClr val="accent1">
+              <a:shade val="50000"/>
+            </a:schemeClr>
+          </a:lnRef>
+          <a:fillRef idx="1">
+            <a:schemeClr val="accent1"/>
+          </a:fillRef>
+          <a:effectRef idx="0">
+            <a:schemeClr val="accent1"/>
+          </a:effectRef>
+          <a:fontRef idx="minor">
+            <a:schemeClr val="lt1"/>
+          </a:fontRef>
+        </p:style>
+        <p:txBody>
+          <a:bodyPr rtlCol="0" anchor="ctr"/>
+          <a:lstStyle/>
+          <a:p>
+            <a:pPr algn="ctr"/>
+            <a:endParaRPr lang="en-US"/>
+          </a:p>
+        </p:txBody>
+      </p:sp>
+      <p:cxnSp>
+        <p:nvCxnSpPr>
+          <p:cNvPr id="8" name="Straight Connector 7">
+            <a:extLst>
+              <a:ext uri="{FF2B5EF4-FFF2-40B4-BE49-F238E27FC236}">
+                <a16:creationId xmlns:a16="http://schemas.microsoft.com/office/drawing/2014/main" id="{5E9B6128-A755-4014-AD0B-AF4BCF9C3590}"/>
+              </a:ext>
+            </a:extLst>
+          </p:cNvPr>
+          <p:cNvCxnSpPr>
+            <a:cxnSpLocks/>
+          </p:cNvCxnSpPr>
+          <p:nvPr/>
+        </p:nvCxnSpPr>
+        <p:spPr>
+          <a:xfrm flipV="1">
+            <a:off x="3617494" y="4291265"/>
+            <a:ext cx="1620253" cy="1668378"/>
+          </a:xfrm>
+          <a:prstGeom prst="line">
+            <a:avLst/>
+          </a:prstGeom>
+        </p:spPr>
+        <p:style>
+          <a:lnRef idx="1">
+            <a:schemeClr val="accent1"/>
+          </a:lnRef>
+          <a:fillRef idx="0">
+            <a:schemeClr val="accent1"/>
+          </a:fillRef>
+          <a:effectRef idx="0">
+            <a:schemeClr val="accent1"/>
+          </a:effectRef>
+          <a:fontRef idx="minor">
+            <a:schemeClr val="tx1"/>
+          </a:fontRef>
+        </p:style>
+      </p:cxnSp>
+      <p:cxnSp>
+        <p:nvCxnSpPr>
+          <p:cNvPr id="11" name="Straight Connector 10">
+            <a:extLst>
+              <a:ext uri="{FF2B5EF4-FFF2-40B4-BE49-F238E27FC236}">
+                <a16:creationId xmlns:a16="http://schemas.microsoft.com/office/drawing/2014/main" id="{A4B179D8-2EB4-4B0C-AA1F-00B1C3644A3D}"/>
+              </a:ext>
+            </a:extLst>
+          </p:cNvPr>
+          <p:cNvCxnSpPr>
+            <a:cxnSpLocks/>
+          </p:cNvCxnSpPr>
+          <p:nvPr/>
+        </p:nvCxnSpPr>
+        <p:spPr>
+          <a:xfrm flipV="1">
+            <a:off x="6825329" y="3541797"/>
+            <a:ext cx="1155028" cy="1860884"/>
+          </a:xfrm>
+          <a:prstGeom prst="line">
+            <a:avLst/>
+          </a:prstGeom>
+        </p:spPr>
+        <p:style>
+          <a:lnRef idx="1">
+            <a:schemeClr val="accent1"/>
+          </a:lnRef>
+          <a:fillRef idx="0">
+            <a:schemeClr val="accent1"/>
+          </a:fillRef>
+          <a:effectRef idx="0">
+            <a:schemeClr val="accent1"/>
+          </a:effectRef>
+          <a:fontRef idx="minor">
+            <a:schemeClr val="tx1"/>
+          </a:fontRef>
+        </p:style>
+      </p:cxnSp>
+      <p:sp>
+        <p:nvSpPr>
+          <p:cNvPr id="14" name="Oval 13">
+            <a:extLst>
+              <a:ext uri="{FF2B5EF4-FFF2-40B4-BE49-F238E27FC236}">
+                <a16:creationId xmlns:a16="http://schemas.microsoft.com/office/drawing/2014/main" id="{A3FB30E0-CD29-4C5E-B40F-8C0976CAE2BB}"/>
+              </a:ext>
+            </a:extLst>
+          </p:cNvPr>
+          <p:cNvSpPr/>
+          <p:nvPr/>
+        </p:nvSpPr>
+        <p:spPr>
+          <a:xfrm>
+            <a:off x="4050631" y="4547937"/>
+            <a:ext cx="152400" cy="136358"/>
+          </a:xfrm>
+          <a:prstGeom prst="ellipse">
+            <a:avLst/>
+          </a:prstGeom>
+          <a:solidFill>
+            <a:srgbClr val="FF0000"/>
+          </a:solidFill>
+          <a:ln>
+            <a:solidFill>
+              <a:srgbClr val="FF0000"/>
+            </a:solidFill>
+          </a:ln>
+        </p:spPr>
+        <p:style>
+          <a:lnRef idx="2">
+            <a:schemeClr val="accent1">
+              <a:shade val="50000"/>
+            </a:schemeClr>
+          </a:lnRef>
+          <a:fillRef idx="1">
+            <a:schemeClr val="accent1"/>
+          </a:fillRef>
+          <a:effectRef idx="0">
+            <a:schemeClr val="accent1"/>
+          </a:effectRef>
+          <a:fontRef idx="minor">
+            <a:schemeClr val="lt1"/>
+          </a:fontRef>
+        </p:style>
+        <p:txBody>
+          <a:bodyPr rtlCol="0" anchor="ctr"/>
+          <a:lstStyle/>
+          <a:p>
+            <a:pPr algn="ctr"/>
+            <a:endParaRPr lang="en-US"/>
+          </a:p>
+        </p:txBody>
+      </p:sp>
+      <p:sp>
+        <p:nvSpPr>
+          <p:cNvPr id="15" name="Oval 14">
+            <a:extLst>
+              <a:ext uri="{FF2B5EF4-FFF2-40B4-BE49-F238E27FC236}">
+                <a16:creationId xmlns:a16="http://schemas.microsoft.com/office/drawing/2014/main" id="{4E009318-9624-43B1-AA16-858CE5B68F3B}"/>
+              </a:ext>
+            </a:extLst>
+          </p:cNvPr>
+          <p:cNvSpPr/>
+          <p:nvPr/>
+        </p:nvSpPr>
+        <p:spPr>
+          <a:xfrm>
+            <a:off x="6896103" y="4011028"/>
+            <a:ext cx="152400" cy="136358"/>
+          </a:xfrm>
+          <a:prstGeom prst="ellipse">
+            <a:avLst/>
+          </a:prstGeom>
+          <a:solidFill>
+            <a:srgbClr val="FF0000"/>
+          </a:solidFill>
+          <a:ln>
+            <a:solidFill>
+              <a:srgbClr val="FF0000"/>
+            </a:solidFill>
+          </a:ln>
+        </p:spPr>
+        <p:style>
+          <a:lnRef idx="2">
+            <a:schemeClr val="accent1">
+              <a:shade val="50000"/>
+            </a:schemeClr>
+          </a:lnRef>
+          <a:fillRef idx="1">
+            <a:schemeClr val="accent1"/>
+          </a:fillRef>
+          <a:effectRef idx="0">
+            <a:schemeClr val="accent1"/>
+          </a:effectRef>
+          <a:fontRef idx="minor">
+            <a:schemeClr val="lt1"/>
+          </a:fontRef>
+        </p:style>
+        <p:txBody>
+          <a:bodyPr rtlCol="0" anchor="ctr"/>
+          <a:lstStyle/>
+          <a:p>
+            <a:pPr algn="ctr"/>
+            <a:endParaRPr lang="en-US"/>
+          </a:p>
+        </p:txBody>
+      </p:sp>
+      <p:sp>
+        <p:nvSpPr>
+          <p:cNvPr id="10" name="TextBox 9">
+            <a:extLst>
+              <a:ext uri="{FF2B5EF4-FFF2-40B4-BE49-F238E27FC236}">
+                <a16:creationId xmlns:a16="http://schemas.microsoft.com/office/drawing/2014/main" id="{451C141E-2478-496A-A547-8D9C4BB155C0}"/>
+              </a:ext>
+            </a:extLst>
+          </p:cNvPr>
+          <p:cNvSpPr txBox="1"/>
+          <p:nvPr/>
+        </p:nvSpPr>
+        <p:spPr>
+          <a:xfrm>
+            <a:off x="5237747" y="661640"/>
+            <a:ext cx="6254726" cy="646331"/>
+          </a:xfrm>
+          <a:prstGeom prst="rect">
+            <a:avLst/>
+          </a:prstGeom>
+          <a:noFill/>
+        </p:spPr>
+        <p:txBody>
+          <a:bodyPr wrap="none" rtlCol="0">
+            <a:spAutoFit/>
+          </a:bodyPr>
+          <a:lstStyle/>
+          <a:p>
+            <a:r>
+              <a:rPr lang="en-US" dirty="0"/>
+              <a:t>MOVE ALL FORCE TO THE CG AND TRACK THE MOMENTS</a:t>
+            </a:r>
+          </a:p>
+          <a:p>
+            <a:r>
+              <a:rPr lang="en-US" dirty="0"/>
+              <a:t>RESOLVE ALL FORCES TO X and Y components to make this easier</a:t>
+            </a:r>
+          </a:p>
+        </p:txBody>
+      </p:sp>
+      <p:sp>
+        <p:nvSpPr>
+          <p:cNvPr id="16" name="Oval 15">
+            <a:extLst>
+              <a:ext uri="{FF2B5EF4-FFF2-40B4-BE49-F238E27FC236}">
+                <a16:creationId xmlns:a16="http://schemas.microsoft.com/office/drawing/2014/main" id="{6E7BCEC9-ACB6-46AF-B3B0-F06B74D4EF18}"/>
+              </a:ext>
+            </a:extLst>
+          </p:cNvPr>
+          <p:cNvSpPr/>
+          <p:nvPr/>
+        </p:nvSpPr>
+        <p:spPr>
+          <a:xfrm>
+            <a:off x="5320967" y="3609975"/>
+            <a:ext cx="152400" cy="152400"/>
+          </a:xfrm>
+          <a:prstGeom prst="ellipse">
+            <a:avLst/>
+          </a:prstGeom>
+          <a:solidFill>
+            <a:schemeClr val="accent1">
+              <a:lumMod val="60000"/>
+              <a:lumOff val="40000"/>
+            </a:schemeClr>
+          </a:solidFill>
+        </p:spPr>
+        <p:style>
+          <a:lnRef idx="2">
+            <a:schemeClr val="accent1">
+              <a:shade val="50000"/>
+            </a:schemeClr>
+          </a:lnRef>
+          <a:fillRef idx="1">
+            <a:schemeClr val="accent1"/>
+          </a:fillRef>
+          <a:effectRef idx="0">
+            <a:schemeClr val="accent1"/>
+          </a:effectRef>
+          <a:fontRef idx="minor">
+            <a:schemeClr val="lt1"/>
+          </a:fontRef>
+        </p:style>
+        <p:txBody>
+          <a:bodyPr rtlCol="0" anchor="ctr"/>
+          <a:lstStyle/>
+          <a:p>
+            <a:pPr algn="ctr"/>
+            <a:endParaRPr lang="en-US"/>
+          </a:p>
+        </p:txBody>
+      </p:sp>
+      <p:sp>
+        <p:nvSpPr>
+          <p:cNvPr id="6" name="TextBox 5">
+            <a:extLst>
+              <a:ext uri="{FF2B5EF4-FFF2-40B4-BE49-F238E27FC236}">
+                <a16:creationId xmlns:a16="http://schemas.microsoft.com/office/drawing/2014/main" id="{1A46242E-54C8-8C4C-AD0E-020FACD6EACA}"/>
+              </a:ext>
+            </a:extLst>
+          </p:cNvPr>
+          <p:cNvSpPr txBox="1"/>
+          <p:nvPr/>
+        </p:nvSpPr>
+        <p:spPr>
+          <a:xfrm>
+            <a:off x="428017" y="846306"/>
+            <a:ext cx="4014753" cy="923330"/>
+          </a:xfrm>
+          <a:prstGeom prst="rect">
+            <a:avLst/>
+          </a:prstGeom>
+          <a:noFill/>
+        </p:spPr>
+        <p:txBody>
+          <a:bodyPr wrap="none" rtlCol="0">
+            <a:spAutoFit/>
+          </a:bodyPr>
+          <a:lstStyle/>
+          <a:p>
+            <a:r>
+              <a:rPr lang="en-US" dirty="0"/>
+              <a:t>1 = </a:t>
+            </a:r>
+            <a:r>
+              <a:rPr lang="en-US" dirty="0" err="1"/>
+              <a:t>Fout</a:t>
+            </a:r>
+            <a:r>
+              <a:rPr lang="en-US" dirty="0"/>
+              <a:t>.  (along the positive </a:t>
+            </a:r>
+            <a:r>
+              <a:rPr lang="en-US" dirty="0" err="1"/>
+              <a:t>Xalpha</a:t>
+            </a:r>
+            <a:r>
+              <a:rPr lang="en-US" dirty="0"/>
+              <a:t> axis)</a:t>
+            </a:r>
+          </a:p>
+          <a:p>
+            <a:r>
+              <a:rPr lang="en-US" dirty="0"/>
+              <a:t>2 = </a:t>
+            </a:r>
+            <a:r>
+              <a:rPr lang="en-US" dirty="0" err="1"/>
+              <a:t>Fwr</a:t>
+            </a:r>
+            <a:r>
+              <a:rPr lang="en-US" dirty="0"/>
+              <a:t> 	(along the negative Y axis</a:t>
+            </a:r>
+          </a:p>
+          <a:p>
+            <a:r>
+              <a:rPr lang="en-US" dirty="0"/>
+              <a:t>3 = </a:t>
+            </a:r>
+            <a:r>
+              <a:rPr lang="en-US" dirty="0" err="1"/>
+              <a:t>Fwf</a:t>
+            </a:r>
+            <a:r>
+              <a:rPr lang="en-US" dirty="0"/>
+              <a:t>    (along the negative Y axis</a:t>
+            </a:r>
+          </a:p>
+        </p:txBody>
+      </p:sp>
+      <p:cxnSp>
+        <p:nvCxnSpPr>
+          <p:cNvPr id="17" name="Straight Arrow Connector 16">
+            <a:extLst>
+              <a:ext uri="{FF2B5EF4-FFF2-40B4-BE49-F238E27FC236}">
+                <a16:creationId xmlns:a16="http://schemas.microsoft.com/office/drawing/2014/main" id="{5D80920B-3102-884B-82BD-7BB4482CDB45}"/>
+              </a:ext>
+            </a:extLst>
+          </p:cNvPr>
+          <p:cNvCxnSpPr>
+            <a:cxnSpLocks/>
+          </p:cNvCxnSpPr>
+          <p:nvPr/>
+        </p:nvCxnSpPr>
+        <p:spPr>
+          <a:xfrm>
+            <a:off x="4137932" y="4616116"/>
+            <a:ext cx="10455" cy="991470"/>
+          </a:xfrm>
+          <a:prstGeom prst="straightConnector1">
+            <a:avLst/>
+          </a:prstGeom>
+          <a:ln w="53975">
+            <a:solidFill>
+              <a:schemeClr val="accent6">
+                <a:lumMod val="60000"/>
+                <a:lumOff val="40000"/>
+              </a:schemeClr>
+            </a:solidFill>
+            <a:tailEnd type="triangle"/>
+          </a:ln>
+        </p:spPr>
+        <p:style>
+          <a:lnRef idx="1">
+            <a:schemeClr val="accent1"/>
+          </a:lnRef>
+          <a:fillRef idx="0">
+            <a:schemeClr val="accent1"/>
+          </a:fillRef>
+          <a:effectRef idx="0">
+            <a:schemeClr val="accent1"/>
+          </a:effectRef>
+          <a:fontRef idx="minor">
+            <a:schemeClr val="tx1"/>
+          </a:fontRef>
+        </p:style>
+      </p:cxnSp>
+      <p:cxnSp>
+        <p:nvCxnSpPr>
+          <p:cNvPr id="18" name="Straight Arrow Connector 17">
+            <a:extLst>
+              <a:ext uri="{FF2B5EF4-FFF2-40B4-BE49-F238E27FC236}">
+                <a16:creationId xmlns:a16="http://schemas.microsoft.com/office/drawing/2014/main" id="{5AA50058-B8CA-A146-B1FC-BA692D3FF007}"/>
+              </a:ext>
+            </a:extLst>
+          </p:cNvPr>
+          <p:cNvCxnSpPr>
+            <a:cxnSpLocks/>
+          </p:cNvCxnSpPr>
+          <p:nvPr/>
+        </p:nvCxnSpPr>
+        <p:spPr>
+          <a:xfrm>
+            <a:off x="6971370" y="4085091"/>
+            <a:ext cx="6745" cy="559600"/>
+          </a:xfrm>
+          <a:prstGeom prst="straightConnector1">
+            <a:avLst/>
+          </a:prstGeom>
+          <a:ln w="53975">
+            <a:solidFill>
+              <a:schemeClr val="accent6">
+                <a:lumMod val="60000"/>
+                <a:lumOff val="40000"/>
+              </a:schemeClr>
+            </a:solidFill>
+            <a:tailEnd type="triangle"/>
+          </a:ln>
+        </p:spPr>
+        <p:style>
+          <a:lnRef idx="1">
+            <a:schemeClr val="accent1"/>
+          </a:lnRef>
+          <a:fillRef idx="0">
+            <a:schemeClr val="accent1"/>
+          </a:fillRef>
+          <a:effectRef idx="0">
+            <a:schemeClr val="accent1"/>
+          </a:effectRef>
+          <a:fontRef idx="minor">
+            <a:schemeClr val="tx1"/>
+          </a:fontRef>
+        </p:style>
+      </p:cxnSp>
+      <p:sp>
+        <p:nvSpPr>
+          <p:cNvPr id="19" name="TextBox 18">
+            <a:extLst>
+              <a:ext uri="{FF2B5EF4-FFF2-40B4-BE49-F238E27FC236}">
+                <a16:creationId xmlns:a16="http://schemas.microsoft.com/office/drawing/2014/main" id="{0194D5DA-4A91-B14D-B251-0455BD210213}"/>
+              </a:ext>
+            </a:extLst>
+          </p:cNvPr>
+          <p:cNvSpPr txBox="1"/>
+          <p:nvPr/>
+        </p:nvSpPr>
+        <p:spPr>
+          <a:xfrm>
+            <a:off x="4269508" y="5385955"/>
+            <a:ext cx="301686" cy="369332"/>
+          </a:xfrm>
+          <a:prstGeom prst="rect">
+            <a:avLst/>
+          </a:prstGeom>
+          <a:noFill/>
+        </p:spPr>
+        <p:txBody>
+          <a:bodyPr wrap="none" rtlCol="0">
+            <a:spAutoFit/>
+          </a:bodyPr>
+          <a:lstStyle/>
+          <a:p>
+            <a:r>
+              <a:rPr lang="en-US" dirty="0"/>
+              <a:t>2</a:t>
+            </a:r>
+          </a:p>
+        </p:txBody>
+      </p:sp>
+      <p:sp>
+        <p:nvSpPr>
+          <p:cNvPr id="20" name="TextBox 19">
+            <a:extLst>
+              <a:ext uri="{FF2B5EF4-FFF2-40B4-BE49-F238E27FC236}">
+                <a16:creationId xmlns:a16="http://schemas.microsoft.com/office/drawing/2014/main" id="{132B0433-627E-B746-8CE9-1D2943B39C8E}"/>
+              </a:ext>
+            </a:extLst>
+          </p:cNvPr>
+          <p:cNvSpPr txBox="1"/>
+          <p:nvPr/>
+        </p:nvSpPr>
+        <p:spPr>
+          <a:xfrm>
+            <a:off x="6644084" y="4672525"/>
+            <a:ext cx="301686" cy="369332"/>
+          </a:xfrm>
+          <a:prstGeom prst="rect">
+            <a:avLst/>
+          </a:prstGeom>
+          <a:noFill/>
+        </p:spPr>
+        <p:txBody>
+          <a:bodyPr wrap="none" rtlCol="0">
+            <a:spAutoFit/>
+          </a:bodyPr>
+          <a:lstStyle/>
+          <a:p>
+            <a:r>
+              <a:rPr lang="en-US" dirty="0"/>
+              <a:t>3</a:t>
+            </a:r>
+          </a:p>
+        </p:txBody>
+      </p:sp>
+      <p:cxnSp>
+        <p:nvCxnSpPr>
+          <p:cNvPr id="22" name="Straight Arrow Connector 21">
+            <a:extLst>
+              <a:ext uri="{FF2B5EF4-FFF2-40B4-BE49-F238E27FC236}">
+                <a16:creationId xmlns:a16="http://schemas.microsoft.com/office/drawing/2014/main" id="{ED2361C9-14A3-C241-B8A2-8FE7AB9641E2}"/>
+              </a:ext>
+            </a:extLst>
+          </p:cNvPr>
+          <p:cNvCxnSpPr>
+            <a:cxnSpLocks/>
+            <a:stCxn id="14" idx="6"/>
+          </p:cNvCxnSpPr>
+          <p:nvPr/>
+        </p:nvCxnSpPr>
+        <p:spPr>
+          <a:xfrm flipV="1">
+            <a:off x="4203031" y="4547937"/>
+            <a:ext cx="771769" cy="68179"/>
+          </a:xfrm>
+          <a:prstGeom prst="straightConnector1">
+            <a:avLst/>
+          </a:prstGeom>
+          <a:ln w="50800">
+            <a:solidFill>
+              <a:schemeClr val="accent6">
+                <a:lumMod val="75000"/>
+              </a:schemeClr>
+            </a:solidFill>
+            <a:tailEnd type="triangle"/>
+          </a:ln>
+        </p:spPr>
+        <p:style>
+          <a:lnRef idx="1">
+            <a:schemeClr val="accent1"/>
+          </a:lnRef>
+          <a:fillRef idx="0">
+            <a:schemeClr val="accent1"/>
+          </a:fillRef>
+          <a:effectRef idx="0">
+            <a:schemeClr val="accent1"/>
+          </a:effectRef>
+          <a:fontRef idx="minor">
+            <a:schemeClr val="tx1"/>
+          </a:fontRef>
+        </p:style>
+      </p:cxnSp>
+      <p:cxnSp>
+        <p:nvCxnSpPr>
+          <p:cNvPr id="23" name="Straight Arrow Connector 22">
+            <a:extLst>
+              <a:ext uri="{FF2B5EF4-FFF2-40B4-BE49-F238E27FC236}">
+                <a16:creationId xmlns:a16="http://schemas.microsoft.com/office/drawing/2014/main" id="{7872B4F3-3EEA-ED40-A736-1F5FA75DBA05}"/>
+              </a:ext>
+            </a:extLst>
+          </p:cNvPr>
+          <p:cNvCxnSpPr>
+            <a:cxnSpLocks/>
+            <a:stCxn id="14" idx="7"/>
+          </p:cNvCxnSpPr>
+          <p:nvPr/>
+        </p:nvCxnSpPr>
+        <p:spPr>
+          <a:xfrm flipH="1" flipV="1">
+            <a:off x="4148387" y="3762375"/>
+            <a:ext cx="32326" cy="805531"/>
+          </a:xfrm>
+          <a:prstGeom prst="straightConnector1">
+            <a:avLst/>
+          </a:prstGeom>
+          <a:ln w="50800">
+            <a:solidFill>
+              <a:schemeClr val="accent6">
+                <a:lumMod val="75000"/>
+              </a:schemeClr>
+            </a:solidFill>
+            <a:tailEnd type="triangle"/>
+          </a:ln>
+        </p:spPr>
+        <p:style>
+          <a:lnRef idx="1">
+            <a:schemeClr val="accent1"/>
+          </a:lnRef>
+          <a:fillRef idx="0">
+            <a:schemeClr val="accent1"/>
+          </a:fillRef>
+          <a:effectRef idx="0">
+            <a:schemeClr val="accent1"/>
+          </a:effectRef>
+          <a:fontRef idx="minor">
+            <a:schemeClr val="tx1"/>
+          </a:fontRef>
+        </p:style>
+      </p:cxnSp>
+    </p:spTree>
+    <p:extLst>
+      <p:ext uri="{BB962C8B-B14F-4D97-AF65-F5344CB8AC3E}">
+        <p14:creationId xmlns:p14="http://schemas.microsoft.com/office/powerpoint/2010/main" val="2725840247"/>
+      </p:ext>
+    </p:extLst>
+  </p:cSld>
+  <p:clrMapOvr>
+    <a:masterClrMapping/>
+  </p:clrMapOvr>
+</p:sld>
+</file>
+
+<file path=ppt/slides/slide24.xml><?xml version="1.0" encoding="utf-8"?>
+<p:sld xmlns:a="http://schemas.openxmlformats.org/drawingml/2006/main" xmlns:r="http://schemas.openxmlformats.org/officeDocument/2006/relationships" xmlns:p="http://schemas.openxmlformats.org/presentationml/2006/main">
+  <p:cSld>
+    <p:spTree>
+      <p:nvGrpSpPr>
+        <p:cNvPr id="1" name=""/>
+        <p:cNvGrpSpPr/>
+        <p:nvPr/>
+      </p:nvGrpSpPr>
+      <p:grpSpPr>
+        <a:xfrm>
+          <a:off x="0" y="0"/>
+          <a:ext cx="0" cy="0"/>
+          <a:chOff x="0" y="0"/>
+          <a:chExt cx="0" cy="0"/>
+        </a:xfrm>
+      </p:grpSpPr>
+      <p:sp>
+        <p:nvSpPr>
+          <p:cNvPr id="21" name="Isosceles Triangle 20">
+            <a:extLst>
+              <a:ext uri="{FF2B5EF4-FFF2-40B4-BE49-F238E27FC236}">
+                <a16:creationId xmlns:a16="http://schemas.microsoft.com/office/drawing/2014/main" id="{E2DD208B-9ED1-4F23-8A84-898A59AFE327}"/>
+              </a:ext>
+            </a:extLst>
+          </p:cNvPr>
+          <p:cNvSpPr/>
+          <p:nvPr/>
+        </p:nvSpPr>
+        <p:spPr>
+          <a:xfrm rot="20959425">
+            <a:off x="3959243" y="2748942"/>
+            <a:ext cx="2888975" cy="1615051"/>
+          </a:xfrm>
+          <a:prstGeom prst="triangle">
+            <a:avLst/>
+          </a:prstGeom>
+          <a:solidFill>
+            <a:schemeClr val="bg2">
+              <a:lumMod val="90000"/>
+            </a:schemeClr>
+          </a:solidFill>
+        </p:spPr>
+        <p:style>
+          <a:lnRef idx="2">
+            <a:schemeClr val="accent1">
+              <a:shade val="50000"/>
+            </a:schemeClr>
+          </a:lnRef>
+          <a:fillRef idx="1">
+            <a:schemeClr val="accent1"/>
+          </a:fillRef>
+          <a:effectRef idx="0">
+            <a:schemeClr val="accent1"/>
+          </a:effectRef>
+          <a:fontRef idx="minor">
+            <a:schemeClr val="lt1"/>
+          </a:fontRef>
+        </p:style>
+        <p:txBody>
+          <a:bodyPr rtlCol="0" anchor="ctr"/>
+          <a:lstStyle/>
+          <a:p>
+            <a:pPr algn="ctr"/>
+            <a:endParaRPr lang="en-US" dirty="0"/>
+          </a:p>
+        </p:txBody>
+      </p:sp>
+      <p:sp>
+        <p:nvSpPr>
+          <p:cNvPr id="4" name="Oval 3">
+            <a:extLst>
+              <a:ext uri="{FF2B5EF4-FFF2-40B4-BE49-F238E27FC236}">
+                <a16:creationId xmlns:a16="http://schemas.microsoft.com/office/drawing/2014/main" id="{314600A2-A1FF-492F-8609-34CAF5859A52}"/>
+              </a:ext>
+            </a:extLst>
+          </p:cNvPr>
+          <p:cNvSpPr/>
+          <p:nvPr/>
+        </p:nvSpPr>
+        <p:spPr>
+          <a:xfrm>
+            <a:off x="3561347" y="4050632"/>
+            <a:ext cx="1130968" cy="1130968"/>
+          </a:xfrm>
+          <a:prstGeom prst="ellipse">
+            <a:avLst/>
+          </a:prstGeom>
+        </p:spPr>
+        <p:style>
+          <a:lnRef idx="2">
+            <a:schemeClr val="accent1">
+              <a:shade val="50000"/>
+            </a:schemeClr>
+          </a:lnRef>
+          <a:fillRef idx="1">
+            <a:schemeClr val="accent1"/>
+          </a:fillRef>
+          <a:effectRef idx="0">
+            <a:schemeClr val="accent1"/>
+          </a:effectRef>
+          <a:fontRef idx="minor">
+            <a:schemeClr val="lt1"/>
+          </a:fontRef>
+        </p:style>
+        <p:txBody>
+          <a:bodyPr rtlCol="0" anchor="ctr"/>
+          <a:lstStyle/>
+          <a:p>
+            <a:pPr algn="ctr"/>
+            <a:endParaRPr lang="en-US"/>
+          </a:p>
+        </p:txBody>
+      </p:sp>
+      <p:sp>
+        <p:nvSpPr>
+          <p:cNvPr id="5" name="Oval 4">
+            <a:extLst>
+              <a:ext uri="{FF2B5EF4-FFF2-40B4-BE49-F238E27FC236}">
+                <a16:creationId xmlns:a16="http://schemas.microsoft.com/office/drawing/2014/main" id="{ED83B1C8-4E8A-443E-8022-B13B8E29A4AE}"/>
+              </a:ext>
+            </a:extLst>
+          </p:cNvPr>
+          <p:cNvSpPr/>
+          <p:nvPr/>
+        </p:nvSpPr>
+        <p:spPr>
+          <a:xfrm>
+            <a:off x="6406819" y="3513723"/>
+            <a:ext cx="1130968" cy="1130968"/>
+          </a:xfrm>
+          <a:prstGeom prst="ellipse">
+            <a:avLst/>
+          </a:prstGeom>
+        </p:spPr>
+        <p:style>
+          <a:lnRef idx="2">
+            <a:schemeClr val="accent1">
+              <a:shade val="50000"/>
+            </a:schemeClr>
+          </a:lnRef>
+          <a:fillRef idx="1">
+            <a:schemeClr val="accent1"/>
+          </a:fillRef>
+          <a:effectRef idx="0">
+            <a:schemeClr val="accent1"/>
+          </a:effectRef>
+          <a:fontRef idx="minor">
+            <a:schemeClr val="lt1"/>
+          </a:fontRef>
+        </p:style>
+        <p:txBody>
+          <a:bodyPr rtlCol="0" anchor="ctr"/>
+          <a:lstStyle/>
+          <a:p>
+            <a:pPr algn="ctr"/>
+            <a:endParaRPr lang="en-US"/>
+          </a:p>
+        </p:txBody>
+      </p:sp>
+      <p:cxnSp>
+        <p:nvCxnSpPr>
+          <p:cNvPr id="8" name="Straight Connector 7">
+            <a:extLst>
+              <a:ext uri="{FF2B5EF4-FFF2-40B4-BE49-F238E27FC236}">
+                <a16:creationId xmlns:a16="http://schemas.microsoft.com/office/drawing/2014/main" id="{5E9B6128-A755-4014-AD0B-AF4BCF9C3590}"/>
+              </a:ext>
+            </a:extLst>
+          </p:cNvPr>
+          <p:cNvCxnSpPr>
+            <a:cxnSpLocks/>
+          </p:cNvCxnSpPr>
+          <p:nvPr/>
+        </p:nvCxnSpPr>
+        <p:spPr>
+          <a:xfrm flipV="1">
+            <a:off x="3617494" y="4291265"/>
+            <a:ext cx="1620253" cy="1668378"/>
+          </a:xfrm>
+          <a:prstGeom prst="line">
+            <a:avLst/>
+          </a:prstGeom>
+        </p:spPr>
+        <p:style>
+          <a:lnRef idx="1">
+            <a:schemeClr val="accent1"/>
+          </a:lnRef>
+          <a:fillRef idx="0">
+            <a:schemeClr val="accent1"/>
+          </a:fillRef>
+          <a:effectRef idx="0">
+            <a:schemeClr val="accent1"/>
+          </a:effectRef>
+          <a:fontRef idx="minor">
+            <a:schemeClr val="tx1"/>
+          </a:fontRef>
+        </p:style>
+      </p:cxnSp>
+      <p:cxnSp>
+        <p:nvCxnSpPr>
+          <p:cNvPr id="11" name="Straight Connector 10">
+            <a:extLst>
+              <a:ext uri="{FF2B5EF4-FFF2-40B4-BE49-F238E27FC236}">
+                <a16:creationId xmlns:a16="http://schemas.microsoft.com/office/drawing/2014/main" id="{A4B179D8-2EB4-4B0C-AA1F-00B1C3644A3D}"/>
+              </a:ext>
+            </a:extLst>
+          </p:cNvPr>
+          <p:cNvCxnSpPr>
+            <a:cxnSpLocks/>
+          </p:cNvCxnSpPr>
+          <p:nvPr/>
+        </p:nvCxnSpPr>
+        <p:spPr>
+          <a:xfrm flipV="1">
+            <a:off x="6825329" y="3541797"/>
+            <a:ext cx="1155028" cy="1860884"/>
+          </a:xfrm>
+          <a:prstGeom prst="line">
+            <a:avLst/>
+          </a:prstGeom>
+        </p:spPr>
+        <p:style>
+          <a:lnRef idx="1">
+            <a:schemeClr val="accent1"/>
+          </a:lnRef>
+          <a:fillRef idx="0">
+            <a:schemeClr val="accent1"/>
+          </a:fillRef>
+          <a:effectRef idx="0">
+            <a:schemeClr val="accent1"/>
+          </a:effectRef>
+          <a:fontRef idx="minor">
+            <a:schemeClr val="tx1"/>
+          </a:fontRef>
+        </p:style>
+      </p:cxnSp>
+      <p:sp>
+        <p:nvSpPr>
+          <p:cNvPr id="14" name="Oval 13">
+            <a:extLst>
+              <a:ext uri="{FF2B5EF4-FFF2-40B4-BE49-F238E27FC236}">
+                <a16:creationId xmlns:a16="http://schemas.microsoft.com/office/drawing/2014/main" id="{A3FB30E0-CD29-4C5E-B40F-8C0976CAE2BB}"/>
+              </a:ext>
+            </a:extLst>
+          </p:cNvPr>
+          <p:cNvSpPr/>
+          <p:nvPr/>
+        </p:nvSpPr>
+        <p:spPr>
+          <a:xfrm>
+            <a:off x="4050631" y="4547937"/>
+            <a:ext cx="152400" cy="136358"/>
+          </a:xfrm>
+          <a:prstGeom prst="ellipse">
+            <a:avLst/>
+          </a:prstGeom>
+          <a:solidFill>
+            <a:srgbClr val="FF0000"/>
+          </a:solidFill>
+          <a:ln>
+            <a:solidFill>
+              <a:srgbClr val="FF0000"/>
+            </a:solidFill>
+          </a:ln>
+        </p:spPr>
+        <p:style>
+          <a:lnRef idx="2">
+            <a:schemeClr val="accent1">
+              <a:shade val="50000"/>
+            </a:schemeClr>
+          </a:lnRef>
+          <a:fillRef idx="1">
+            <a:schemeClr val="accent1"/>
+          </a:fillRef>
+          <a:effectRef idx="0">
+            <a:schemeClr val="accent1"/>
+          </a:effectRef>
+          <a:fontRef idx="minor">
+            <a:schemeClr val="lt1"/>
+          </a:fontRef>
+        </p:style>
+        <p:txBody>
+          <a:bodyPr rtlCol="0" anchor="ctr"/>
+          <a:lstStyle/>
+          <a:p>
+            <a:pPr algn="ctr"/>
+            <a:endParaRPr lang="en-US"/>
+          </a:p>
+        </p:txBody>
+      </p:sp>
+      <p:sp>
+        <p:nvSpPr>
+          <p:cNvPr id="15" name="Oval 14">
+            <a:extLst>
+              <a:ext uri="{FF2B5EF4-FFF2-40B4-BE49-F238E27FC236}">
+                <a16:creationId xmlns:a16="http://schemas.microsoft.com/office/drawing/2014/main" id="{4E009318-9624-43B1-AA16-858CE5B68F3B}"/>
+              </a:ext>
+            </a:extLst>
+          </p:cNvPr>
+          <p:cNvSpPr/>
+          <p:nvPr/>
+        </p:nvSpPr>
+        <p:spPr>
+          <a:xfrm>
+            <a:off x="6896103" y="4011028"/>
+            <a:ext cx="152400" cy="136358"/>
+          </a:xfrm>
+          <a:prstGeom prst="ellipse">
+            <a:avLst/>
+          </a:prstGeom>
+          <a:solidFill>
+            <a:srgbClr val="FF0000"/>
+          </a:solidFill>
+          <a:ln>
+            <a:solidFill>
+              <a:srgbClr val="FF0000"/>
+            </a:solidFill>
+          </a:ln>
+        </p:spPr>
+        <p:style>
+          <a:lnRef idx="2">
+            <a:schemeClr val="accent1">
+              <a:shade val="50000"/>
+            </a:schemeClr>
+          </a:lnRef>
+          <a:fillRef idx="1">
+            <a:schemeClr val="accent1"/>
+          </a:fillRef>
+          <a:effectRef idx="0">
+            <a:schemeClr val="accent1"/>
+          </a:effectRef>
+          <a:fontRef idx="minor">
+            <a:schemeClr val="lt1"/>
+          </a:fontRef>
+        </p:style>
+        <p:txBody>
+          <a:bodyPr rtlCol="0" anchor="ctr"/>
+          <a:lstStyle/>
+          <a:p>
+            <a:pPr algn="ctr"/>
+            <a:endParaRPr lang="en-US"/>
+          </a:p>
+        </p:txBody>
+      </p:sp>
+      <p:sp>
+        <p:nvSpPr>
+          <p:cNvPr id="10" name="TextBox 9">
+            <a:extLst>
+              <a:ext uri="{FF2B5EF4-FFF2-40B4-BE49-F238E27FC236}">
+                <a16:creationId xmlns:a16="http://schemas.microsoft.com/office/drawing/2014/main" id="{451C141E-2478-496A-A547-8D9C4BB155C0}"/>
+              </a:ext>
+            </a:extLst>
+          </p:cNvPr>
+          <p:cNvSpPr txBox="1"/>
+          <p:nvPr/>
+        </p:nvSpPr>
+        <p:spPr>
+          <a:xfrm>
+            <a:off x="5237747" y="661640"/>
+            <a:ext cx="6254726" cy="646331"/>
+          </a:xfrm>
+          <a:prstGeom prst="rect">
+            <a:avLst/>
+          </a:prstGeom>
+          <a:noFill/>
+        </p:spPr>
+        <p:txBody>
+          <a:bodyPr wrap="none" rtlCol="0">
+            <a:spAutoFit/>
+          </a:bodyPr>
+          <a:lstStyle/>
+          <a:p>
+            <a:r>
+              <a:rPr lang="en-US" dirty="0"/>
+              <a:t>MOVE ALL FORCE TO THE CG AND TRACK THE MOMENTS</a:t>
+            </a:r>
+          </a:p>
+          <a:p>
+            <a:r>
+              <a:rPr lang="en-US" dirty="0"/>
+              <a:t>RESOLVE ALL FORCES TO X and Y components to make this easier</a:t>
+            </a:r>
+          </a:p>
+        </p:txBody>
+      </p:sp>
+      <p:sp>
+        <p:nvSpPr>
+          <p:cNvPr id="16" name="Oval 15">
+            <a:extLst>
+              <a:ext uri="{FF2B5EF4-FFF2-40B4-BE49-F238E27FC236}">
+                <a16:creationId xmlns:a16="http://schemas.microsoft.com/office/drawing/2014/main" id="{6E7BCEC9-ACB6-46AF-B3B0-F06B74D4EF18}"/>
+              </a:ext>
+            </a:extLst>
+          </p:cNvPr>
+          <p:cNvSpPr/>
+          <p:nvPr/>
+        </p:nvSpPr>
+        <p:spPr>
+          <a:xfrm>
+            <a:off x="5320967" y="3609975"/>
+            <a:ext cx="152400" cy="152400"/>
+          </a:xfrm>
+          <a:prstGeom prst="ellipse">
+            <a:avLst/>
+          </a:prstGeom>
+          <a:solidFill>
+            <a:schemeClr val="accent1">
+              <a:lumMod val="60000"/>
+              <a:lumOff val="40000"/>
+            </a:schemeClr>
+          </a:solidFill>
+        </p:spPr>
+        <p:style>
+          <a:lnRef idx="2">
+            <a:schemeClr val="accent1">
+              <a:shade val="50000"/>
+            </a:schemeClr>
+          </a:lnRef>
+          <a:fillRef idx="1">
+            <a:schemeClr val="accent1"/>
+          </a:fillRef>
+          <a:effectRef idx="0">
+            <a:schemeClr val="accent1"/>
+          </a:effectRef>
+          <a:fontRef idx="minor">
+            <a:schemeClr val="lt1"/>
+          </a:fontRef>
+        </p:style>
+        <p:txBody>
+          <a:bodyPr rtlCol="0" anchor="ctr"/>
+          <a:lstStyle/>
+          <a:p>
+            <a:pPr algn="ctr"/>
+            <a:endParaRPr lang="en-US"/>
+          </a:p>
+        </p:txBody>
+      </p:sp>
+      <p:sp>
+        <p:nvSpPr>
+          <p:cNvPr id="6" name="TextBox 5">
+            <a:extLst>
+              <a:ext uri="{FF2B5EF4-FFF2-40B4-BE49-F238E27FC236}">
+                <a16:creationId xmlns:a16="http://schemas.microsoft.com/office/drawing/2014/main" id="{1A46242E-54C8-8C4C-AD0E-020FACD6EACA}"/>
+              </a:ext>
+            </a:extLst>
+          </p:cNvPr>
+          <p:cNvSpPr txBox="1"/>
+          <p:nvPr/>
+        </p:nvSpPr>
+        <p:spPr>
+          <a:xfrm>
+            <a:off x="428017" y="846306"/>
+            <a:ext cx="4014753" cy="923330"/>
+          </a:xfrm>
+          <a:prstGeom prst="rect">
+            <a:avLst/>
+          </a:prstGeom>
+          <a:noFill/>
+        </p:spPr>
+        <p:txBody>
+          <a:bodyPr wrap="none" rtlCol="0">
+            <a:spAutoFit/>
+          </a:bodyPr>
+          <a:lstStyle/>
+          <a:p>
+            <a:r>
+              <a:rPr lang="en-US" dirty="0"/>
+              <a:t>1 = </a:t>
+            </a:r>
+            <a:r>
+              <a:rPr lang="en-US" dirty="0" err="1"/>
+              <a:t>Fout</a:t>
+            </a:r>
+            <a:r>
+              <a:rPr lang="en-US" dirty="0"/>
+              <a:t>.  (along the positive </a:t>
+            </a:r>
+            <a:r>
+              <a:rPr lang="en-US" dirty="0" err="1"/>
+              <a:t>Xalpha</a:t>
+            </a:r>
+            <a:r>
+              <a:rPr lang="en-US" dirty="0"/>
+              <a:t> axis)</a:t>
+            </a:r>
+          </a:p>
+          <a:p>
+            <a:r>
+              <a:rPr lang="en-US" dirty="0"/>
+              <a:t>2 = </a:t>
+            </a:r>
+            <a:r>
+              <a:rPr lang="en-US" dirty="0" err="1"/>
+              <a:t>Fwr</a:t>
+            </a:r>
+            <a:r>
+              <a:rPr lang="en-US" dirty="0"/>
+              <a:t> 	(along the negative Y axis</a:t>
+            </a:r>
+          </a:p>
+          <a:p>
+            <a:r>
+              <a:rPr lang="en-US" dirty="0"/>
+              <a:t>3 = </a:t>
+            </a:r>
+            <a:r>
+              <a:rPr lang="en-US" dirty="0" err="1"/>
+              <a:t>Fwf</a:t>
+            </a:r>
+            <a:r>
+              <a:rPr lang="en-US" dirty="0"/>
+              <a:t>    (along the negative Y axis</a:t>
+            </a:r>
+          </a:p>
+        </p:txBody>
+      </p:sp>
+      <p:cxnSp>
+        <p:nvCxnSpPr>
+          <p:cNvPr id="17" name="Straight Arrow Connector 16">
+            <a:extLst>
+              <a:ext uri="{FF2B5EF4-FFF2-40B4-BE49-F238E27FC236}">
+                <a16:creationId xmlns:a16="http://schemas.microsoft.com/office/drawing/2014/main" id="{5D80920B-3102-884B-82BD-7BB4482CDB45}"/>
+              </a:ext>
+            </a:extLst>
+          </p:cNvPr>
+          <p:cNvCxnSpPr>
+            <a:cxnSpLocks/>
+          </p:cNvCxnSpPr>
+          <p:nvPr/>
+        </p:nvCxnSpPr>
+        <p:spPr>
+          <a:xfrm>
+            <a:off x="4137932" y="4616116"/>
+            <a:ext cx="10455" cy="991470"/>
+          </a:xfrm>
+          <a:prstGeom prst="straightConnector1">
+            <a:avLst/>
+          </a:prstGeom>
+          <a:ln w="53975">
+            <a:solidFill>
+              <a:schemeClr val="accent6">
+                <a:lumMod val="60000"/>
+                <a:lumOff val="40000"/>
+              </a:schemeClr>
+            </a:solidFill>
+            <a:tailEnd type="triangle"/>
+          </a:ln>
+        </p:spPr>
+        <p:style>
+          <a:lnRef idx="1">
+            <a:schemeClr val="accent1"/>
+          </a:lnRef>
+          <a:fillRef idx="0">
+            <a:schemeClr val="accent1"/>
+          </a:fillRef>
+          <a:effectRef idx="0">
+            <a:schemeClr val="accent1"/>
+          </a:effectRef>
+          <a:fontRef idx="minor">
+            <a:schemeClr val="tx1"/>
+          </a:fontRef>
+        </p:style>
+      </p:cxnSp>
+      <p:cxnSp>
+        <p:nvCxnSpPr>
+          <p:cNvPr id="18" name="Straight Arrow Connector 17">
+            <a:extLst>
+              <a:ext uri="{FF2B5EF4-FFF2-40B4-BE49-F238E27FC236}">
+                <a16:creationId xmlns:a16="http://schemas.microsoft.com/office/drawing/2014/main" id="{5AA50058-B8CA-A146-B1FC-BA692D3FF007}"/>
+              </a:ext>
+            </a:extLst>
+          </p:cNvPr>
+          <p:cNvCxnSpPr>
+            <a:cxnSpLocks/>
+          </p:cNvCxnSpPr>
+          <p:nvPr/>
+        </p:nvCxnSpPr>
+        <p:spPr>
+          <a:xfrm>
+            <a:off x="6971370" y="4085091"/>
+            <a:ext cx="6745" cy="559600"/>
+          </a:xfrm>
+          <a:prstGeom prst="straightConnector1">
+            <a:avLst/>
+          </a:prstGeom>
+          <a:ln w="53975">
+            <a:solidFill>
+              <a:schemeClr val="accent6">
+                <a:lumMod val="60000"/>
+                <a:lumOff val="40000"/>
+              </a:schemeClr>
+            </a:solidFill>
+            <a:tailEnd type="triangle"/>
+          </a:ln>
+        </p:spPr>
+        <p:style>
+          <a:lnRef idx="1">
+            <a:schemeClr val="accent1"/>
+          </a:lnRef>
+          <a:fillRef idx="0">
+            <a:schemeClr val="accent1"/>
+          </a:fillRef>
+          <a:effectRef idx="0">
+            <a:schemeClr val="accent1"/>
+          </a:effectRef>
+          <a:fontRef idx="minor">
+            <a:schemeClr val="tx1"/>
+          </a:fontRef>
+        </p:style>
+      </p:cxnSp>
+      <p:sp>
+        <p:nvSpPr>
+          <p:cNvPr id="19" name="TextBox 18">
+            <a:extLst>
+              <a:ext uri="{FF2B5EF4-FFF2-40B4-BE49-F238E27FC236}">
+                <a16:creationId xmlns:a16="http://schemas.microsoft.com/office/drawing/2014/main" id="{0194D5DA-4A91-B14D-B251-0455BD210213}"/>
+              </a:ext>
+            </a:extLst>
+          </p:cNvPr>
+          <p:cNvSpPr txBox="1"/>
+          <p:nvPr/>
+        </p:nvSpPr>
+        <p:spPr>
+          <a:xfrm>
+            <a:off x="4269508" y="5385955"/>
+            <a:ext cx="301686" cy="369332"/>
+          </a:xfrm>
+          <a:prstGeom prst="rect">
+            <a:avLst/>
+          </a:prstGeom>
+          <a:noFill/>
+        </p:spPr>
+        <p:txBody>
+          <a:bodyPr wrap="none" rtlCol="0">
+            <a:spAutoFit/>
+          </a:bodyPr>
+          <a:lstStyle/>
+          <a:p>
+            <a:r>
+              <a:rPr lang="en-US" dirty="0"/>
+              <a:t>2</a:t>
+            </a:r>
+          </a:p>
+        </p:txBody>
+      </p:sp>
+      <p:sp>
+        <p:nvSpPr>
+          <p:cNvPr id="20" name="TextBox 19">
+            <a:extLst>
+              <a:ext uri="{FF2B5EF4-FFF2-40B4-BE49-F238E27FC236}">
+                <a16:creationId xmlns:a16="http://schemas.microsoft.com/office/drawing/2014/main" id="{132B0433-627E-B746-8CE9-1D2943B39C8E}"/>
+              </a:ext>
+            </a:extLst>
+          </p:cNvPr>
+          <p:cNvSpPr txBox="1"/>
+          <p:nvPr/>
+        </p:nvSpPr>
+        <p:spPr>
+          <a:xfrm>
+            <a:off x="6644084" y="4672525"/>
+            <a:ext cx="301686" cy="369332"/>
+          </a:xfrm>
+          <a:prstGeom prst="rect">
+            <a:avLst/>
+          </a:prstGeom>
+          <a:noFill/>
+        </p:spPr>
+        <p:txBody>
+          <a:bodyPr wrap="none" rtlCol="0">
+            <a:spAutoFit/>
+          </a:bodyPr>
+          <a:lstStyle/>
+          <a:p>
+            <a:r>
+              <a:rPr lang="en-US" dirty="0"/>
+              <a:t>3</a:t>
+            </a:r>
+          </a:p>
+        </p:txBody>
+      </p:sp>
+      <p:cxnSp>
+        <p:nvCxnSpPr>
+          <p:cNvPr id="22" name="Straight Arrow Connector 21">
+            <a:extLst>
+              <a:ext uri="{FF2B5EF4-FFF2-40B4-BE49-F238E27FC236}">
+                <a16:creationId xmlns:a16="http://schemas.microsoft.com/office/drawing/2014/main" id="{ED2361C9-14A3-C241-B8A2-8FE7AB9641E2}"/>
+              </a:ext>
+            </a:extLst>
+          </p:cNvPr>
+          <p:cNvCxnSpPr>
+            <a:cxnSpLocks/>
+            <a:stCxn id="14" idx="6"/>
+          </p:cNvCxnSpPr>
+          <p:nvPr/>
+        </p:nvCxnSpPr>
+        <p:spPr>
+          <a:xfrm flipV="1">
+            <a:off x="4203031" y="4547937"/>
+            <a:ext cx="771769" cy="68179"/>
+          </a:xfrm>
+          <a:prstGeom prst="straightConnector1">
+            <a:avLst/>
+          </a:prstGeom>
+          <a:ln w="50800">
+            <a:solidFill>
+              <a:schemeClr val="accent6">
+                <a:lumMod val="75000"/>
+              </a:schemeClr>
+            </a:solidFill>
+            <a:tailEnd type="triangle"/>
+          </a:ln>
+        </p:spPr>
+        <p:style>
+          <a:lnRef idx="1">
+            <a:schemeClr val="accent1"/>
+          </a:lnRef>
+          <a:fillRef idx="0">
+            <a:schemeClr val="accent1"/>
+          </a:fillRef>
+          <a:effectRef idx="0">
+            <a:schemeClr val="accent1"/>
+          </a:effectRef>
+          <a:fontRef idx="minor">
+            <a:schemeClr val="tx1"/>
+          </a:fontRef>
+        </p:style>
+      </p:cxnSp>
+      <p:cxnSp>
+        <p:nvCxnSpPr>
+          <p:cNvPr id="23" name="Straight Arrow Connector 22">
+            <a:extLst>
+              <a:ext uri="{FF2B5EF4-FFF2-40B4-BE49-F238E27FC236}">
+                <a16:creationId xmlns:a16="http://schemas.microsoft.com/office/drawing/2014/main" id="{7872B4F3-3EEA-ED40-A736-1F5FA75DBA05}"/>
+              </a:ext>
+            </a:extLst>
+          </p:cNvPr>
+          <p:cNvCxnSpPr>
+            <a:cxnSpLocks/>
+            <a:stCxn id="14" idx="7"/>
+          </p:cNvCxnSpPr>
+          <p:nvPr/>
+        </p:nvCxnSpPr>
+        <p:spPr>
+          <a:xfrm flipH="1" flipV="1">
+            <a:off x="4148387" y="3762375"/>
+            <a:ext cx="32326" cy="805531"/>
+          </a:xfrm>
+          <a:prstGeom prst="straightConnector1">
+            <a:avLst/>
+          </a:prstGeom>
+          <a:ln w="50800">
+            <a:solidFill>
+              <a:schemeClr val="accent6">
+                <a:lumMod val="75000"/>
+              </a:schemeClr>
+            </a:solidFill>
+            <a:tailEnd type="triangle"/>
+          </a:ln>
+        </p:spPr>
+        <p:style>
+          <a:lnRef idx="1">
+            <a:schemeClr val="accent1"/>
+          </a:lnRef>
+          <a:fillRef idx="0">
+            <a:schemeClr val="accent1"/>
+          </a:fillRef>
+          <a:effectRef idx="0">
+            <a:schemeClr val="accent1"/>
+          </a:effectRef>
+          <a:fontRef idx="minor">
+            <a:schemeClr val="tx1"/>
+          </a:fontRef>
+        </p:style>
+      </p:cxnSp>
+    </p:spTree>
+    <p:extLst>
+      <p:ext uri="{BB962C8B-B14F-4D97-AF65-F5344CB8AC3E}">
+        <p14:creationId xmlns:p14="http://schemas.microsoft.com/office/powerpoint/2010/main" val="3618021007"/>
+      </p:ext>
+    </p:extLst>
+  </p:cSld>
+  <p:clrMapOvr>
+    <a:masterClrMapping/>
+  </p:clrMapOvr>
+</p:sld>
+</file>
+
 <file path=ppt/slides/slide3.xml><?xml version="1.0" encoding="utf-8"?>
 <p:sld xmlns:a="http://schemas.openxmlformats.org/drawingml/2006/main" xmlns:r="http://schemas.openxmlformats.org/officeDocument/2006/relationships" xmlns:p="http://schemas.openxmlformats.org/presentationml/2006/main">
   <p:cSld>

</xml_diff>